<commit_message>
Update Process Flow Diagram
</commit_message>
<xml_diff>
--- a/about_me/Visual Listening In_Draft.pptx
+++ b/about_me/Visual Listening In_Draft.pptx
@@ -249,20 +249,6 @@
 </p:cmAuthorLst>
 </file>
 
-<file path=ppt/comments/comment1.xml><?xml version="1.0" encoding="utf-8"?>
-<p:cmLst xmlns:a="http://schemas.openxmlformats.org/drawingml/2006/main" xmlns:r="http://schemas.openxmlformats.org/officeDocument/2006/relationships" xmlns:p="http://schemas.openxmlformats.org/presentationml/2006/main">
-  <p:cm authorId="1" dt="2020-04-19T23:36:26.166" idx="3">
-    <p:pos x="5313" y="3501"/>
-    <p:text>Link to the Demo</p:text>
-    <p:extLst>
-      <p:ext uri="{C676402C-5697-4E1C-873F-D02D1690AC5C}">
-        <p15:threadingInfo xmlns:p15="http://schemas.microsoft.com/office/powerpoint/2012/main" timeZoneBias="-120"/>
-      </p:ext>
-    </p:extLst>
-  </p:cm>
-</p:cmLst>
-</file>
-
 <file path=ppt/diagrams/colors1.xml><?xml version="1.0" encoding="utf-8"?>
 <dgm:colorsDef xmlns:dgm="http://schemas.openxmlformats.org/drawingml/2006/diagram" xmlns:a="http://schemas.openxmlformats.org/drawingml/2006/main" uniqueId="urn:microsoft.com/office/officeart/2005/8/colors/accent2_2">
   <dgm:title val=""/>
@@ -5611,13 +5597,6 @@
         </dgm:presLayoutVars>
       </dgm:prSet>
       <dgm:spPr/>
-      <dgm:t>
-        <a:bodyPr/>
-        <a:lstStyle/>
-        <a:p>
-          <a:endParaRPr lang="en-US"/>
-        </a:p>
-      </dgm:t>
     </dgm:pt>
     <dgm:pt modelId="{DE801391-6078-4642-A904-31F06D589410}" type="pres">
       <dgm:prSet presAssocID="{4F70F4CF-DD21-4008-B481-6BA6CFA8606F}" presName="composite" presStyleCnt="0"/>
@@ -5632,13 +5611,6 @@
         </dgm:presLayoutVars>
       </dgm:prSet>
       <dgm:spPr/>
-      <dgm:t>
-        <a:bodyPr/>
-        <a:lstStyle/>
-        <a:p>
-          <a:endParaRPr lang="en-US"/>
-        </a:p>
-      </dgm:t>
     </dgm:pt>
     <dgm:pt modelId="{C09B49A9-F287-466D-9FA8-2969A250D43B}" type="pres">
       <dgm:prSet presAssocID="{4F70F4CF-DD21-4008-B481-6BA6CFA8606F}" presName="desTx" presStyleLbl="alignAccFollowNode1" presStyleIdx="0" presStyleCnt="1">
@@ -5650,8 +5622,8 @@
     </dgm:pt>
   </dgm:ptLst>
   <dgm:cxnLst>
+    <dgm:cxn modelId="{FC1B8E0B-E31D-49F7-9332-4213C24337DB}" type="presOf" srcId="{4F70F4CF-DD21-4008-B481-6BA6CFA8606F}" destId="{164972D1-934A-430E-8C24-4713175A720E}" srcOrd="0" destOrd="0" presId="urn:microsoft.com/office/officeart/2005/8/layout/hList1"/>
     <dgm:cxn modelId="{0D15C02F-34DA-45EB-896A-D87CF4722274}" type="presOf" srcId="{63340D2B-A71D-43C4-97F7-17D296365ACA}" destId="{7FD6EACB-80AA-4660-88F3-3F7E496F0178}" srcOrd="0" destOrd="0" presId="urn:microsoft.com/office/officeart/2005/8/layout/hList1"/>
-    <dgm:cxn modelId="{FC1B8E0B-E31D-49F7-9332-4213C24337DB}" type="presOf" srcId="{4F70F4CF-DD21-4008-B481-6BA6CFA8606F}" destId="{164972D1-934A-430E-8C24-4713175A720E}" srcOrd="0" destOrd="0" presId="urn:microsoft.com/office/officeart/2005/8/layout/hList1"/>
     <dgm:cxn modelId="{3DDF73A3-C317-4EF4-9B97-ADDAFA89B7FC}" srcId="{63340D2B-A71D-43C4-97F7-17D296365ACA}" destId="{4F70F4CF-DD21-4008-B481-6BA6CFA8606F}" srcOrd="0" destOrd="0" parTransId="{A4D417E5-0CF4-443E-AFE1-7A8972450414}" sibTransId="{EF243263-BB19-4C5B-BE3D-A3FA03F223DD}"/>
     <dgm:cxn modelId="{AE793B27-3CDB-4E0B-B3E7-261288901B16}" type="presParOf" srcId="{7FD6EACB-80AA-4660-88F3-3F7E496F0178}" destId="{DE801391-6078-4642-A904-31F06D589410}" srcOrd="0" destOrd="0" presId="urn:microsoft.com/office/officeart/2005/8/layout/hList1"/>
     <dgm:cxn modelId="{79CAFD43-48E0-4224-9DDF-E43EDADF7415}" type="presParOf" srcId="{DE801391-6078-4642-A904-31F06D589410}" destId="{164972D1-934A-430E-8C24-4713175A720E}" srcOrd="0" destOrd="0" presId="urn:microsoft.com/office/officeart/2005/8/layout/hList1"/>
@@ -5726,13 +5698,6 @@
         </dgm:presLayoutVars>
       </dgm:prSet>
       <dgm:spPr/>
-      <dgm:t>
-        <a:bodyPr/>
-        <a:lstStyle/>
-        <a:p>
-          <a:endParaRPr lang="en-US"/>
-        </a:p>
-      </dgm:t>
     </dgm:pt>
     <dgm:pt modelId="{DE801391-6078-4642-A904-31F06D589410}" type="pres">
       <dgm:prSet presAssocID="{4F70F4CF-DD21-4008-B481-6BA6CFA8606F}" presName="composite" presStyleCnt="0"/>
@@ -5747,13 +5712,6 @@
         </dgm:presLayoutVars>
       </dgm:prSet>
       <dgm:spPr/>
-      <dgm:t>
-        <a:bodyPr/>
-        <a:lstStyle/>
-        <a:p>
-          <a:endParaRPr lang="en-US"/>
-        </a:p>
-      </dgm:t>
     </dgm:pt>
     <dgm:pt modelId="{C09B49A9-F287-466D-9FA8-2969A250D43B}" type="pres">
       <dgm:prSet presAssocID="{4F70F4CF-DD21-4008-B481-6BA6CFA8606F}" presName="desTx" presStyleLbl="alignAccFollowNode1" presStyleIdx="0" presStyleCnt="1">
@@ -5765,8 +5723,8 @@
     </dgm:pt>
   </dgm:ptLst>
   <dgm:cxnLst>
+    <dgm:cxn modelId="{FC1B8E0B-E31D-49F7-9332-4213C24337DB}" type="presOf" srcId="{4F70F4CF-DD21-4008-B481-6BA6CFA8606F}" destId="{164972D1-934A-430E-8C24-4713175A720E}" srcOrd="0" destOrd="0" presId="urn:microsoft.com/office/officeart/2005/8/layout/hList1"/>
     <dgm:cxn modelId="{0D15C02F-34DA-45EB-896A-D87CF4722274}" type="presOf" srcId="{63340D2B-A71D-43C4-97F7-17D296365ACA}" destId="{7FD6EACB-80AA-4660-88F3-3F7E496F0178}" srcOrd="0" destOrd="0" presId="urn:microsoft.com/office/officeart/2005/8/layout/hList1"/>
-    <dgm:cxn modelId="{FC1B8E0B-E31D-49F7-9332-4213C24337DB}" type="presOf" srcId="{4F70F4CF-DD21-4008-B481-6BA6CFA8606F}" destId="{164972D1-934A-430E-8C24-4713175A720E}" srcOrd="0" destOrd="0" presId="urn:microsoft.com/office/officeart/2005/8/layout/hList1"/>
     <dgm:cxn modelId="{3DDF73A3-C317-4EF4-9B97-ADDAFA89B7FC}" srcId="{63340D2B-A71D-43C4-97F7-17D296365ACA}" destId="{4F70F4CF-DD21-4008-B481-6BA6CFA8606F}" srcOrd="0" destOrd="0" parTransId="{A4D417E5-0CF4-443E-AFE1-7A8972450414}" sibTransId="{EF243263-BB19-4C5B-BE3D-A3FA03F223DD}"/>
     <dgm:cxn modelId="{AE793B27-3CDB-4E0B-B3E7-261288901B16}" type="presParOf" srcId="{7FD6EACB-80AA-4660-88F3-3F7E496F0178}" destId="{DE801391-6078-4642-A904-31F06D589410}" srcOrd="0" destOrd="0" presId="urn:microsoft.com/office/officeart/2005/8/layout/hList1"/>
     <dgm:cxn modelId="{79CAFD43-48E0-4224-9DDF-E43EDADF7415}" type="presParOf" srcId="{DE801391-6078-4642-A904-31F06D589410}" destId="{164972D1-934A-430E-8C24-4713175A720E}" srcOrd="0" destOrd="0" presId="urn:microsoft.com/office/officeart/2005/8/layout/hList1"/>
@@ -5846,13 +5804,6 @@
         </dgm:presLayoutVars>
       </dgm:prSet>
       <dgm:spPr/>
-      <dgm:t>
-        <a:bodyPr/>
-        <a:lstStyle/>
-        <a:p>
-          <a:endParaRPr lang="en-US"/>
-        </a:p>
-      </dgm:t>
     </dgm:pt>
     <dgm:pt modelId="{DE801391-6078-4642-A904-31F06D589410}" type="pres">
       <dgm:prSet presAssocID="{4F70F4CF-DD21-4008-B481-6BA6CFA8606F}" presName="composite" presStyleCnt="0"/>
@@ -5867,13 +5818,6 @@
         </dgm:presLayoutVars>
       </dgm:prSet>
       <dgm:spPr/>
-      <dgm:t>
-        <a:bodyPr/>
-        <a:lstStyle/>
-        <a:p>
-          <a:endParaRPr lang="en-US"/>
-        </a:p>
-      </dgm:t>
     </dgm:pt>
     <dgm:pt modelId="{C09B49A9-F287-466D-9FA8-2969A250D43B}" type="pres">
       <dgm:prSet presAssocID="{4F70F4CF-DD21-4008-B481-6BA6CFA8606F}" presName="desTx" presStyleLbl="alignAccFollowNode1" presStyleIdx="0" presStyleCnt="1">
@@ -5885,8 +5829,8 @@
     </dgm:pt>
   </dgm:ptLst>
   <dgm:cxnLst>
+    <dgm:cxn modelId="{FC1B8E0B-E31D-49F7-9332-4213C24337DB}" type="presOf" srcId="{4F70F4CF-DD21-4008-B481-6BA6CFA8606F}" destId="{164972D1-934A-430E-8C24-4713175A720E}" srcOrd="0" destOrd="0" presId="urn:microsoft.com/office/officeart/2005/8/layout/hList1"/>
     <dgm:cxn modelId="{0D15C02F-34DA-45EB-896A-D87CF4722274}" type="presOf" srcId="{63340D2B-A71D-43C4-97F7-17D296365ACA}" destId="{7FD6EACB-80AA-4660-88F3-3F7E496F0178}" srcOrd="0" destOrd="0" presId="urn:microsoft.com/office/officeart/2005/8/layout/hList1"/>
-    <dgm:cxn modelId="{FC1B8E0B-E31D-49F7-9332-4213C24337DB}" type="presOf" srcId="{4F70F4CF-DD21-4008-B481-6BA6CFA8606F}" destId="{164972D1-934A-430E-8C24-4713175A720E}" srcOrd="0" destOrd="0" presId="urn:microsoft.com/office/officeart/2005/8/layout/hList1"/>
     <dgm:cxn modelId="{3DDF73A3-C317-4EF4-9B97-ADDAFA89B7FC}" srcId="{63340D2B-A71D-43C4-97F7-17D296365ACA}" destId="{4F70F4CF-DD21-4008-B481-6BA6CFA8606F}" srcOrd="0" destOrd="0" parTransId="{A4D417E5-0CF4-443E-AFE1-7A8972450414}" sibTransId="{EF243263-BB19-4C5B-BE3D-A3FA03F223DD}"/>
     <dgm:cxn modelId="{AE793B27-3CDB-4E0B-B3E7-261288901B16}" type="presParOf" srcId="{7FD6EACB-80AA-4660-88F3-3F7E496F0178}" destId="{DE801391-6078-4642-A904-31F06D589410}" srcOrd="0" destOrd="0" presId="urn:microsoft.com/office/officeart/2005/8/layout/hList1"/>
     <dgm:cxn modelId="{79CAFD43-48E0-4224-9DDF-E43EDADF7415}" type="presParOf" srcId="{DE801391-6078-4642-A904-31F06D589410}" destId="{164972D1-934A-430E-8C24-4713175A720E}" srcOrd="0" destOrd="0" presId="urn:microsoft.com/office/officeart/2005/8/layout/hList1"/>
@@ -5961,13 +5905,6 @@
         </dgm:presLayoutVars>
       </dgm:prSet>
       <dgm:spPr/>
-      <dgm:t>
-        <a:bodyPr/>
-        <a:lstStyle/>
-        <a:p>
-          <a:endParaRPr lang="en-US"/>
-        </a:p>
-      </dgm:t>
     </dgm:pt>
     <dgm:pt modelId="{DE801391-6078-4642-A904-31F06D589410}" type="pres">
       <dgm:prSet presAssocID="{4F70F4CF-DD21-4008-B481-6BA6CFA8606F}" presName="composite" presStyleCnt="0"/>
@@ -5982,13 +5919,6 @@
         </dgm:presLayoutVars>
       </dgm:prSet>
       <dgm:spPr/>
-      <dgm:t>
-        <a:bodyPr/>
-        <a:lstStyle/>
-        <a:p>
-          <a:endParaRPr lang="en-US"/>
-        </a:p>
-      </dgm:t>
     </dgm:pt>
     <dgm:pt modelId="{C09B49A9-F287-466D-9FA8-2969A250D43B}" type="pres">
       <dgm:prSet presAssocID="{4F70F4CF-DD21-4008-B481-6BA6CFA8606F}" presName="desTx" presStyleLbl="alignAccFollowNode1" presStyleIdx="0" presStyleCnt="1">
@@ -6000,8 +5930,8 @@
     </dgm:pt>
   </dgm:ptLst>
   <dgm:cxnLst>
+    <dgm:cxn modelId="{FC1B8E0B-E31D-49F7-9332-4213C24337DB}" type="presOf" srcId="{4F70F4CF-DD21-4008-B481-6BA6CFA8606F}" destId="{164972D1-934A-430E-8C24-4713175A720E}" srcOrd="0" destOrd="0" presId="urn:microsoft.com/office/officeart/2005/8/layout/hList1"/>
     <dgm:cxn modelId="{0D15C02F-34DA-45EB-896A-D87CF4722274}" type="presOf" srcId="{63340D2B-A71D-43C4-97F7-17D296365ACA}" destId="{7FD6EACB-80AA-4660-88F3-3F7E496F0178}" srcOrd="0" destOrd="0" presId="urn:microsoft.com/office/officeart/2005/8/layout/hList1"/>
-    <dgm:cxn modelId="{FC1B8E0B-E31D-49F7-9332-4213C24337DB}" type="presOf" srcId="{4F70F4CF-DD21-4008-B481-6BA6CFA8606F}" destId="{164972D1-934A-430E-8C24-4713175A720E}" srcOrd="0" destOrd="0" presId="urn:microsoft.com/office/officeart/2005/8/layout/hList1"/>
     <dgm:cxn modelId="{3DDF73A3-C317-4EF4-9B97-ADDAFA89B7FC}" srcId="{63340D2B-A71D-43C4-97F7-17D296365ACA}" destId="{4F70F4CF-DD21-4008-B481-6BA6CFA8606F}" srcOrd="0" destOrd="0" parTransId="{A4D417E5-0CF4-443E-AFE1-7A8972450414}" sibTransId="{EF243263-BB19-4C5B-BE3D-A3FA03F223DD}"/>
     <dgm:cxn modelId="{AE793B27-3CDB-4E0B-B3E7-261288901B16}" type="presParOf" srcId="{7FD6EACB-80AA-4660-88F3-3F7E496F0178}" destId="{DE801391-6078-4642-A904-31F06D589410}" srcOrd="0" destOrd="0" presId="urn:microsoft.com/office/officeart/2005/8/layout/hList1"/>
     <dgm:cxn modelId="{79CAFD43-48E0-4224-9DDF-E43EDADF7415}" type="presParOf" srcId="{DE801391-6078-4642-A904-31F06D589410}" destId="{164972D1-934A-430E-8C24-4713175A720E}" srcOrd="0" destOrd="0" presId="urn:microsoft.com/office/officeart/2005/8/layout/hList1"/>
@@ -6172,13 +6102,6 @@
         </dgm:presLayoutVars>
       </dgm:prSet>
       <dgm:spPr/>
-      <dgm:t>
-        <a:bodyPr/>
-        <a:lstStyle/>
-        <a:p>
-          <a:endParaRPr lang="en-US"/>
-        </a:p>
-      </dgm:t>
     </dgm:pt>
     <dgm:pt modelId="{282CA635-6EE6-494C-8CC6-699D6DDFF9DA}" type="pres">
       <dgm:prSet presAssocID="{D5738C20-078A-48AF-A045-054B8E1D6576}" presName="composite" presStyleCnt="0"/>
@@ -6194,7 +6117,7 @@
                 <a14:useLocalDpi xmlns:a14="http://schemas.microsoft.com/office/drawing/2010/main" val="0"/>
               </a:ext>
               <a:ext uri="{96DAC541-7B7A-43D3-8B79-37D633B846F1}">
-                <asvg:svgBlip xmlns:asvg="http://schemas.microsoft.com/office/drawing/2016/SVG/main" xmlns="" r:embed="rId2"/>
+                <asvg:svgBlip xmlns:asvg="http://schemas.microsoft.com/office/drawing/2016/SVG/main" r:embed="rId2"/>
               </a:ext>
             </a:extLst>
           </a:blip>
@@ -6217,13 +6140,6 @@
         </dgm:presLayoutVars>
       </dgm:prSet>
       <dgm:spPr/>
-      <dgm:t>
-        <a:bodyPr/>
-        <a:lstStyle/>
-        <a:p>
-          <a:endParaRPr lang="en-US"/>
-        </a:p>
-      </dgm:t>
     </dgm:pt>
     <dgm:pt modelId="{E45F0CAF-F383-4B73-AAE3-81F18FEE4EBF}" type="pres">
       <dgm:prSet presAssocID="{DB544F9A-5BE0-493E-9B53-38B1FC1F384A}" presName="spacing" presStyleCnt="0"/>
@@ -6243,7 +6159,7 @@
                 <a14:useLocalDpi xmlns:a14="http://schemas.microsoft.com/office/drawing/2010/main" val="0"/>
               </a:ext>
               <a:ext uri="{96DAC541-7B7A-43D3-8B79-37D633B846F1}">
-                <asvg:svgBlip xmlns:asvg="http://schemas.microsoft.com/office/drawing/2016/SVG/main" xmlns="" r:embed="rId4"/>
+                <asvg:svgBlip xmlns:asvg="http://schemas.microsoft.com/office/drawing/2016/SVG/main" r:embed="rId4"/>
               </a:ext>
             </a:extLst>
           </a:blip>
@@ -6266,13 +6182,6 @@
         </dgm:presLayoutVars>
       </dgm:prSet>
       <dgm:spPr/>
-      <dgm:t>
-        <a:bodyPr/>
-        <a:lstStyle/>
-        <a:p>
-          <a:endParaRPr lang="en-US"/>
-        </a:p>
-      </dgm:t>
     </dgm:pt>
     <dgm:pt modelId="{5917E6C0-058E-4B17-9B02-9FF76115D1D3}" type="pres">
       <dgm:prSet presAssocID="{DD82199A-8863-4D21-825B-E5558FE29B39}" presName="spacing" presStyleCnt="0"/>
@@ -6292,7 +6201,7 @@
                 <a14:useLocalDpi xmlns:a14="http://schemas.microsoft.com/office/drawing/2010/main" val="0"/>
               </a:ext>
               <a:ext uri="{96DAC541-7B7A-43D3-8B79-37D633B846F1}">
-                <asvg:svgBlip xmlns:asvg="http://schemas.microsoft.com/office/drawing/2016/SVG/main" xmlns="" r:embed="rId6"/>
+                <asvg:svgBlip xmlns:asvg="http://schemas.microsoft.com/office/drawing/2016/SVG/main" r:embed="rId6"/>
               </a:ext>
             </a:extLst>
           </a:blip>
@@ -6315,23 +6224,16 @@
         </dgm:presLayoutVars>
       </dgm:prSet>
       <dgm:spPr/>
-      <dgm:t>
-        <a:bodyPr/>
-        <a:lstStyle/>
-        <a:p>
-          <a:endParaRPr lang="en-US"/>
-        </a:p>
-      </dgm:t>
     </dgm:pt>
   </dgm:ptLst>
   <dgm:cxnLst>
+    <dgm:cxn modelId="{4F0B0D10-263E-41DA-B164-772269D287BA}" type="presOf" srcId="{D5738C20-078A-48AF-A045-054B8E1D6576}" destId="{770B2953-B491-4338-B50F-8D7E3F6AAACC}" srcOrd="0" destOrd="0" presId="urn:microsoft.com/office/officeart/2005/8/layout/vList3"/>
+    <dgm:cxn modelId="{39CD8076-7A10-418A-B66F-897A70885471}" type="presOf" srcId="{BDD61187-DCB8-4B26-8519-38A709864AF1}" destId="{468BC5A6-9E8D-46ED-B5FF-466F99C09528}" srcOrd="0" destOrd="0" presId="urn:microsoft.com/office/officeart/2005/8/layout/vList3"/>
+    <dgm:cxn modelId="{01DD7FCA-7DFF-4A5C-80F7-1A0EE33B4D8D}" type="presOf" srcId="{7384358E-E16B-43AE-8BD7-9F4EB411F319}" destId="{F915090A-59BE-453A-8B52-DEAD801EFC00}" srcOrd="0" destOrd="0" presId="urn:microsoft.com/office/officeart/2005/8/layout/vList3"/>
+    <dgm:cxn modelId="{951BACCF-E8D6-479D-87C4-6E99A5F70DE9}" srcId="{0D4448CC-3C1B-475A-B0F8-BFB183F71789}" destId="{BDD61187-DCB8-4B26-8519-38A709864AF1}" srcOrd="2" destOrd="0" parTransId="{E974A127-D791-488C-8754-AF01339E378E}" sibTransId="{A60849C7-0ED6-4D5A-BB3A-1BE7957DF24F}"/>
+    <dgm:cxn modelId="{2607E0DB-82D7-445C-9811-CE3A03A26A38}" srcId="{0D4448CC-3C1B-475A-B0F8-BFB183F71789}" destId="{D5738C20-078A-48AF-A045-054B8E1D6576}" srcOrd="0" destOrd="0" parTransId="{B546451D-13D7-44A6-A130-73EFEA1A6607}" sibTransId="{DB544F9A-5BE0-493E-9B53-38B1FC1F384A}"/>
+    <dgm:cxn modelId="{C74FA3EF-2D99-4D79-8283-34EE384065F7}" type="presOf" srcId="{0D4448CC-3C1B-475A-B0F8-BFB183F71789}" destId="{F8AD8AFE-8B45-4E8E-A689-D288E96579A3}" srcOrd="0" destOrd="0" presId="urn:microsoft.com/office/officeart/2005/8/layout/vList3"/>
     <dgm:cxn modelId="{15D27BFD-3A54-4390-9BD1-9FCF5448D562}" srcId="{0D4448CC-3C1B-475A-B0F8-BFB183F71789}" destId="{7384358E-E16B-43AE-8BD7-9F4EB411F319}" srcOrd="1" destOrd="0" parTransId="{D3592DA5-7B29-4CA0-A94A-44ED08AF1FC3}" sibTransId="{DD82199A-8863-4D21-825B-E5558FE29B39}"/>
-    <dgm:cxn modelId="{39CD8076-7A10-418A-B66F-897A70885471}" type="presOf" srcId="{BDD61187-DCB8-4B26-8519-38A709864AF1}" destId="{468BC5A6-9E8D-46ED-B5FF-466F99C09528}" srcOrd="0" destOrd="0" presId="urn:microsoft.com/office/officeart/2005/8/layout/vList3"/>
-    <dgm:cxn modelId="{2607E0DB-82D7-445C-9811-CE3A03A26A38}" srcId="{0D4448CC-3C1B-475A-B0F8-BFB183F71789}" destId="{D5738C20-078A-48AF-A045-054B8E1D6576}" srcOrd="0" destOrd="0" parTransId="{B546451D-13D7-44A6-A130-73EFEA1A6607}" sibTransId="{DB544F9A-5BE0-493E-9B53-38B1FC1F384A}"/>
-    <dgm:cxn modelId="{4F0B0D10-263E-41DA-B164-772269D287BA}" type="presOf" srcId="{D5738C20-078A-48AF-A045-054B8E1D6576}" destId="{770B2953-B491-4338-B50F-8D7E3F6AAACC}" srcOrd="0" destOrd="0" presId="urn:microsoft.com/office/officeart/2005/8/layout/vList3"/>
-    <dgm:cxn modelId="{01DD7FCA-7DFF-4A5C-80F7-1A0EE33B4D8D}" type="presOf" srcId="{7384358E-E16B-43AE-8BD7-9F4EB411F319}" destId="{F915090A-59BE-453A-8B52-DEAD801EFC00}" srcOrd="0" destOrd="0" presId="urn:microsoft.com/office/officeart/2005/8/layout/vList3"/>
-    <dgm:cxn modelId="{C74FA3EF-2D99-4D79-8283-34EE384065F7}" type="presOf" srcId="{0D4448CC-3C1B-475A-B0F8-BFB183F71789}" destId="{F8AD8AFE-8B45-4E8E-A689-D288E96579A3}" srcOrd="0" destOrd="0" presId="urn:microsoft.com/office/officeart/2005/8/layout/vList3"/>
-    <dgm:cxn modelId="{951BACCF-E8D6-479D-87C4-6E99A5F70DE9}" srcId="{0D4448CC-3C1B-475A-B0F8-BFB183F71789}" destId="{BDD61187-DCB8-4B26-8519-38A709864AF1}" srcOrd="2" destOrd="0" parTransId="{E974A127-D791-488C-8754-AF01339E378E}" sibTransId="{A60849C7-0ED6-4D5A-BB3A-1BE7957DF24F}"/>
     <dgm:cxn modelId="{B918EB34-D78A-44C9-B174-89B7E1963D21}" type="presParOf" srcId="{F8AD8AFE-8B45-4E8E-A689-D288E96579A3}" destId="{282CA635-6EE6-494C-8CC6-699D6DDFF9DA}" srcOrd="0" destOrd="0" presId="urn:microsoft.com/office/officeart/2005/8/layout/vList3"/>
     <dgm:cxn modelId="{974DADB0-3DBB-407D-97E3-0C86278FB964}" type="presParOf" srcId="{282CA635-6EE6-494C-8CC6-699D6DDFF9DA}" destId="{E0FEEB1E-D410-4E1A-A309-EC053A7C2101}" srcOrd="0" destOrd="0" presId="urn:microsoft.com/office/officeart/2005/8/layout/vList3"/>
     <dgm:cxn modelId="{CFE056F6-9806-4A6B-A172-88E152466C6E}" type="presParOf" srcId="{282CA635-6EE6-494C-8CC6-699D6DDFF9DA}" destId="{770B2953-B491-4338-B50F-8D7E3F6AAACC}" srcOrd="1" destOrd="0" presId="urn:microsoft.com/office/officeart/2005/8/layout/vList3"/>
@@ -6414,13 +6316,6 @@
         </dgm:presLayoutVars>
       </dgm:prSet>
       <dgm:spPr/>
-      <dgm:t>
-        <a:bodyPr/>
-        <a:lstStyle/>
-        <a:p>
-          <a:endParaRPr lang="en-US"/>
-        </a:p>
-      </dgm:t>
     </dgm:pt>
     <dgm:pt modelId="{C3375C94-53B5-4709-ACB6-7EB8DCBBC6E4}" type="pres">
       <dgm:prSet presAssocID="{98112BB7-05EE-4D64-A617-C6DFF9B3C9A2}" presName="composite" presStyleCnt="0"/>
@@ -6435,13 +6330,6 @@
         </dgm:presLayoutVars>
       </dgm:prSet>
       <dgm:spPr/>
-      <dgm:t>
-        <a:bodyPr/>
-        <a:lstStyle/>
-        <a:p>
-          <a:endParaRPr lang="en-US"/>
-        </a:p>
-      </dgm:t>
     </dgm:pt>
     <dgm:pt modelId="{3C2515C0-51EE-43F7-B816-E9E9B76C7F4D}" type="pres">
       <dgm:prSet presAssocID="{98112BB7-05EE-4D64-A617-C6DFF9B3C9A2}" presName="Image" presStyleLbl="bgImgPlace1" presStyleIdx="0" presStyleCnt="1"/>
@@ -6560,13 +6448,6 @@
         </dgm:presLayoutVars>
       </dgm:prSet>
       <dgm:spPr/>
-      <dgm:t>
-        <a:bodyPr/>
-        <a:lstStyle/>
-        <a:p>
-          <a:endParaRPr lang="en-US"/>
-        </a:p>
-      </dgm:t>
     </dgm:pt>
     <dgm:pt modelId="{C3375C94-53B5-4709-ACB6-7EB8DCBBC6E4}" type="pres">
       <dgm:prSet presAssocID="{98112BB7-05EE-4D64-A617-C6DFF9B3C9A2}" presName="composite" presStyleCnt="0"/>
@@ -6581,13 +6462,6 @@
         </dgm:presLayoutVars>
       </dgm:prSet>
       <dgm:spPr/>
-      <dgm:t>
-        <a:bodyPr/>
-        <a:lstStyle/>
-        <a:p>
-          <a:endParaRPr lang="en-US"/>
-        </a:p>
-      </dgm:t>
     </dgm:pt>
     <dgm:pt modelId="{3C2515C0-51EE-43F7-B816-E9E9B76C7F4D}" type="pres">
       <dgm:prSet presAssocID="{98112BB7-05EE-4D64-A617-C6DFF9B3C9A2}" presName="Image" presStyleLbl="bgImgPlace1" presStyleIdx="0" presStyleCnt="1"/>
@@ -6700,7 +6574,7 @@
         </a:bodyPr>
         <a:lstStyle/>
         <a:p>
-          <a:pPr lvl="0" algn="ctr" defTabSz="800100">
+          <a:pPr marL="0" lvl="0" indent="0" algn="ctr" defTabSz="800100">
             <a:lnSpc>
               <a:spcPct val="90000"/>
             </a:lnSpc>
@@ -6710,6 +6584,7 @@
             <a:spcAft>
               <a:spcPct val="35000"/>
             </a:spcAft>
+            <a:buNone/>
           </a:pPr>
           <a:r>
             <a:rPr lang="de-CH" sz="1800" b="1" kern="1200" dirty="0"/>
@@ -6839,7 +6714,7 @@
         </a:bodyPr>
         <a:lstStyle/>
         <a:p>
-          <a:pPr lvl="0" algn="ctr" defTabSz="800100">
+          <a:pPr marL="0" lvl="0" indent="0" algn="ctr" defTabSz="800100">
             <a:lnSpc>
               <a:spcPct val="90000"/>
             </a:lnSpc>
@@ -6849,6 +6724,7 @@
             <a:spcAft>
               <a:spcPct val="35000"/>
             </a:spcAft>
+            <a:buNone/>
           </a:pPr>
           <a:r>
             <a:rPr lang="de-CH" sz="1800" b="1" kern="1200" dirty="0"/>
@@ -6978,7 +6854,7 @@
         </a:bodyPr>
         <a:lstStyle/>
         <a:p>
-          <a:pPr lvl="0" algn="ctr" defTabSz="577850">
+          <a:pPr marL="0" lvl="0" indent="0" algn="ctr" defTabSz="577850">
             <a:lnSpc>
               <a:spcPct val="90000"/>
             </a:lnSpc>
@@ -6988,6 +6864,7 @@
             <a:spcAft>
               <a:spcPct val="35000"/>
             </a:spcAft>
+            <a:buNone/>
           </a:pPr>
           <a:r>
             <a:rPr lang="de-CH" sz="1300" b="1" kern="1200" dirty="0"/>
@@ -7122,7 +6999,7 @@
         </a:bodyPr>
         <a:lstStyle/>
         <a:p>
-          <a:pPr lvl="0" algn="ctr" defTabSz="577850">
+          <a:pPr marL="0" lvl="0" indent="0" algn="ctr" defTabSz="577850">
             <a:lnSpc>
               <a:spcPct val="90000"/>
             </a:lnSpc>
@@ -7132,6 +7009,7 @@
             <a:spcAft>
               <a:spcPct val="35000"/>
             </a:spcAft>
+            <a:buNone/>
           </a:pPr>
           <a:r>
             <a:rPr lang="de-CH" sz="1300" b="1" kern="1200" dirty="0"/>
@@ -7262,7 +7140,7 @@
         </a:bodyPr>
         <a:lstStyle/>
         <a:p>
-          <a:pPr lvl="0" algn="l" defTabSz="1289050">
+          <a:pPr marL="0" lvl="0" indent="0" algn="l" defTabSz="1289050">
             <a:lnSpc>
               <a:spcPct val="90000"/>
             </a:lnSpc>
@@ -7272,6 +7150,7 @@
             <a:spcAft>
               <a:spcPct val="35000"/>
             </a:spcAft>
+            <a:buNone/>
           </a:pPr>
           <a:r>
             <a:rPr lang="de-CH" sz="2900" kern="1200" dirty="0"/>
@@ -7284,7 +7163,7 @@
           <a:endParaRPr lang="de-CH" sz="2900" kern="1200" dirty="0"/>
         </a:p>
         <a:p>
-          <a:pPr lvl="0" algn="ctr" defTabSz="1289050">
+          <a:pPr marL="0" lvl="0" indent="0" algn="ctr" defTabSz="1289050">
             <a:lnSpc>
               <a:spcPct val="90000"/>
             </a:lnSpc>
@@ -7294,6 +7173,7 @@
             <a:spcAft>
               <a:spcPct val="35000"/>
             </a:spcAft>
+            <a:buNone/>
           </a:pPr>
           <a:endParaRPr lang="de-CH" sz="2900" kern="1200" dirty="0"/>
         </a:p>
@@ -7323,7 +7203,7 @@
                 <a14:useLocalDpi xmlns:a14="http://schemas.microsoft.com/office/drawing/2010/main" val="0"/>
               </a:ext>
               <a:ext uri="{96DAC541-7B7A-43D3-8B79-37D633B846F1}">
-                <asvg:svgBlip xmlns:asvg="http://schemas.microsoft.com/office/drawing/2016/SVG/main" xmlns="" r:embed="rId2"/>
+                <asvg:svgBlip xmlns:asvg="http://schemas.microsoft.com/office/drawing/2016/SVG/main" r:embed="rId2"/>
               </a:ext>
             </a:extLst>
           </a:blip>
@@ -7414,7 +7294,7 @@
         </a:bodyPr>
         <a:lstStyle/>
         <a:p>
-          <a:pPr lvl="0" algn="l" defTabSz="1289050">
+          <a:pPr marL="0" lvl="0" indent="0" algn="l" defTabSz="1289050">
             <a:lnSpc>
               <a:spcPct val="90000"/>
             </a:lnSpc>
@@ -7424,6 +7304,7 @@
             <a:spcAft>
               <a:spcPct val="35000"/>
             </a:spcAft>
+            <a:buNone/>
           </a:pPr>
           <a:r>
             <a:rPr lang="de-CH" sz="2900" kern="1200" dirty="0"/>
@@ -7431,7 +7312,7 @@
           </a:r>
         </a:p>
         <a:p>
-          <a:pPr lvl="0" algn="l" defTabSz="1289050">
+          <a:pPr marL="0" lvl="0" indent="0" algn="l" defTabSz="1289050">
             <a:lnSpc>
               <a:spcPct val="90000"/>
             </a:lnSpc>
@@ -7441,6 +7322,7 @@
             <a:spcAft>
               <a:spcPct val="35000"/>
             </a:spcAft>
+            <a:buNone/>
           </a:pPr>
           <a:endParaRPr lang="de-CH" sz="2900" kern="1200" dirty="0"/>
         </a:p>
@@ -7470,7 +7352,7 @@
                 <a14:useLocalDpi xmlns:a14="http://schemas.microsoft.com/office/drawing/2010/main" val="0"/>
               </a:ext>
               <a:ext uri="{96DAC541-7B7A-43D3-8B79-37D633B846F1}">
-                <asvg:svgBlip xmlns:asvg="http://schemas.microsoft.com/office/drawing/2016/SVG/main" xmlns="" r:embed="rId4"/>
+                <asvg:svgBlip xmlns:asvg="http://schemas.microsoft.com/office/drawing/2016/SVG/main" r:embed="rId4"/>
               </a:ext>
             </a:extLst>
           </a:blip>
@@ -7561,7 +7443,7 @@
         </a:bodyPr>
         <a:lstStyle/>
         <a:p>
-          <a:pPr lvl="0" algn="l" defTabSz="1289050">
+          <a:pPr marL="0" lvl="0" indent="0" algn="l" defTabSz="1289050">
             <a:lnSpc>
               <a:spcPct val="90000"/>
             </a:lnSpc>
@@ -7571,6 +7453,7 @@
             <a:spcAft>
               <a:spcPct val="35000"/>
             </a:spcAft>
+            <a:buNone/>
           </a:pPr>
           <a:r>
             <a:rPr lang="de-CH" sz="2900" kern="1200" dirty="0"/>
@@ -7583,7 +7466,7 @@
           <a:endParaRPr lang="de-CH" sz="2900" kern="1200" dirty="0"/>
         </a:p>
         <a:p>
-          <a:pPr lvl="0" algn="l" defTabSz="1289050">
+          <a:pPr marL="0" lvl="0" indent="0" algn="l" defTabSz="1289050">
             <a:lnSpc>
               <a:spcPct val="90000"/>
             </a:lnSpc>
@@ -7593,6 +7476,7 @@
             <a:spcAft>
               <a:spcPct val="35000"/>
             </a:spcAft>
+            <a:buNone/>
           </a:pPr>
           <a:endParaRPr lang="de-CH" sz="2900" kern="1200" dirty="0"/>
         </a:p>
@@ -7622,7 +7506,7 @@
                 <a14:useLocalDpi xmlns:a14="http://schemas.microsoft.com/office/drawing/2010/main" val="0"/>
               </a:ext>
               <a:ext uri="{96DAC541-7B7A-43D3-8B79-37D633B846F1}">
-                <asvg:svgBlip xmlns:asvg="http://schemas.microsoft.com/office/drawing/2016/SVG/main" xmlns="" r:embed="rId6"/>
+                <asvg:svgBlip xmlns:asvg="http://schemas.microsoft.com/office/drawing/2016/SVG/main" r:embed="rId6"/>
               </a:ext>
             </a:extLst>
           </a:blip>
@@ -7771,7 +7655,7 @@
         </a:bodyPr>
         <a:lstStyle/>
         <a:p>
-          <a:pPr lvl="0" algn="ctr" defTabSz="533400">
+          <a:pPr marL="0" lvl="0" indent="0" algn="ctr" defTabSz="533400">
             <a:lnSpc>
               <a:spcPct val="90000"/>
             </a:lnSpc>
@@ -7781,6 +7665,7 @@
             <a:spcAft>
               <a:spcPct val="35000"/>
             </a:spcAft>
+            <a:buNone/>
           </a:pPr>
           <a:r>
             <a:rPr lang="de-CH" sz="1200" kern="1200" dirty="0"/>
@@ -7897,7 +7782,7 @@
         </a:bodyPr>
         <a:lstStyle/>
         <a:p>
-          <a:pPr lvl="0" algn="ctr" defTabSz="533400">
+          <a:pPr marL="0" lvl="0" indent="0" algn="ctr" defTabSz="533400">
             <a:lnSpc>
               <a:spcPct val="90000"/>
             </a:lnSpc>
@@ -7907,6 +7792,7 @@
             <a:spcAft>
               <a:spcPct val="35000"/>
             </a:spcAft>
+            <a:buNone/>
           </a:pPr>
           <a:r>
             <a:rPr lang="de-CH" sz="1200" kern="1200" dirty="0"/>
@@ -16846,7 +16732,7 @@
             <a:fld id="{1766B9EA-E083-A94D-96A5-C5476B884CFE}" type="datetime1">
               <a:rPr lang="en-US"/>
               <a:pPr/>
-              <a:t>4/21/2020</a:t>
+              <a:t>4/25/2020</a:t>
             </a:fld>
             <a:endParaRPr lang="en-US"/>
           </a:p>
@@ -16923,7 +16809,7 @@
             <a:fld id="{B97C6CC3-1B99-CC41-8C4F-FD94DC1E3784}" type="slidenum">
               <a:rPr lang="en-US"/>
               <a:pPr/>
-              <a:t>‹#›</a:t>
+              <a:t>‹Nr.›</a:t>
             </a:fld>
             <a:endParaRPr lang="en-US"/>
           </a:p>
@@ -17037,7 +16923,7 @@
             <a:fld id="{3598794E-35F3-8D48-B244-F21DA91EADA9}" type="datetime1">
               <a:rPr lang="en-US"/>
               <a:pPr/>
-              <a:t>4/21/2020</a:t>
+              <a:t>4/25/2020</a:t>
             </a:fld>
             <a:endParaRPr lang="en-US"/>
           </a:p>
@@ -17210,7 +17096,7 @@
             <a:fld id="{2A9D45BF-071E-7C44-BE90-B011D0240A3E}" type="slidenum">
               <a:rPr lang="en-US"/>
               <a:pPr/>
-              <a:t>‹#›</a:t>
+              <a:t>‹Nr.›</a:t>
             </a:fld>
             <a:endParaRPr lang="en-US"/>
           </a:p>
@@ -21663,7 +21549,7 @@
                 <a:latin typeface="Neutraface Text Bold" charset="0"/>
               </a:rPr>
               <a:pPr algn="r" eaLnBrk="1" hangingPunct="1"/>
-              <a:t>‹#›</a:t>
+              <a:t>‹Nr.›</a:t>
             </a:fld>
             <a:endParaRPr lang="en-US" sz="2800" b="1">
               <a:solidFill>
@@ -23059,7 +22945,7 @@
     <p:sldLayoutId id="2147483988" r:id="rId12"/>
   </p:sldLayoutIdLst>
   <p:transition/>
-  <p:hf sldNum="0" hdr="0" ftr="0"/>
+  <p:hf hdr="0" ftr="0" dt="0"/>
   <p:txStyles>
     <p:titleStyle>
       <a:lvl1pPr marL="39688" indent="-39688" algn="l" rtl="0" eaLnBrk="1" fontAlgn="base" hangingPunct="1">
@@ -23777,7 +23663,7 @@
         </p:nvSpPr>
         <p:spPr bwMode="auto">
           <a:xfrm>
-            <a:off x="524508" y="2018251"/>
+            <a:off x="619125" y="2408238"/>
             <a:ext cx="8648700" cy="660400"/>
           </a:xfrm>
           <a:noFill/>
@@ -23810,25 +23696,17 @@
           <a:lstStyle/>
           <a:p>
             <a:r>
-              <a:rPr lang="de-CH" sz="6600" dirty="0">
-                <a:latin typeface="Berlin Sans FB" panose="020E0602020502020306" pitchFamily="34" charset="0"/>
+              <a:rPr lang="de-CH" dirty="0">
+                <a:latin typeface="Source Sans Pro Semibold" charset="0"/>
                 <a:ea typeface="ヒラギノ角ゴ ProN W3" charset="0"/>
-                <a:cs typeface="Arial" panose="020B0604020202020204" pitchFamily="34" charset="0"/>
+                <a:cs typeface="Source Sans Pro Semibold" charset="0"/>
               </a:rPr>
-              <a:t>Visual </a:t>
-            </a:r>
-            <a:r>
-              <a:rPr lang="de-CH" sz="6600" dirty="0" smtClean="0">
-                <a:latin typeface="Berlin Sans FB" panose="020E0602020502020306" pitchFamily="34" charset="0"/>
-                <a:ea typeface="ヒラギノ角ゴ ProN W3" charset="0"/>
-                <a:cs typeface="Arial" panose="020B0604020202020204" pitchFamily="34" charset="0"/>
-              </a:rPr>
-              <a:t>Listening</a:t>
-            </a:r>
-            <a:endParaRPr lang="de-DE" sz="6600" dirty="0">
-              <a:latin typeface="Berlin Sans FB" panose="020E0602020502020306" pitchFamily="34" charset="0"/>
+              <a:t>Visual Listening In</a:t>
+            </a:r>
+            <a:endParaRPr lang="de-DE" dirty="0">
+              <a:latin typeface="Source Sans Pro Semibold" charset="0"/>
               <a:ea typeface="ヒラギノ角ゴ ProN W3" charset="0"/>
-              <a:cs typeface="Arial" panose="020B0604020202020204" pitchFamily="34" charset="0"/>
+              <a:cs typeface="Source Sans Pro Semibold" charset="0"/>
             </a:endParaRPr>
           </a:p>
         </p:txBody>
@@ -24062,21 +23940,8 @@
                 <a:ea typeface="ヒラギノ角ゴ ProN W3" charset="0"/>
                 <a:cs typeface="Source Sans Pro Light" charset="0"/>
               </a:rPr>
-              <a:t> </a:t>
-            </a:r>
-            <a:r>
-              <a:rPr lang="de-CH" dirty="0" err="1" smtClean="0">
-                <a:latin typeface="Source Sans Pro Light" charset="0"/>
-                <a:ea typeface="ヒラギノ角ゴ ProN W3" charset="0"/>
-                <a:cs typeface="Source Sans Pro Light" charset="0"/>
-              </a:rPr>
-              <a:t>Marketers</a:t>
-            </a:r>
-            <a:endParaRPr lang="de-CH" dirty="0">
-              <a:latin typeface="Source Sans Pro Light" charset="0"/>
-              <a:ea typeface="ヒラギノ角ゴ ProN W3" charset="0"/>
-              <a:cs typeface="Source Sans Pro Light" charset="0"/>
-            </a:endParaRPr>
+              <a:t> Marketer</a:t>
+            </a:r>
           </a:p>
           <a:p>
             <a:pPr>
@@ -24087,12 +23952,12 @@
               </a:tabLst>
             </a:pPr>
             <a:r>
-              <a:rPr lang="de-CH" dirty="0" smtClean="0">
+              <a:rPr lang="de-CH" dirty="0">
                 <a:latin typeface="Source Sans Pro Light" charset="0"/>
                 <a:ea typeface="ヒラギノ角ゴ ProN W3" charset="0"/>
                 <a:cs typeface="Source Sans Pro Light" charset="0"/>
               </a:rPr>
-              <a:t>Design </a:t>
+              <a:t>Description </a:t>
             </a:r>
             <a:r>
               <a:rPr lang="de-CH" dirty="0" err="1">
@@ -24124,29 +23989,8 @@
                 <a:ea typeface="ヒラギノ角ゴ ProN W3" charset="0"/>
                 <a:cs typeface="Source Sans Pro Light" charset="0"/>
               </a:rPr>
-              <a:t> Deep Learning </a:t>
-            </a:r>
-            <a:r>
-              <a:rPr lang="de-CH" dirty="0" smtClean="0">
-                <a:latin typeface="Source Sans Pro Light" charset="0"/>
-                <a:ea typeface="ヒラギノ角ゴ ProN W3" charset="0"/>
-                <a:cs typeface="Source Sans Pro Light" charset="0"/>
-              </a:rPr>
-              <a:t>Model </a:t>
-            </a:r>
-            <a:r>
-              <a:rPr lang="de-CH" dirty="0" err="1" smtClean="0">
-                <a:latin typeface="Source Sans Pro Light" charset="0"/>
-                <a:ea typeface="ヒラギノ角ゴ ProN W3" charset="0"/>
-                <a:cs typeface="Source Sans Pro Light" charset="0"/>
-              </a:rPr>
-              <a:t>Architecture</a:t>
-            </a:r>
-            <a:endParaRPr lang="de-CH" dirty="0">
-              <a:latin typeface="Source Sans Pro Light" charset="0"/>
-              <a:ea typeface="ヒラギノ角ゴ ProN W3" charset="0"/>
-              <a:cs typeface="Source Sans Pro Light" charset="0"/>
-            </a:endParaRPr>
+              <a:t> Deep Learning Model</a:t>
+            </a:r>
           </a:p>
           <a:p>
             <a:pPr>
@@ -24202,23 +24046,7 @@
                 <a:ea typeface="ヒラギノ角ゴ ProN W3" charset="0"/>
                 <a:cs typeface="Source Sans Pro Light" charset="0"/>
               </a:rPr>
-              <a:t> on </a:t>
-            </a:r>
-            <a:r>
-              <a:rPr lang="de-CH" dirty="0" smtClean="0">
-                <a:latin typeface="Source Sans Pro Light" charset="0"/>
-                <a:ea typeface="ヒラギノ角ゴ ProN W3" charset="0"/>
-                <a:cs typeface="Source Sans Pro Light" charset="0"/>
-              </a:rPr>
-              <a:t>a Web </a:t>
-            </a:r>
-            <a:r>
-              <a:rPr lang="de-CH" dirty="0">
-                <a:latin typeface="Source Sans Pro Light" charset="0"/>
-                <a:ea typeface="ヒラギノ角ゴ ProN W3" charset="0"/>
-                <a:cs typeface="Source Sans Pro Light" charset="0"/>
-              </a:rPr>
-              <a:t>App</a:t>
+              <a:t> on Web App</a:t>
             </a:r>
           </a:p>
           <a:p>
@@ -24441,18 +24269,7 @@
                 <a:ea typeface="ヒラギノ角ゴ ProN W3" charset="0"/>
                 <a:cs typeface="Source Sans Pro Light" charset="0"/>
               </a:rPr>
-              <a:t> Marketing? | Visual </a:t>
-            </a:r>
-            <a:r>
-              <a:rPr lang="de-DE" dirty="0" smtClean="0">
-                <a:solidFill>
-                  <a:srgbClr val="D9D9D9"/>
-                </a:solidFill>
-                <a:latin typeface="Source Sans Pro Light" charset="0"/>
-                <a:ea typeface="ヒラギノ角ゴ ProN W3" charset="0"/>
-                <a:cs typeface="Source Sans Pro Light" charset="0"/>
-              </a:rPr>
-              <a:t>Listening</a:t>
+              <a:t> Marketing? | Visual Listening In</a:t>
             </a:r>
             <a:endParaRPr lang="de-DE" b="1" dirty="0">
               <a:solidFill>
@@ -25053,7 +24870,7 @@
           <a:blip r:embed="rId23">
             <a:extLst>
               <a:ext uri="{96DAC541-7B7A-43D3-8B79-37D633B846F1}">
-                <asvg:svgBlip xmlns:asvg="http://schemas.microsoft.com/office/drawing/2016/SVG/main" xmlns="" r:embed="rId24"/>
+                <asvg:svgBlip xmlns:asvg="http://schemas.microsoft.com/office/drawing/2016/SVG/main" r:embed="rId24"/>
               </a:ext>
             </a:extLst>
           </a:blip>
@@ -25089,7 +24906,7 @@
           <a:blip r:embed="rId23">
             <a:extLst>
               <a:ext uri="{96DAC541-7B7A-43D3-8B79-37D633B846F1}">
-                <asvg:svgBlip xmlns:asvg="http://schemas.microsoft.com/office/drawing/2016/SVG/main" xmlns="" r:embed="rId24"/>
+                <asvg:svgBlip xmlns:asvg="http://schemas.microsoft.com/office/drawing/2016/SVG/main" r:embed="rId24"/>
               </a:ext>
             </a:extLst>
           </a:blip>
@@ -25125,7 +24942,7 @@
           <a:blip r:embed="rId25">
             <a:extLst>
               <a:ext uri="{96DAC541-7B7A-43D3-8B79-37D633B846F1}">
-                <asvg:svgBlip xmlns:asvg="http://schemas.microsoft.com/office/drawing/2016/SVG/main" xmlns="" r:embed="rId26"/>
+                <asvg:svgBlip xmlns:asvg="http://schemas.microsoft.com/office/drawing/2016/SVG/main" r:embed="rId26"/>
               </a:ext>
             </a:extLst>
           </a:blip>
@@ -25161,7 +24978,7 @@
           <a:blip r:embed="rId27">
             <a:extLst>
               <a:ext uri="{96DAC541-7B7A-43D3-8B79-37D633B846F1}">
-                <asvg:svgBlip xmlns:asvg="http://schemas.microsoft.com/office/drawing/2016/SVG/main" xmlns="" r:embed="rId28"/>
+                <asvg:svgBlip xmlns:asvg="http://schemas.microsoft.com/office/drawing/2016/SVG/main" r:embed="rId28"/>
               </a:ext>
             </a:extLst>
           </a:blip>
@@ -25197,7 +25014,7 @@
           <a:blip r:embed="rId29">
             <a:extLst>
               <a:ext uri="{96DAC541-7B7A-43D3-8B79-37D633B846F1}">
-                <asvg:svgBlip xmlns:asvg="http://schemas.microsoft.com/office/drawing/2016/SVG/main" xmlns="" r:embed="rId30"/>
+                <asvg:svgBlip xmlns:asvg="http://schemas.microsoft.com/office/drawing/2016/SVG/main" r:embed="rId30"/>
               </a:ext>
             </a:extLst>
           </a:blip>
@@ -25233,7 +25050,7 @@
           <a:blip r:embed="rId31">
             <a:extLst>
               <a:ext uri="{96DAC541-7B7A-43D3-8B79-37D633B846F1}">
-                <asvg:svgBlip xmlns:asvg="http://schemas.microsoft.com/office/drawing/2016/SVG/main" xmlns="" r:embed="rId32"/>
+                <asvg:svgBlip xmlns:asvg="http://schemas.microsoft.com/office/drawing/2016/SVG/main" r:embed="rId32"/>
               </a:ext>
             </a:extLst>
           </a:blip>
@@ -25831,7 +25648,7 @@
           <a:blip r:embed="rId33">
             <a:extLst>
               <a:ext uri="{96DAC541-7B7A-43D3-8B79-37D633B846F1}">
-                <asvg:svgBlip xmlns:asvg="http://schemas.microsoft.com/office/drawing/2016/SVG/main" xmlns="" r:embed="rId34"/>
+                <asvg:svgBlip xmlns:asvg="http://schemas.microsoft.com/office/drawing/2016/SVG/main" r:embed="rId34"/>
               </a:ext>
             </a:extLst>
           </a:blip>
@@ -27877,10 +27694,10 @@
       </p:sp>
       <p:sp>
         <p:nvSpPr>
-          <p:cNvPr id="3" name="Ellipse 2">
+          <p:cNvPr id="5" name="Rechteck 4">
             <a:extLst>
               <a:ext uri="{FF2B5EF4-FFF2-40B4-BE49-F238E27FC236}">
-                <a16:creationId xmlns:a16="http://schemas.microsoft.com/office/drawing/2014/main" id="{4F80C483-48AB-4EA8-AB0C-E7C62C20B48C}"/>
+                <a16:creationId xmlns:a16="http://schemas.microsoft.com/office/drawing/2014/main" id="{13CFC015-3DB5-461B-AA43-A6F776ED542D}"/>
               </a:ext>
             </a:extLst>
           </p:cNvPr>
@@ -27889,7 +27706,521 @@
         </p:nvSpPr>
         <p:spPr bwMode="auto">
           <a:xfrm>
-            <a:off x="557638" y="1664804"/>
+            <a:off x="618269" y="2103181"/>
+            <a:ext cx="1836204" cy="828092"/>
+          </a:xfrm>
+          <a:prstGeom prst="rect">
+            <a:avLst/>
+          </a:prstGeom>
+          <a:solidFill>
+            <a:srgbClr val="BBE0E3"/>
+          </a:solidFill>
+          <a:ln w="9525" cap="flat" cmpd="sng" algn="ctr">
+            <a:solidFill>
+              <a:srgbClr val="000000"/>
+            </a:solidFill>
+            <a:prstDash val="solid"/>
+            <a:round/>
+            <a:headEnd type="none" w="med" len="med"/>
+            <a:tailEnd type="none" w="med" len="med"/>
+          </a:ln>
+          <a:effectLst/>
+          <a:extLst>
+            <a:ext uri="{AF507438-7753-43e0-B8FC-AC1667EBCBE1}">
+              <a14:hiddenEffects xmlns="" xmlns:a14="http://schemas.microsoft.com/office/drawing/2010/main">
+                <a:effectLst>
+                  <a:outerShdw blurRad="63500" dist="38099" dir="2700000" algn="ctr" rotWithShape="0">
+                    <a:schemeClr val="bg2">
+                      <a:alpha val="74998"/>
+                    </a:schemeClr>
+                  </a:outerShdw>
+                </a:effectLst>
+              </a14:hiddenEffects>
+            </a:ext>
+          </a:extLst>
+        </p:spPr>
+        <p:txBody>
+          <a:bodyPr vert="horz" wrap="square" lIns="91440" tIns="45720" rIns="91440" bIns="45720" numCol="1" rtlCol="0" anchor="ctr" anchorCtr="0" compatLnSpc="1">
+            <a:prstTxWarp prst="textNoShape">
+              <a:avLst/>
+            </a:prstTxWarp>
+          </a:bodyPr>
+          <a:lstStyle/>
+          <a:p>
+            <a:pPr marL="0" marR="0" indent="0" algn="ctr" defTabSz="914400" rtl="0" eaLnBrk="1" fontAlgn="base" latinLnBrk="0" hangingPunct="1">
+              <a:lnSpc>
+                <a:spcPct val="100000"/>
+              </a:lnSpc>
+              <a:spcBef>
+                <a:spcPct val="0"/>
+              </a:spcBef>
+              <a:spcAft>
+                <a:spcPct val="0"/>
+              </a:spcAft>
+              <a:buClrTx/>
+              <a:buSzTx/>
+              <a:buFontTx/>
+              <a:buNone/>
+              <a:tabLst/>
+            </a:pPr>
+            <a:r>
+              <a:rPr kumimoji="0" lang="de-CH" sz="1800" b="1" i="0" u="none" strike="noStrike" cap="none" normalizeH="0" baseline="0" dirty="0">
+                <a:ln>
+                  <a:noFill/>
+                </a:ln>
+                <a:solidFill>
+                  <a:srgbClr val="000000"/>
+                </a:solidFill>
+                <a:effectLst/>
+                <a:latin typeface="+mn-lt"/>
+                <a:ea typeface="Source Sans Pro Light" panose="020B0403030403020204" pitchFamily="34" charset="0"/>
+                <a:sym typeface="Neutraface Text Book" charset="0"/>
+              </a:rPr>
+              <a:t>Data </a:t>
+            </a:r>
+            <a:r>
+              <a:rPr kumimoji="0" lang="de-CH" sz="1800" b="1" i="0" u="none" strike="noStrike" cap="none" normalizeH="0" baseline="0" dirty="0" err="1">
+                <a:ln>
+                  <a:noFill/>
+                </a:ln>
+                <a:solidFill>
+                  <a:srgbClr val="000000"/>
+                </a:solidFill>
+                <a:effectLst/>
+                <a:latin typeface="+mn-lt"/>
+                <a:ea typeface="Source Sans Pro Light" panose="020B0403030403020204" pitchFamily="34" charset="0"/>
+                <a:sym typeface="Neutraface Text Book" charset="0"/>
+              </a:rPr>
+              <a:t>Preprocessing</a:t>
+            </a:r>
+            <a:endParaRPr kumimoji="0" lang="de-CH" sz="1800" b="1" i="0" u="none" strike="noStrike" cap="none" normalizeH="0" baseline="0" dirty="0">
+              <a:ln>
+                <a:noFill/>
+              </a:ln>
+              <a:solidFill>
+                <a:srgbClr val="000000"/>
+              </a:solidFill>
+              <a:effectLst/>
+              <a:latin typeface="+mn-lt"/>
+              <a:ea typeface="Source Sans Pro Light" panose="020B0403030403020204" pitchFamily="34" charset="0"/>
+              <a:sym typeface="Neutraface Text Book" charset="0"/>
+            </a:endParaRPr>
+          </a:p>
+        </p:txBody>
+      </p:sp>
+      <p:sp>
+        <p:nvSpPr>
+          <p:cNvPr id="9" name="Rechteck 8">
+            <a:extLst>
+              <a:ext uri="{FF2B5EF4-FFF2-40B4-BE49-F238E27FC236}">
+                <a16:creationId xmlns:a16="http://schemas.microsoft.com/office/drawing/2014/main" id="{8BD1C62B-0B7B-4F07-A5E9-A25489185591}"/>
+              </a:ext>
+            </a:extLst>
+          </p:cNvPr>
+          <p:cNvSpPr/>
+          <p:nvPr/>
+        </p:nvSpPr>
+        <p:spPr bwMode="auto">
+          <a:xfrm>
+            <a:off x="3137658" y="3272784"/>
+            <a:ext cx="1836204" cy="828092"/>
+          </a:xfrm>
+          <a:prstGeom prst="rect">
+            <a:avLst/>
+          </a:prstGeom>
+          <a:solidFill>
+            <a:srgbClr val="BBE0E3"/>
+          </a:solidFill>
+          <a:ln w="9525" cap="flat" cmpd="sng" algn="ctr">
+            <a:solidFill>
+              <a:srgbClr val="000000"/>
+            </a:solidFill>
+            <a:prstDash val="solid"/>
+            <a:round/>
+            <a:headEnd type="none" w="med" len="med"/>
+            <a:tailEnd type="none" w="med" len="med"/>
+          </a:ln>
+          <a:effectLst/>
+          <a:extLst>
+            <a:ext uri="{AF507438-7753-43e0-B8FC-AC1667EBCBE1}">
+              <a14:hiddenEffects xmlns="" xmlns:a14="http://schemas.microsoft.com/office/drawing/2010/main">
+                <a:effectLst>
+                  <a:outerShdw blurRad="63500" dist="38099" dir="2700000" algn="ctr" rotWithShape="0">
+                    <a:schemeClr val="bg2">
+                      <a:alpha val="74998"/>
+                    </a:schemeClr>
+                  </a:outerShdw>
+                </a:effectLst>
+              </a14:hiddenEffects>
+            </a:ext>
+          </a:extLst>
+        </p:spPr>
+        <p:txBody>
+          <a:bodyPr vert="horz" wrap="square" lIns="91440" tIns="45720" rIns="91440" bIns="45720" numCol="1" rtlCol="0" anchor="ctr" anchorCtr="0" compatLnSpc="1">
+            <a:prstTxWarp prst="textNoShape">
+              <a:avLst/>
+            </a:prstTxWarp>
+          </a:bodyPr>
+          <a:lstStyle/>
+          <a:p>
+            <a:pPr marL="0" marR="0" indent="0" algn="ctr" defTabSz="914400" rtl="0" eaLnBrk="1" fontAlgn="base" latinLnBrk="0" hangingPunct="1">
+              <a:lnSpc>
+                <a:spcPct val="100000"/>
+              </a:lnSpc>
+              <a:spcBef>
+                <a:spcPct val="0"/>
+              </a:spcBef>
+              <a:spcAft>
+                <a:spcPct val="0"/>
+              </a:spcAft>
+              <a:buClrTx/>
+              <a:buSzTx/>
+              <a:buFontTx/>
+              <a:buNone/>
+              <a:tabLst/>
+            </a:pPr>
+            <a:r>
+              <a:rPr kumimoji="0" lang="de-CH" sz="1500" b="1" i="0" u="none" strike="noStrike" cap="none" normalizeH="0" baseline="0" dirty="0">
+                <a:ln>
+                  <a:noFill/>
+                </a:ln>
+                <a:solidFill>
+                  <a:srgbClr val="000000"/>
+                </a:solidFill>
+                <a:effectLst/>
+                <a:latin typeface="+mn-lt"/>
+                <a:ea typeface="Source Sans Pro Light" panose="020B0403030403020204" pitchFamily="34" charset="0"/>
+                <a:sym typeface="Neutraface Text Book" charset="0"/>
+              </a:rPr>
+              <a:t>Train</a:t>
+            </a:r>
+          </a:p>
+        </p:txBody>
+      </p:sp>
+      <p:sp>
+        <p:nvSpPr>
+          <p:cNvPr id="10" name="Rechteck 9">
+            <a:extLst>
+              <a:ext uri="{FF2B5EF4-FFF2-40B4-BE49-F238E27FC236}">
+                <a16:creationId xmlns:a16="http://schemas.microsoft.com/office/drawing/2014/main" id="{E52F1F0B-5A93-479F-BB2A-97C878F9829B}"/>
+              </a:ext>
+            </a:extLst>
+          </p:cNvPr>
+          <p:cNvSpPr/>
+          <p:nvPr/>
+        </p:nvSpPr>
+        <p:spPr bwMode="auto">
+          <a:xfrm>
+            <a:off x="4718179" y="3272784"/>
+            <a:ext cx="846889" cy="828092"/>
+          </a:xfrm>
+          <a:prstGeom prst="rect">
+            <a:avLst/>
+          </a:prstGeom>
+          <a:solidFill>
+            <a:srgbClr val="BBE0E3"/>
+          </a:solidFill>
+          <a:ln w="9525" cap="flat" cmpd="sng" algn="ctr">
+            <a:solidFill>
+              <a:srgbClr val="000000"/>
+            </a:solidFill>
+            <a:prstDash val="solid"/>
+            <a:round/>
+            <a:headEnd type="none" w="med" len="med"/>
+            <a:tailEnd type="none" w="med" len="med"/>
+          </a:ln>
+          <a:effectLst/>
+          <a:extLst>
+            <a:ext uri="{AF507438-7753-43e0-B8FC-AC1667EBCBE1}">
+              <a14:hiddenEffects xmlns="" xmlns:a14="http://schemas.microsoft.com/office/drawing/2010/main">
+                <a:effectLst>
+                  <a:outerShdw blurRad="63500" dist="38099" dir="2700000" algn="ctr" rotWithShape="0">
+                    <a:schemeClr val="bg2">
+                      <a:alpha val="74998"/>
+                    </a:schemeClr>
+                  </a:outerShdw>
+                </a:effectLst>
+              </a14:hiddenEffects>
+            </a:ext>
+          </a:extLst>
+        </p:spPr>
+        <p:txBody>
+          <a:bodyPr vert="horz" wrap="square" lIns="91440" tIns="45720" rIns="91440" bIns="45720" numCol="1" rtlCol="0" anchor="ctr" anchorCtr="0" compatLnSpc="1">
+            <a:prstTxWarp prst="textNoShape">
+              <a:avLst/>
+            </a:prstTxWarp>
+          </a:bodyPr>
+          <a:lstStyle/>
+          <a:p>
+            <a:pPr marL="0" marR="0" indent="0" algn="ctr" defTabSz="914400" rtl="0" eaLnBrk="1" fontAlgn="base" latinLnBrk="0" hangingPunct="1">
+              <a:lnSpc>
+                <a:spcPct val="100000"/>
+              </a:lnSpc>
+              <a:spcBef>
+                <a:spcPct val="0"/>
+              </a:spcBef>
+              <a:spcAft>
+                <a:spcPct val="0"/>
+              </a:spcAft>
+              <a:buClrTx/>
+              <a:buSzTx/>
+              <a:buFontTx/>
+              <a:buNone/>
+              <a:tabLst/>
+            </a:pPr>
+            <a:r>
+              <a:rPr kumimoji="0" lang="de-CH" sz="1500" b="1" i="0" u="none" strike="noStrike" cap="none" normalizeH="0" baseline="0" dirty="0" err="1">
+                <a:ln>
+                  <a:noFill/>
+                </a:ln>
+                <a:solidFill>
+                  <a:srgbClr val="000000"/>
+                </a:solidFill>
+                <a:effectLst/>
+                <a:latin typeface="+mn-lt"/>
+                <a:ea typeface="Source Sans Pro Light" panose="020B0403030403020204" pitchFamily="34" charset="0"/>
+                <a:sym typeface="Neutraface Text Book" charset="0"/>
+              </a:rPr>
+              <a:t>Validate</a:t>
+            </a:r>
+            <a:endParaRPr kumimoji="0" lang="de-CH" sz="1500" b="1" i="0" u="none" strike="noStrike" cap="none" normalizeH="0" baseline="0" dirty="0">
+              <a:ln>
+                <a:noFill/>
+              </a:ln>
+              <a:solidFill>
+                <a:srgbClr val="000000"/>
+              </a:solidFill>
+              <a:effectLst/>
+              <a:latin typeface="+mn-lt"/>
+              <a:ea typeface="Source Sans Pro Light" panose="020B0403030403020204" pitchFamily="34" charset="0"/>
+              <a:sym typeface="Neutraface Text Book" charset="0"/>
+            </a:endParaRPr>
+          </a:p>
+        </p:txBody>
+      </p:sp>
+      <p:sp>
+        <p:nvSpPr>
+          <p:cNvPr id="13" name="Rechteck 12">
+            <a:extLst>
+              <a:ext uri="{FF2B5EF4-FFF2-40B4-BE49-F238E27FC236}">
+                <a16:creationId xmlns:a16="http://schemas.microsoft.com/office/drawing/2014/main" id="{6B110BCE-213D-4B42-9F9B-B88E8EA12A7B}"/>
+              </a:ext>
+            </a:extLst>
+          </p:cNvPr>
+          <p:cNvSpPr/>
+          <p:nvPr/>
+        </p:nvSpPr>
+        <p:spPr bwMode="auto">
+          <a:xfrm>
+            <a:off x="6365759" y="3284165"/>
+            <a:ext cx="846889" cy="828092"/>
+          </a:xfrm>
+          <a:prstGeom prst="rect">
+            <a:avLst/>
+          </a:prstGeom>
+          <a:solidFill>
+            <a:srgbClr val="BBE0E3"/>
+          </a:solidFill>
+          <a:ln w="9525" cap="flat" cmpd="sng" algn="ctr">
+            <a:solidFill>
+              <a:srgbClr val="000000"/>
+            </a:solidFill>
+            <a:prstDash val="solid"/>
+            <a:round/>
+            <a:headEnd type="none" w="med" len="med"/>
+            <a:tailEnd type="none" w="med" len="med"/>
+          </a:ln>
+          <a:effectLst/>
+          <a:extLst>
+            <a:ext uri="{AF507438-7753-43e0-B8FC-AC1667EBCBE1}">
+              <a14:hiddenEffects xmlns="" xmlns:a14="http://schemas.microsoft.com/office/drawing/2010/main">
+                <a:effectLst>
+                  <a:outerShdw blurRad="63500" dist="38099" dir="2700000" algn="ctr" rotWithShape="0">
+                    <a:schemeClr val="bg2">
+                      <a:alpha val="74998"/>
+                    </a:schemeClr>
+                  </a:outerShdw>
+                </a:effectLst>
+              </a14:hiddenEffects>
+            </a:ext>
+          </a:extLst>
+        </p:spPr>
+        <p:txBody>
+          <a:bodyPr vert="horz" wrap="square" lIns="91440" tIns="45720" rIns="91440" bIns="45720" numCol="1" rtlCol="0" anchor="ctr" anchorCtr="0" compatLnSpc="1">
+            <a:prstTxWarp prst="textNoShape">
+              <a:avLst/>
+            </a:prstTxWarp>
+          </a:bodyPr>
+          <a:lstStyle/>
+          <a:p>
+            <a:pPr marL="0" marR="0" indent="0" algn="ctr" defTabSz="914400" rtl="0" eaLnBrk="1" fontAlgn="base" latinLnBrk="0" hangingPunct="1">
+              <a:lnSpc>
+                <a:spcPct val="100000"/>
+              </a:lnSpc>
+              <a:spcBef>
+                <a:spcPct val="0"/>
+              </a:spcBef>
+              <a:spcAft>
+                <a:spcPct val="0"/>
+              </a:spcAft>
+              <a:buClrTx/>
+              <a:buSzTx/>
+              <a:buFontTx/>
+              <a:buNone/>
+              <a:tabLst/>
+            </a:pPr>
+            <a:r>
+              <a:rPr kumimoji="0" lang="de-CH" sz="1500" b="1" i="0" u="none" strike="noStrike" cap="none" normalizeH="0" baseline="0" dirty="0">
+                <a:ln>
+                  <a:noFill/>
+                </a:ln>
+                <a:solidFill>
+                  <a:srgbClr val="000000"/>
+                </a:solidFill>
+                <a:effectLst/>
+                <a:latin typeface="+mn-lt"/>
+                <a:ea typeface="Source Sans Pro Light" panose="020B0403030403020204" pitchFamily="34" charset="0"/>
+                <a:sym typeface="Neutraface Text Book" charset="0"/>
+              </a:rPr>
+              <a:t>Test</a:t>
+            </a:r>
+          </a:p>
+        </p:txBody>
+      </p:sp>
+      <p:sp>
+        <p:nvSpPr>
+          <p:cNvPr id="14" name="Rechteck 13">
+            <a:extLst>
+              <a:ext uri="{FF2B5EF4-FFF2-40B4-BE49-F238E27FC236}">
+                <a16:creationId xmlns:a16="http://schemas.microsoft.com/office/drawing/2014/main" id="{29659907-703D-4265-9BDE-E97178F6F96D}"/>
+              </a:ext>
+            </a:extLst>
+          </p:cNvPr>
+          <p:cNvSpPr/>
+          <p:nvPr/>
+        </p:nvSpPr>
+        <p:spPr bwMode="auto">
+          <a:xfrm>
+            <a:off x="3128256" y="4468055"/>
+            <a:ext cx="1836204" cy="828092"/>
+          </a:xfrm>
+          <a:prstGeom prst="rect">
+            <a:avLst/>
+          </a:prstGeom>
+          <a:solidFill>
+            <a:srgbClr val="BBE0E3"/>
+          </a:solidFill>
+          <a:ln w="9525" cap="flat" cmpd="sng" algn="ctr">
+            <a:solidFill>
+              <a:srgbClr val="000000"/>
+            </a:solidFill>
+            <a:prstDash val="solid"/>
+            <a:round/>
+            <a:headEnd type="none" w="med" len="med"/>
+            <a:tailEnd type="none" w="med" len="med"/>
+          </a:ln>
+          <a:effectLst/>
+          <a:extLst>
+            <a:ext uri="{AF507438-7753-43e0-B8FC-AC1667EBCBE1}">
+              <a14:hiddenEffects xmlns="" xmlns:a14="http://schemas.microsoft.com/office/drawing/2010/main">
+                <a:effectLst>
+                  <a:outerShdw blurRad="63500" dist="38099" dir="2700000" algn="ctr" rotWithShape="0">
+                    <a:schemeClr val="bg2">
+                      <a:alpha val="74998"/>
+                    </a:schemeClr>
+                  </a:outerShdw>
+                </a:effectLst>
+              </a14:hiddenEffects>
+            </a:ext>
+          </a:extLst>
+        </p:spPr>
+        <p:txBody>
+          <a:bodyPr vert="horz" wrap="square" lIns="91440" tIns="45720" rIns="91440" bIns="45720" numCol="1" rtlCol="0" anchor="ctr" anchorCtr="0" compatLnSpc="1">
+            <a:prstTxWarp prst="textNoShape">
+              <a:avLst/>
+            </a:prstTxWarp>
+          </a:bodyPr>
+          <a:lstStyle/>
+          <a:p>
+            <a:pPr marL="0" marR="0" indent="0" algn="ctr" defTabSz="914400" rtl="0" eaLnBrk="1" fontAlgn="base" latinLnBrk="0" hangingPunct="1">
+              <a:lnSpc>
+                <a:spcPct val="100000"/>
+              </a:lnSpc>
+              <a:spcBef>
+                <a:spcPct val="0"/>
+              </a:spcBef>
+              <a:spcAft>
+                <a:spcPct val="0"/>
+              </a:spcAft>
+              <a:buClrTx/>
+              <a:buSzTx/>
+              <a:buFontTx/>
+              <a:buNone/>
+              <a:tabLst/>
+            </a:pPr>
+            <a:r>
+              <a:rPr kumimoji="0" lang="de-CH" sz="1800" b="1" i="0" u="none" strike="noStrike" cap="none" normalizeH="0" baseline="0" dirty="0">
+                <a:ln>
+                  <a:noFill/>
+                </a:ln>
+                <a:solidFill>
+                  <a:srgbClr val="000000"/>
+                </a:solidFill>
+                <a:effectLst/>
+                <a:latin typeface="+mn-lt"/>
+                <a:ea typeface="Source Sans Pro Light" panose="020B0403030403020204" pitchFamily="34" charset="0"/>
+                <a:sym typeface="Neutraface Text Book" charset="0"/>
+              </a:rPr>
+              <a:t>Label </a:t>
+            </a:r>
+            <a:r>
+              <a:rPr kumimoji="0" lang="de-CH" sz="1800" b="1" i="0" u="none" strike="noStrike" cap="none" normalizeH="0" baseline="0" dirty="0" err="1">
+                <a:ln>
+                  <a:noFill/>
+                </a:ln>
+                <a:solidFill>
+                  <a:srgbClr val="000000"/>
+                </a:solidFill>
+                <a:effectLst/>
+                <a:latin typeface="+mn-lt"/>
+                <a:ea typeface="Source Sans Pro Light" panose="020B0403030403020204" pitchFamily="34" charset="0"/>
+                <a:sym typeface="Neutraface Text Book" charset="0"/>
+              </a:rPr>
+              <a:t>Classifier</a:t>
+            </a:r>
+            <a:r>
+              <a:rPr kumimoji="0" lang="de-CH" sz="1800" b="1" i="0" u="none" strike="noStrike" cap="none" normalizeH="0" baseline="0" dirty="0">
+                <a:ln>
+                  <a:noFill/>
+                </a:ln>
+                <a:solidFill>
+                  <a:srgbClr val="000000"/>
+                </a:solidFill>
+                <a:effectLst/>
+                <a:latin typeface="+mn-lt"/>
+                <a:ea typeface="Source Sans Pro Light" panose="020B0403030403020204" pitchFamily="34" charset="0"/>
+                <a:sym typeface="Neutraface Text Book" charset="0"/>
+              </a:rPr>
+              <a:t> Model</a:t>
+            </a:r>
+          </a:p>
+        </p:txBody>
+      </p:sp>
+      <p:sp>
+        <p:nvSpPr>
+          <p:cNvPr id="15" name="Ellipse 14">
+            <a:extLst>
+              <a:ext uri="{FF2B5EF4-FFF2-40B4-BE49-F238E27FC236}">
+                <a16:creationId xmlns:a16="http://schemas.microsoft.com/office/drawing/2014/main" id="{BEE4FDB0-288D-4D91-9BFF-3658D8A96213}"/>
+              </a:ext>
+            </a:extLst>
+          </p:cNvPr>
+          <p:cNvSpPr/>
+          <p:nvPr/>
+        </p:nvSpPr>
+        <p:spPr bwMode="auto">
+          <a:xfrm>
+            <a:off x="685934" y="4468055"/>
             <a:ext cx="1692188" cy="828092"/>
           </a:xfrm>
           <a:prstGeom prst="ellipse">
@@ -27950,31 +28281,15 @@
               <a:tabLst/>
             </a:pPr>
             <a:r>
-              <a:rPr kumimoji="0" lang="de-CH" sz="1400" b="1" i="0" u="none" strike="noStrike" cap="none" normalizeH="0" baseline="0" dirty="0" err="1">
-                <a:ln>
-                  <a:noFill/>
-                </a:ln>
-                <a:solidFill>
-                  <a:srgbClr val="000000"/>
-                </a:solidFill>
-                <a:effectLst/>
+              <a:rPr lang="de-CH" sz="1400" b="1" dirty="0" err="1">
                 <a:latin typeface="+mn-lt"/>
                 <a:ea typeface="Source Sans Pro Light" panose="020B0403030403020204" pitchFamily="34" charset="0"/>
-                <a:sym typeface="Neutraface Text Book" charset="0"/>
               </a:rPr>
-              <a:t>Labeled</a:t>
-            </a:r>
-            <a:endParaRPr kumimoji="0" lang="de-CH" sz="1400" b="1" i="0" u="none" strike="noStrike" cap="none" normalizeH="0" baseline="0" dirty="0">
-              <a:ln>
-                <a:noFill/>
-              </a:ln>
-              <a:solidFill>
-                <a:srgbClr val="000000"/>
-              </a:solidFill>
-              <a:effectLst/>
+              <a:t>Unlabeled</a:t>
+            </a:r>
+            <a:endParaRPr lang="de-CH" sz="1400" b="1" dirty="0">
               <a:latin typeface="+mn-lt"/>
               <a:ea typeface="Source Sans Pro Light" panose="020B0403030403020204" pitchFamily="34" charset="0"/>
-              <a:sym typeface="Neutraface Text Book" charset="0"/>
             </a:endParaRPr>
           </a:p>
           <a:p>
@@ -27999,7 +28314,7 @@
                 <a:latin typeface="+mn-lt"/>
                 <a:ea typeface="Source Sans Pro Light" panose="020B0403030403020204" pitchFamily="34" charset="0"/>
               </a:rPr>
-              <a:t>Flickr </a:t>
+              <a:t>Instagram </a:t>
             </a:r>
           </a:p>
           <a:p>
@@ -28043,10 +28358,10 @@
       </p:sp>
       <p:sp>
         <p:nvSpPr>
-          <p:cNvPr id="5" name="Rechteck 4">
+          <p:cNvPr id="7" name="Flussdiagramm: Grenzstelle 6">
             <a:extLst>
               <a:ext uri="{FF2B5EF4-FFF2-40B4-BE49-F238E27FC236}">
-                <a16:creationId xmlns:a16="http://schemas.microsoft.com/office/drawing/2014/main" id="{13CFC015-3DB5-461B-AA43-A6F776ED542D}"/>
+                <a16:creationId xmlns:a16="http://schemas.microsoft.com/office/drawing/2014/main" id="{24BFB8EF-596F-488A-904E-C38070F84557}"/>
               </a:ext>
             </a:extLst>
           </p:cNvPr>
@@ -28055,7 +28370,123 @@
         </p:nvSpPr>
         <p:spPr bwMode="auto">
           <a:xfrm>
-            <a:off x="3128256" y="1664804"/>
+            <a:off x="6634856" y="5486437"/>
+            <a:ext cx="1980220" cy="1001553"/>
+          </a:xfrm>
+          <a:prstGeom prst="flowChartTerminator">
+            <a:avLst/>
+          </a:prstGeom>
+          <a:solidFill>
+            <a:srgbClr val="00B0F0"/>
+          </a:solidFill>
+          <a:ln w="9525" cap="flat" cmpd="sng" algn="ctr">
+            <a:solidFill>
+              <a:srgbClr val="000000"/>
+            </a:solidFill>
+            <a:prstDash val="solid"/>
+            <a:round/>
+            <a:headEnd type="none" w="med" len="med"/>
+            <a:tailEnd type="none" w="med" len="med"/>
+          </a:ln>
+          <a:effectLst/>
+          <a:extLst>
+            <a:ext uri="{AF507438-7753-43e0-B8FC-AC1667EBCBE1}">
+              <a14:hiddenEffects xmlns="" xmlns:a14="http://schemas.microsoft.com/office/drawing/2010/main">
+                <a:effectLst>
+                  <a:outerShdw blurRad="63500" dist="38099" dir="2700000" algn="ctr" rotWithShape="0">
+                    <a:schemeClr val="bg2">
+                      <a:alpha val="74998"/>
+                    </a:schemeClr>
+                  </a:outerShdw>
+                </a:effectLst>
+              </a14:hiddenEffects>
+            </a:ext>
+          </a:extLst>
+        </p:spPr>
+        <p:txBody>
+          <a:bodyPr vert="horz" wrap="square" lIns="91440" tIns="45720" rIns="91440" bIns="45720" numCol="1" rtlCol="0" anchor="ctr" anchorCtr="0" compatLnSpc="1">
+            <a:prstTxWarp prst="textNoShape">
+              <a:avLst/>
+            </a:prstTxWarp>
+          </a:bodyPr>
+          <a:lstStyle/>
+          <a:p>
+            <a:pPr marL="0" marR="0" indent="0" algn="ctr" defTabSz="914400" rtl="0" eaLnBrk="1" fontAlgn="base" latinLnBrk="0" hangingPunct="1">
+              <a:lnSpc>
+                <a:spcPct val="100000"/>
+              </a:lnSpc>
+              <a:spcBef>
+                <a:spcPct val="0"/>
+              </a:spcBef>
+              <a:spcAft>
+                <a:spcPct val="0"/>
+              </a:spcAft>
+              <a:buClrTx/>
+              <a:buSzTx/>
+              <a:buFontTx/>
+              <a:buNone/>
+              <a:tabLst/>
+            </a:pPr>
+            <a:r>
+              <a:rPr kumimoji="0" lang="de-CH" sz="1800" b="1" i="0" u="none" strike="noStrike" cap="none" normalizeH="0" baseline="0" dirty="0">
+                <a:ln>
+                  <a:noFill/>
+                </a:ln>
+                <a:solidFill>
+                  <a:srgbClr val="000000"/>
+                </a:solidFill>
+                <a:effectLst/>
+                <a:latin typeface="+mn-lt"/>
+                <a:ea typeface="Source Sans Pro Light" panose="020B0403030403020204" pitchFamily="34" charset="0"/>
+                <a:sym typeface="Neutraface Text Book" charset="0"/>
+              </a:rPr>
+              <a:t>Web </a:t>
+            </a:r>
+            <a:r>
+              <a:rPr kumimoji="0" lang="de-CH" sz="1800" b="1" i="0" u="none" strike="noStrike" cap="none" normalizeH="0" baseline="0" dirty="0" err="1">
+                <a:ln>
+                  <a:noFill/>
+                </a:ln>
+                <a:solidFill>
+                  <a:srgbClr val="000000"/>
+                </a:solidFill>
+                <a:effectLst/>
+                <a:latin typeface="+mn-lt"/>
+                <a:ea typeface="Source Sans Pro Light" panose="020B0403030403020204" pitchFamily="34" charset="0"/>
+                <a:sym typeface="Neutraface Text Book" charset="0"/>
+              </a:rPr>
+              <a:t>Application</a:t>
+            </a:r>
+            <a:endParaRPr kumimoji="0" lang="de-CH" sz="1800" b="1" i="0" u="none" strike="noStrike" cap="none" normalizeH="0" baseline="0" dirty="0">
+              <a:ln>
+                <a:noFill/>
+              </a:ln>
+              <a:solidFill>
+                <a:srgbClr val="000000"/>
+              </a:solidFill>
+              <a:effectLst/>
+              <a:latin typeface="+mn-lt"/>
+              <a:ea typeface="Source Sans Pro Light" panose="020B0403030403020204" pitchFamily="34" charset="0"/>
+              <a:sym typeface="Neutraface Text Book" charset="0"/>
+            </a:endParaRPr>
+          </a:p>
+        </p:txBody>
+      </p:sp>
+      <p:sp>
+        <p:nvSpPr>
+          <p:cNvPr id="17" name="Rechteck 16">
+            <a:extLst>
+              <a:ext uri="{FF2B5EF4-FFF2-40B4-BE49-F238E27FC236}">
+                <a16:creationId xmlns:a16="http://schemas.microsoft.com/office/drawing/2014/main" id="{5D907F3D-84A5-4CBC-9909-71D9D0AB900E}"/>
+              </a:ext>
+            </a:extLst>
+          </p:cNvPr>
+          <p:cNvSpPr/>
+          <p:nvPr/>
+        </p:nvSpPr>
+        <p:spPr bwMode="auto">
+          <a:xfrm>
+            <a:off x="3128256" y="5573168"/>
             <a:ext cx="1836204" cy="828092"/>
           </a:xfrm>
           <a:prstGeom prst="rect">
@@ -28125,802 +28556,6 @@
                 <a:ea typeface="Source Sans Pro Light" panose="020B0403030403020204" pitchFamily="34" charset="0"/>
                 <a:sym typeface="Neutraface Text Book" charset="0"/>
               </a:rPr>
-              <a:t>Data </a:t>
-            </a:r>
-            <a:r>
-              <a:rPr kumimoji="0" lang="de-CH" sz="1800" b="1" i="0" u="none" strike="noStrike" cap="none" normalizeH="0" baseline="0" dirty="0" err="1">
-                <a:ln>
-                  <a:noFill/>
-                </a:ln>
-                <a:solidFill>
-                  <a:srgbClr val="000000"/>
-                </a:solidFill>
-                <a:effectLst/>
-                <a:latin typeface="+mn-lt"/>
-                <a:ea typeface="Source Sans Pro Light" panose="020B0403030403020204" pitchFamily="34" charset="0"/>
-                <a:sym typeface="Neutraface Text Book" charset="0"/>
-              </a:rPr>
-              <a:t>Preprocessing</a:t>
-            </a:r>
-            <a:endParaRPr kumimoji="0" lang="de-CH" sz="1800" b="1" i="0" u="none" strike="noStrike" cap="none" normalizeH="0" baseline="0" dirty="0">
-              <a:ln>
-                <a:noFill/>
-              </a:ln>
-              <a:solidFill>
-                <a:srgbClr val="000000"/>
-              </a:solidFill>
-              <a:effectLst/>
-              <a:latin typeface="+mn-lt"/>
-              <a:ea typeface="Source Sans Pro Light" panose="020B0403030403020204" pitchFamily="34" charset="0"/>
-              <a:sym typeface="Neutraface Text Book" charset="0"/>
-            </a:endParaRPr>
-          </a:p>
-        </p:txBody>
-      </p:sp>
-      <p:sp>
-        <p:nvSpPr>
-          <p:cNvPr id="9" name="Rechteck 8">
-            <a:extLst>
-              <a:ext uri="{FF2B5EF4-FFF2-40B4-BE49-F238E27FC236}">
-                <a16:creationId xmlns:a16="http://schemas.microsoft.com/office/drawing/2014/main" id="{8BD1C62B-0B7B-4F07-A5E9-A25489185591}"/>
-              </a:ext>
-            </a:extLst>
-          </p:cNvPr>
-          <p:cNvSpPr/>
-          <p:nvPr/>
-        </p:nvSpPr>
-        <p:spPr bwMode="auto">
-          <a:xfrm>
-            <a:off x="3130731" y="2874181"/>
-            <a:ext cx="1836204" cy="828092"/>
-          </a:xfrm>
-          <a:prstGeom prst="rect">
-            <a:avLst/>
-          </a:prstGeom>
-          <a:solidFill>
-            <a:srgbClr val="BBE0E3"/>
-          </a:solidFill>
-          <a:ln w="9525" cap="flat" cmpd="sng" algn="ctr">
-            <a:solidFill>
-              <a:srgbClr val="000000"/>
-            </a:solidFill>
-            <a:prstDash val="solid"/>
-            <a:round/>
-            <a:headEnd type="none" w="med" len="med"/>
-            <a:tailEnd type="none" w="med" len="med"/>
-          </a:ln>
-          <a:effectLst/>
-          <a:extLst>
-            <a:ext uri="{AF507438-7753-43e0-B8FC-AC1667EBCBE1}">
-              <a14:hiddenEffects xmlns="" xmlns:a14="http://schemas.microsoft.com/office/drawing/2010/main">
-                <a:effectLst>
-                  <a:outerShdw blurRad="63500" dist="38099" dir="2700000" algn="ctr" rotWithShape="0">
-                    <a:schemeClr val="bg2">
-                      <a:alpha val="74998"/>
-                    </a:schemeClr>
-                  </a:outerShdw>
-                </a:effectLst>
-              </a14:hiddenEffects>
-            </a:ext>
-          </a:extLst>
-        </p:spPr>
-        <p:txBody>
-          <a:bodyPr vert="horz" wrap="square" lIns="91440" tIns="45720" rIns="91440" bIns="45720" numCol="1" rtlCol="0" anchor="ctr" anchorCtr="0" compatLnSpc="1">
-            <a:prstTxWarp prst="textNoShape">
-              <a:avLst/>
-            </a:prstTxWarp>
-          </a:bodyPr>
-          <a:lstStyle/>
-          <a:p>
-            <a:pPr marL="0" marR="0" indent="0" algn="ctr" defTabSz="914400" rtl="0" eaLnBrk="1" fontAlgn="base" latinLnBrk="0" hangingPunct="1">
-              <a:lnSpc>
-                <a:spcPct val="100000"/>
-              </a:lnSpc>
-              <a:spcBef>
-                <a:spcPct val="0"/>
-              </a:spcBef>
-              <a:spcAft>
-                <a:spcPct val="0"/>
-              </a:spcAft>
-              <a:buClrTx/>
-              <a:buSzTx/>
-              <a:buFontTx/>
-              <a:buNone/>
-              <a:tabLst/>
-            </a:pPr>
-            <a:r>
-              <a:rPr kumimoji="0" lang="de-CH" sz="1500" b="1" i="0" u="none" strike="noStrike" cap="none" normalizeH="0" baseline="0" dirty="0">
-                <a:ln>
-                  <a:noFill/>
-                </a:ln>
-                <a:solidFill>
-                  <a:srgbClr val="000000"/>
-                </a:solidFill>
-                <a:effectLst/>
-                <a:latin typeface="+mn-lt"/>
-                <a:ea typeface="Source Sans Pro Light" panose="020B0403030403020204" pitchFamily="34" charset="0"/>
-                <a:sym typeface="Neutraface Text Book" charset="0"/>
-              </a:rPr>
-              <a:t>Train</a:t>
-            </a:r>
-          </a:p>
-        </p:txBody>
-      </p:sp>
-      <p:sp>
-        <p:nvSpPr>
-          <p:cNvPr id="10" name="Rechteck 9">
-            <a:extLst>
-              <a:ext uri="{FF2B5EF4-FFF2-40B4-BE49-F238E27FC236}">
-                <a16:creationId xmlns:a16="http://schemas.microsoft.com/office/drawing/2014/main" id="{E52F1F0B-5A93-479F-BB2A-97C878F9829B}"/>
-              </a:ext>
-            </a:extLst>
-          </p:cNvPr>
-          <p:cNvSpPr/>
-          <p:nvPr/>
-        </p:nvSpPr>
-        <p:spPr bwMode="auto">
-          <a:xfrm>
-            <a:off x="4973862" y="2874181"/>
-            <a:ext cx="846889" cy="828092"/>
-          </a:xfrm>
-          <a:prstGeom prst="rect">
-            <a:avLst/>
-          </a:prstGeom>
-          <a:solidFill>
-            <a:srgbClr val="BBE0E3"/>
-          </a:solidFill>
-          <a:ln w="9525" cap="flat" cmpd="sng" algn="ctr">
-            <a:solidFill>
-              <a:srgbClr val="000000"/>
-            </a:solidFill>
-            <a:prstDash val="solid"/>
-            <a:round/>
-            <a:headEnd type="none" w="med" len="med"/>
-            <a:tailEnd type="none" w="med" len="med"/>
-          </a:ln>
-          <a:effectLst/>
-          <a:extLst>
-            <a:ext uri="{AF507438-7753-43e0-B8FC-AC1667EBCBE1}">
-              <a14:hiddenEffects xmlns="" xmlns:a14="http://schemas.microsoft.com/office/drawing/2010/main">
-                <a:effectLst>
-                  <a:outerShdw blurRad="63500" dist="38099" dir="2700000" algn="ctr" rotWithShape="0">
-                    <a:schemeClr val="bg2">
-                      <a:alpha val="74998"/>
-                    </a:schemeClr>
-                  </a:outerShdw>
-                </a:effectLst>
-              </a14:hiddenEffects>
-            </a:ext>
-          </a:extLst>
-        </p:spPr>
-        <p:txBody>
-          <a:bodyPr vert="horz" wrap="square" lIns="91440" tIns="45720" rIns="91440" bIns="45720" numCol="1" rtlCol="0" anchor="ctr" anchorCtr="0" compatLnSpc="1">
-            <a:prstTxWarp prst="textNoShape">
-              <a:avLst/>
-            </a:prstTxWarp>
-          </a:bodyPr>
-          <a:lstStyle/>
-          <a:p>
-            <a:pPr marL="0" marR="0" indent="0" algn="ctr" defTabSz="914400" rtl="0" eaLnBrk="1" fontAlgn="base" latinLnBrk="0" hangingPunct="1">
-              <a:lnSpc>
-                <a:spcPct val="100000"/>
-              </a:lnSpc>
-              <a:spcBef>
-                <a:spcPct val="0"/>
-              </a:spcBef>
-              <a:spcAft>
-                <a:spcPct val="0"/>
-              </a:spcAft>
-              <a:buClrTx/>
-              <a:buSzTx/>
-              <a:buFontTx/>
-              <a:buNone/>
-              <a:tabLst/>
-            </a:pPr>
-            <a:r>
-              <a:rPr kumimoji="0" lang="de-CH" sz="1500" b="1" i="0" u="none" strike="noStrike" cap="none" normalizeH="0" baseline="0" dirty="0" err="1">
-                <a:ln>
-                  <a:noFill/>
-                </a:ln>
-                <a:solidFill>
-                  <a:srgbClr val="000000"/>
-                </a:solidFill>
-                <a:effectLst/>
-                <a:latin typeface="+mn-lt"/>
-                <a:ea typeface="Source Sans Pro Light" panose="020B0403030403020204" pitchFamily="34" charset="0"/>
-                <a:sym typeface="Neutraface Text Book" charset="0"/>
-              </a:rPr>
-              <a:t>Validate</a:t>
-            </a:r>
-            <a:endParaRPr kumimoji="0" lang="de-CH" sz="1500" b="1" i="0" u="none" strike="noStrike" cap="none" normalizeH="0" baseline="0" dirty="0">
-              <a:ln>
-                <a:noFill/>
-              </a:ln>
-              <a:solidFill>
-                <a:srgbClr val="000000"/>
-              </a:solidFill>
-              <a:effectLst/>
-              <a:latin typeface="+mn-lt"/>
-              <a:ea typeface="Source Sans Pro Light" panose="020B0403030403020204" pitchFamily="34" charset="0"/>
-              <a:sym typeface="Neutraface Text Book" charset="0"/>
-            </a:endParaRPr>
-          </a:p>
-        </p:txBody>
-      </p:sp>
-      <p:sp>
-        <p:nvSpPr>
-          <p:cNvPr id="13" name="Rechteck 12">
-            <a:extLst>
-              <a:ext uri="{FF2B5EF4-FFF2-40B4-BE49-F238E27FC236}">
-                <a16:creationId xmlns:a16="http://schemas.microsoft.com/office/drawing/2014/main" id="{6B110BCE-213D-4B42-9F9B-B88E8EA12A7B}"/>
-              </a:ext>
-            </a:extLst>
-          </p:cNvPr>
-          <p:cNvSpPr/>
-          <p:nvPr/>
-        </p:nvSpPr>
-        <p:spPr bwMode="auto">
-          <a:xfrm>
-            <a:off x="6365759" y="2874181"/>
-            <a:ext cx="846889" cy="828092"/>
-          </a:xfrm>
-          <a:prstGeom prst="rect">
-            <a:avLst/>
-          </a:prstGeom>
-          <a:solidFill>
-            <a:srgbClr val="BBE0E3"/>
-          </a:solidFill>
-          <a:ln w="9525" cap="flat" cmpd="sng" algn="ctr">
-            <a:solidFill>
-              <a:srgbClr val="000000"/>
-            </a:solidFill>
-            <a:prstDash val="solid"/>
-            <a:round/>
-            <a:headEnd type="none" w="med" len="med"/>
-            <a:tailEnd type="none" w="med" len="med"/>
-          </a:ln>
-          <a:effectLst/>
-          <a:extLst>
-            <a:ext uri="{AF507438-7753-43e0-B8FC-AC1667EBCBE1}">
-              <a14:hiddenEffects xmlns="" xmlns:a14="http://schemas.microsoft.com/office/drawing/2010/main">
-                <a:effectLst>
-                  <a:outerShdw blurRad="63500" dist="38099" dir="2700000" algn="ctr" rotWithShape="0">
-                    <a:schemeClr val="bg2">
-                      <a:alpha val="74998"/>
-                    </a:schemeClr>
-                  </a:outerShdw>
-                </a:effectLst>
-              </a14:hiddenEffects>
-            </a:ext>
-          </a:extLst>
-        </p:spPr>
-        <p:txBody>
-          <a:bodyPr vert="horz" wrap="square" lIns="91440" tIns="45720" rIns="91440" bIns="45720" numCol="1" rtlCol="0" anchor="ctr" anchorCtr="0" compatLnSpc="1">
-            <a:prstTxWarp prst="textNoShape">
-              <a:avLst/>
-            </a:prstTxWarp>
-          </a:bodyPr>
-          <a:lstStyle/>
-          <a:p>
-            <a:pPr marL="0" marR="0" indent="0" algn="ctr" defTabSz="914400" rtl="0" eaLnBrk="1" fontAlgn="base" latinLnBrk="0" hangingPunct="1">
-              <a:lnSpc>
-                <a:spcPct val="100000"/>
-              </a:lnSpc>
-              <a:spcBef>
-                <a:spcPct val="0"/>
-              </a:spcBef>
-              <a:spcAft>
-                <a:spcPct val="0"/>
-              </a:spcAft>
-              <a:buClrTx/>
-              <a:buSzTx/>
-              <a:buFontTx/>
-              <a:buNone/>
-              <a:tabLst/>
-            </a:pPr>
-            <a:r>
-              <a:rPr kumimoji="0" lang="de-CH" sz="1500" b="1" i="0" u="none" strike="noStrike" cap="none" normalizeH="0" baseline="0" dirty="0">
-                <a:ln>
-                  <a:noFill/>
-                </a:ln>
-                <a:solidFill>
-                  <a:srgbClr val="000000"/>
-                </a:solidFill>
-                <a:effectLst/>
-                <a:latin typeface="+mn-lt"/>
-                <a:ea typeface="Source Sans Pro Light" panose="020B0403030403020204" pitchFamily="34" charset="0"/>
-                <a:sym typeface="Neutraface Text Book" charset="0"/>
-              </a:rPr>
-              <a:t>Test</a:t>
-            </a:r>
-          </a:p>
-        </p:txBody>
-      </p:sp>
-      <p:sp>
-        <p:nvSpPr>
-          <p:cNvPr id="14" name="Rechteck 13">
-            <a:extLst>
-              <a:ext uri="{FF2B5EF4-FFF2-40B4-BE49-F238E27FC236}">
-                <a16:creationId xmlns:a16="http://schemas.microsoft.com/office/drawing/2014/main" id="{29659907-703D-4265-9BDE-E97178F6F96D}"/>
-              </a:ext>
-            </a:extLst>
-          </p:cNvPr>
-          <p:cNvSpPr/>
-          <p:nvPr/>
-        </p:nvSpPr>
-        <p:spPr bwMode="auto">
-          <a:xfrm>
-            <a:off x="3128256" y="4071628"/>
-            <a:ext cx="1836204" cy="828092"/>
-          </a:xfrm>
-          <a:prstGeom prst="rect">
-            <a:avLst/>
-          </a:prstGeom>
-          <a:solidFill>
-            <a:srgbClr val="BBE0E3"/>
-          </a:solidFill>
-          <a:ln w="9525" cap="flat" cmpd="sng" algn="ctr">
-            <a:solidFill>
-              <a:srgbClr val="000000"/>
-            </a:solidFill>
-            <a:prstDash val="solid"/>
-            <a:round/>
-            <a:headEnd type="none" w="med" len="med"/>
-            <a:tailEnd type="none" w="med" len="med"/>
-          </a:ln>
-          <a:effectLst/>
-          <a:extLst>
-            <a:ext uri="{AF507438-7753-43e0-B8FC-AC1667EBCBE1}">
-              <a14:hiddenEffects xmlns="" xmlns:a14="http://schemas.microsoft.com/office/drawing/2010/main">
-                <a:effectLst>
-                  <a:outerShdw blurRad="63500" dist="38099" dir="2700000" algn="ctr" rotWithShape="0">
-                    <a:schemeClr val="bg2">
-                      <a:alpha val="74998"/>
-                    </a:schemeClr>
-                  </a:outerShdw>
-                </a:effectLst>
-              </a14:hiddenEffects>
-            </a:ext>
-          </a:extLst>
-        </p:spPr>
-        <p:txBody>
-          <a:bodyPr vert="horz" wrap="square" lIns="91440" tIns="45720" rIns="91440" bIns="45720" numCol="1" rtlCol="0" anchor="ctr" anchorCtr="0" compatLnSpc="1">
-            <a:prstTxWarp prst="textNoShape">
-              <a:avLst/>
-            </a:prstTxWarp>
-          </a:bodyPr>
-          <a:lstStyle/>
-          <a:p>
-            <a:pPr marL="0" marR="0" indent="0" algn="ctr" defTabSz="914400" rtl="0" eaLnBrk="1" fontAlgn="base" latinLnBrk="0" hangingPunct="1">
-              <a:lnSpc>
-                <a:spcPct val="100000"/>
-              </a:lnSpc>
-              <a:spcBef>
-                <a:spcPct val="0"/>
-              </a:spcBef>
-              <a:spcAft>
-                <a:spcPct val="0"/>
-              </a:spcAft>
-              <a:buClrTx/>
-              <a:buSzTx/>
-              <a:buFontTx/>
-              <a:buNone/>
-              <a:tabLst/>
-            </a:pPr>
-            <a:r>
-              <a:rPr kumimoji="0" lang="de-CH" sz="1800" b="1" i="0" u="none" strike="noStrike" cap="none" normalizeH="0" baseline="0" dirty="0">
-                <a:ln>
-                  <a:noFill/>
-                </a:ln>
-                <a:solidFill>
-                  <a:srgbClr val="000000"/>
-                </a:solidFill>
-                <a:effectLst/>
-                <a:latin typeface="+mn-lt"/>
-                <a:ea typeface="Source Sans Pro Light" panose="020B0403030403020204" pitchFamily="34" charset="0"/>
-                <a:sym typeface="Neutraface Text Book" charset="0"/>
-              </a:rPr>
-              <a:t>Label </a:t>
-            </a:r>
-            <a:r>
-              <a:rPr kumimoji="0" lang="de-CH" sz="1800" b="1" i="0" u="none" strike="noStrike" cap="none" normalizeH="0" baseline="0" dirty="0" err="1">
-                <a:ln>
-                  <a:noFill/>
-                </a:ln>
-                <a:solidFill>
-                  <a:srgbClr val="000000"/>
-                </a:solidFill>
-                <a:effectLst/>
-                <a:latin typeface="+mn-lt"/>
-                <a:ea typeface="Source Sans Pro Light" panose="020B0403030403020204" pitchFamily="34" charset="0"/>
-                <a:sym typeface="Neutraface Text Book" charset="0"/>
-              </a:rPr>
-              <a:t>Classifier</a:t>
-            </a:r>
-            <a:r>
-              <a:rPr kumimoji="0" lang="de-CH" sz="1800" b="1" i="0" u="none" strike="noStrike" cap="none" normalizeH="0" baseline="0" dirty="0">
-                <a:ln>
-                  <a:noFill/>
-                </a:ln>
-                <a:solidFill>
-                  <a:srgbClr val="000000"/>
-                </a:solidFill>
-                <a:effectLst/>
-                <a:latin typeface="+mn-lt"/>
-                <a:ea typeface="Source Sans Pro Light" panose="020B0403030403020204" pitchFamily="34" charset="0"/>
-                <a:sym typeface="Neutraface Text Book" charset="0"/>
-              </a:rPr>
-              <a:t> Model</a:t>
-            </a:r>
-          </a:p>
-        </p:txBody>
-      </p:sp>
-      <p:sp>
-        <p:nvSpPr>
-          <p:cNvPr id="15" name="Ellipse 14">
-            <a:extLst>
-              <a:ext uri="{FF2B5EF4-FFF2-40B4-BE49-F238E27FC236}">
-                <a16:creationId xmlns:a16="http://schemas.microsoft.com/office/drawing/2014/main" id="{BEE4FDB0-288D-4D91-9BFF-3658D8A96213}"/>
-              </a:ext>
-            </a:extLst>
-          </p:cNvPr>
-          <p:cNvSpPr/>
-          <p:nvPr/>
-        </p:nvSpPr>
-        <p:spPr bwMode="auto">
-          <a:xfrm>
-            <a:off x="560512" y="4071628"/>
-            <a:ext cx="1692188" cy="828092"/>
-          </a:xfrm>
-          <a:prstGeom prst="ellipse">
-            <a:avLst/>
-          </a:prstGeom>
-          <a:solidFill>
-            <a:schemeClr val="accent2">
-              <a:lumMod val="20000"/>
-              <a:lumOff val="80000"/>
-            </a:schemeClr>
-          </a:solidFill>
-          <a:ln w="9525" cap="flat" cmpd="sng" algn="ctr">
-            <a:solidFill>
-              <a:srgbClr val="000000"/>
-            </a:solidFill>
-            <a:prstDash val="solid"/>
-            <a:round/>
-            <a:headEnd type="none" w="med" len="med"/>
-            <a:tailEnd type="none" w="med" len="med"/>
-          </a:ln>
-          <a:effectLst/>
-          <a:extLst>
-            <a:ext uri="{AF507438-7753-43e0-B8FC-AC1667EBCBE1}">
-              <a14:hiddenEffects xmlns="" xmlns:a14="http://schemas.microsoft.com/office/drawing/2010/main">
-                <a:effectLst>
-                  <a:outerShdw blurRad="63500" dist="38099" dir="2700000" algn="ctr" rotWithShape="0">
-                    <a:schemeClr val="bg2">
-                      <a:alpha val="74998"/>
-                    </a:schemeClr>
-                  </a:outerShdw>
-                </a:effectLst>
-              </a14:hiddenEffects>
-            </a:ext>
-          </a:extLst>
-        </p:spPr>
-        <p:txBody>
-          <a:bodyPr vert="horz" wrap="square" lIns="91440" tIns="45720" rIns="91440" bIns="45720" numCol="1" rtlCol="0" anchor="ctr" anchorCtr="0" compatLnSpc="1">
-            <a:prstTxWarp prst="textNoShape">
-              <a:avLst/>
-            </a:prstTxWarp>
-          </a:bodyPr>
-          <a:lstStyle/>
-          <a:p>
-            <a:pPr marL="0" marR="0" indent="0" algn="ctr" defTabSz="914400" rtl="0" eaLnBrk="1" fontAlgn="base" latinLnBrk="0" hangingPunct="1">
-              <a:lnSpc>
-                <a:spcPct val="100000"/>
-              </a:lnSpc>
-              <a:spcBef>
-                <a:spcPct val="0"/>
-              </a:spcBef>
-              <a:spcAft>
-                <a:spcPct val="0"/>
-              </a:spcAft>
-              <a:buClrTx/>
-              <a:buSzTx/>
-              <a:buFontTx/>
-              <a:buNone/>
-              <a:tabLst/>
-            </a:pPr>
-            <a:r>
-              <a:rPr kumimoji="0" lang="de-CH" sz="1400" b="1" i="0" u="none" strike="noStrike" cap="none" normalizeH="0" baseline="0" dirty="0" err="1">
-                <a:ln>
-                  <a:noFill/>
-                </a:ln>
-                <a:solidFill>
-                  <a:srgbClr val="000000"/>
-                </a:solidFill>
-                <a:effectLst/>
-                <a:latin typeface="+mn-lt"/>
-                <a:ea typeface="Source Sans Pro Light" panose="020B0403030403020204" pitchFamily="34" charset="0"/>
-                <a:sym typeface="Neutraface Text Book" charset="0"/>
-              </a:rPr>
-              <a:t>Unlabeled</a:t>
-            </a:r>
-            <a:endParaRPr kumimoji="0" lang="de-CH" sz="1400" b="1" i="0" u="none" strike="noStrike" cap="none" normalizeH="0" baseline="0" dirty="0">
-              <a:ln>
-                <a:noFill/>
-              </a:ln>
-              <a:solidFill>
-                <a:srgbClr val="000000"/>
-              </a:solidFill>
-              <a:effectLst/>
-              <a:latin typeface="+mn-lt"/>
-              <a:ea typeface="Source Sans Pro Light" panose="020B0403030403020204" pitchFamily="34" charset="0"/>
-              <a:sym typeface="Neutraface Text Book" charset="0"/>
-            </a:endParaRPr>
-          </a:p>
-          <a:p>
-            <a:pPr marL="0" marR="0" indent="0" algn="ctr" defTabSz="914400" rtl="0" eaLnBrk="1" fontAlgn="base" latinLnBrk="0" hangingPunct="1">
-              <a:lnSpc>
-                <a:spcPct val="100000"/>
-              </a:lnSpc>
-              <a:spcBef>
-                <a:spcPct val="0"/>
-              </a:spcBef>
-              <a:spcAft>
-                <a:spcPct val="0"/>
-              </a:spcAft>
-              <a:buClrTx/>
-              <a:buSzTx/>
-              <a:buFontTx/>
-              <a:buNone/>
-              <a:tabLst/>
-            </a:pPr>
-            <a:r>
-              <a:rPr lang="de-CH" sz="1400" b="1" dirty="0">
-                <a:latin typeface="+mn-lt"/>
-                <a:ea typeface="Source Sans Pro Light" panose="020B0403030403020204" pitchFamily="34" charset="0"/>
-              </a:rPr>
-              <a:t>Instagram </a:t>
-            </a:r>
-          </a:p>
-          <a:p>
-            <a:pPr marL="0" marR="0" indent="0" algn="ctr" defTabSz="914400" rtl="0" eaLnBrk="1" fontAlgn="base" latinLnBrk="0" hangingPunct="1">
-              <a:lnSpc>
-                <a:spcPct val="100000"/>
-              </a:lnSpc>
-              <a:spcBef>
-                <a:spcPct val="0"/>
-              </a:spcBef>
-              <a:spcAft>
-                <a:spcPct val="0"/>
-              </a:spcAft>
-              <a:buClrTx/>
-              <a:buSzTx/>
-              <a:buFontTx/>
-              <a:buNone/>
-              <a:tabLst/>
-            </a:pPr>
-            <a:r>
-              <a:rPr lang="de-CH" sz="1400" b="1" dirty="0">
-                <a:latin typeface="+mn-lt"/>
-                <a:ea typeface="Source Sans Pro Light" panose="020B0403030403020204" pitchFamily="34" charset="0"/>
-              </a:rPr>
-              <a:t>Images</a:t>
-            </a:r>
-            <a:endParaRPr kumimoji="0" lang="de-CH" sz="1400" b="1" i="0" u="none" strike="noStrike" cap="none" normalizeH="0" baseline="0" dirty="0">
-              <a:ln>
-                <a:noFill/>
-              </a:ln>
-              <a:solidFill>
-                <a:srgbClr val="000000"/>
-              </a:solidFill>
-              <a:effectLst/>
-              <a:latin typeface="+mn-lt"/>
-              <a:ea typeface="Source Sans Pro Light" panose="020B0403030403020204" pitchFamily="34" charset="0"/>
-              <a:sym typeface="Neutraface Text Book" charset="0"/>
-            </a:endParaRPr>
-          </a:p>
-        </p:txBody>
-      </p:sp>
-      <p:sp>
-        <p:nvSpPr>
-          <p:cNvPr id="7" name="Flussdiagramm: Grenzstelle 6">
-            <a:extLst>
-              <a:ext uri="{FF2B5EF4-FFF2-40B4-BE49-F238E27FC236}">
-                <a16:creationId xmlns:a16="http://schemas.microsoft.com/office/drawing/2014/main" id="{24BFB8EF-596F-488A-904E-C38070F84557}"/>
-              </a:ext>
-            </a:extLst>
-          </p:cNvPr>
-          <p:cNvSpPr/>
-          <p:nvPr/>
-        </p:nvSpPr>
-        <p:spPr bwMode="auto">
-          <a:xfrm>
-            <a:off x="6645188" y="5199755"/>
-            <a:ext cx="1980220" cy="1001553"/>
-          </a:xfrm>
-          <a:prstGeom prst="flowChartTerminator">
-            <a:avLst/>
-          </a:prstGeom>
-          <a:solidFill>
-            <a:srgbClr val="00B0F0"/>
-          </a:solidFill>
-          <a:ln w="9525" cap="flat" cmpd="sng" algn="ctr">
-            <a:solidFill>
-              <a:srgbClr val="000000"/>
-            </a:solidFill>
-            <a:prstDash val="solid"/>
-            <a:round/>
-            <a:headEnd type="none" w="med" len="med"/>
-            <a:tailEnd type="none" w="med" len="med"/>
-          </a:ln>
-          <a:effectLst/>
-          <a:extLst>
-            <a:ext uri="{AF507438-7753-43e0-B8FC-AC1667EBCBE1}">
-              <a14:hiddenEffects xmlns="" xmlns:a14="http://schemas.microsoft.com/office/drawing/2010/main">
-                <a:effectLst>
-                  <a:outerShdw blurRad="63500" dist="38099" dir="2700000" algn="ctr" rotWithShape="0">
-                    <a:schemeClr val="bg2">
-                      <a:alpha val="74998"/>
-                    </a:schemeClr>
-                  </a:outerShdw>
-                </a:effectLst>
-              </a14:hiddenEffects>
-            </a:ext>
-          </a:extLst>
-        </p:spPr>
-        <p:txBody>
-          <a:bodyPr vert="horz" wrap="square" lIns="91440" tIns="45720" rIns="91440" bIns="45720" numCol="1" rtlCol="0" anchor="ctr" anchorCtr="0" compatLnSpc="1">
-            <a:prstTxWarp prst="textNoShape">
-              <a:avLst/>
-            </a:prstTxWarp>
-          </a:bodyPr>
-          <a:lstStyle/>
-          <a:p>
-            <a:pPr marL="0" marR="0" indent="0" algn="ctr" defTabSz="914400" rtl="0" eaLnBrk="1" fontAlgn="base" latinLnBrk="0" hangingPunct="1">
-              <a:lnSpc>
-                <a:spcPct val="100000"/>
-              </a:lnSpc>
-              <a:spcBef>
-                <a:spcPct val="0"/>
-              </a:spcBef>
-              <a:spcAft>
-                <a:spcPct val="0"/>
-              </a:spcAft>
-              <a:buClrTx/>
-              <a:buSzTx/>
-              <a:buFontTx/>
-              <a:buNone/>
-              <a:tabLst/>
-            </a:pPr>
-            <a:r>
-              <a:rPr kumimoji="0" lang="de-CH" sz="1800" b="1" i="0" u="none" strike="noStrike" cap="none" normalizeH="0" baseline="0" dirty="0">
-                <a:ln>
-                  <a:noFill/>
-                </a:ln>
-                <a:solidFill>
-                  <a:srgbClr val="000000"/>
-                </a:solidFill>
-                <a:effectLst/>
-                <a:latin typeface="+mn-lt"/>
-                <a:ea typeface="Source Sans Pro Light" panose="020B0403030403020204" pitchFamily="34" charset="0"/>
-                <a:sym typeface="Neutraface Text Book" charset="0"/>
-              </a:rPr>
-              <a:t>Web </a:t>
-            </a:r>
-            <a:r>
-              <a:rPr kumimoji="0" lang="de-CH" sz="1800" b="1" i="0" u="none" strike="noStrike" cap="none" normalizeH="0" baseline="0" dirty="0" err="1">
-                <a:ln>
-                  <a:noFill/>
-                </a:ln>
-                <a:solidFill>
-                  <a:srgbClr val="000000"/>
-                </a:solidFill>
-                <a:effectLst/>
-                <a:latin typeface="+mn-lt"/>
-                <a:ea typeface="Source Sans Pro Light" panose="020B0403030403020204" pitchFamily="34" charset="0"/>
-                <a:sym typeface="Neutraface Text Book" charset="0"/>
-              </a:rPr>
-              <a:t>Application</a:t>
-            </a:r>
-            <a:endParaRPr kumimoji="0" lang="de-CH" sz="1800" b="1" i="0" u="none" strike="noStrike" cap="none" normalizeH="0" baseline="0" dirty="0">
-              <a:ln>
-                <a:noFill/>
-              </a:ln>
-              <a:solidFill>
-                <a:srgbClr val="000000"/>
-              </a:solidFill>
-              <a:effectLst/>
-              <a:latin typeface="+mn-lt"/>
-              <a:ea typeface="Source Sans Pro Light" panose="020B0403030403020204" pitchFamily="34" charset="0"/>
-              <a:sym typeface="Neutraface Text Book" charset="0"/>
-            </a:endParaRPr>
-          </a:p>
-        </p:txBody>
-      </p:sp>
-      <p:sp>
-        <p:nvSpPr>
-          <p:cNvPr id="17" name="Rechteck 16">
-            <a:extLst>
-              <a:ext uri="{FF2B5EF4-FFF2-40B4-BE49-F238E27FC236}">
-                <a16:creationId xmlns:a16="http://schemas.microsoft.com/office/drawing/2014/main" id="{5D907F3D-84A5-4CBC-9909-71D9D0AB900E}"/>
-              </a:ext>
-            </a:extLst>
-          </p:cNvPr>
-          <p:cNvSpPr/>
-          <p:nvPr/>
-        </p:nvSpPr>
-        <p:spPr bwMode="auto">
-          <a:xfrm>
-            <a:off x="3128256" y="5286485"/>
-            <a:ext cx="1836204" cy="828092"/>
-          </a:xfrm>
-          <a:prstGeom prst="rect">
-            <a:avLst/>
-          </a:prstGeom>
-          <a:solidFill>
-            <a:srgbClr val="BBE0E3"/>
-          </a:solidFill>
-          <a:ln w="9525" cap="flat" cmpd="sng" algn="ctr">
-            <a:solidFill>
-              <a:srgbClr val="000000"/>
-            </a:solidFill>
-            <a:prstDash val="solid"/>
-            <a:round/>
-            <a:headEnd type="none" w="med" len="med"/>
-            <a:tailEnd type="none" w="med" len="med"/>
-          </a:ln>
-          <a:effectLst/>
-          <a:extLst>
-            <a:ext uri="{AF507438-7753-43e0-B8FC-AC1667EBCBE1}">
-              <a14:hiddenEffects xmlns="" xmlns:a14="http://schemas.microsoft.com/office/drawing/2010/main">
-                <a:effectLst>
-                  <a:outerShdw blurRad="63500" dist="38099" dir="2700000" algn="ctr" rotWithShape="0">
-                    <a:schemeClr val="bg2">
-                      <a:alpha val="74998"/>
-                    </a:schemeClr>
-                  </a:outerShdw>
-                </a:effectLst>
-              </a14:hiddenEffects>
-            </a:ext>
-          </a:extLst>
-        </p:spPr>
-        <p:txBody>
-          <a:bodyPr vert="horz" wrap="square" lIns="91440" tIns="45720" rIns="91440" bIns="45720" numCol="1" rtlCol="0" anchor="ctr" anchorCtr="0" compatLnSpc="1">
-            <a:prstTxWarp prst="textNoShape">
-              <a:avLst/>
-            </a:prstTxWarp>
-          </a:bodyPr>
-          <a:lstStyle/>
-          <a:p>
-            <a:pPr marL="0" marR="0" indent="0" algn="ctr" defTabSz="914400" rtl="0" eaLnBrk="1" fontAlgn="base" latinLnBrk="0" hangingPunct="1">
-              <a:lnSpc>
-                <a:spcPct val="100000"/>
-              </a:lnSpc>
-              <a:spcBef>
-                <a:spcPct val="0"/>
-              </a:spcBef>
-              <a:spcAft>
-                <a:spcPct val="0"/>
-              </a:spcAft>
-              <a:buClrTx/>
-              <a:buSzTx/>
-              <a:buFontTx/>
-              <a:buNone/>
-              <a:tabLst/>
-            </a:pPr>
-            <a:r>
-              <a:rPr kumimoji="0" lang="de-CH" sz="1800" b="1" i="0" u="none" strike="noStrike" cap="none" normalizeH="0" baseline="0" dirty="0">
-                <a:ln>
-                  <a:noFill/>
-                </a:ln>
-                <a:solidFill>
-                  <a:srgbClr val="000000"/>
-                </a:solidFill>
-                <a:effectLst/>
-                <a:latin typeface="+mn-lt"/>
-                <a:ea typeface="Source Sans Pro Light" panose="020B0403030403020204" pitchFamily="34" charset="0"/>
-                <a:sym typeface="Neutraface Text Book" charset="0"/>
-              </a:rPr>
               <a:t>Model </a:t>
             </a:r>
             <a:r>
@@ -28967,7 +28602,7 @@
         </p:nvSpPr>
         <p:spPr bwMode="auto">
           <a:xfrm>
-            <a:off x="3008784" y="2786372"/>
+            <a:off x="3008784" y="3188096"/>
             <a:ext cx="4320480" cy="1020231"/>
           </a:xfrm>
           <a:prstGeom prst="rect">
@@ -29039,206 +28674,6 @@
       </p:sp>
       <p:cxnSp>
         <p:nvCxnSpPr>
-          <p:cNvPr id="20" name="Gerade Verbindung mit Pfeil 19">
-            <a:extLst>
-              <a:ext uri="{FF2B5EF4-FFF2-40B4-BE49-F238E27FC236}">
-                <a16:creationId xmlns:a16="http://schemas.microsoft.com/office/drawing/2014/main" id="{8B2C36A0-2120-41F6-AE2F-10711B490AA3}"/>
-              </a:ext>
-            </a:extLst>
-          </p:cNvPr>
-          <p:cNvCxnSpPr>
-            <a:stCxn id="3" idx="6"/>
-            <a:endCxn id="5" idx="1"/>
-          </p:cNvCxnSpPr>
-          <p:nvPr/>
-        </p:nvCxnSpPr>
-        <p:spPr bwMode="auto">
-          <a:xfrm>
-            <a:off x="2249826" y="2078850"/>
-            <a:ext cx="878430" cy="0"/>
-          </a:xfrm>
-          <a:prstGeom prst="straightConnector1">
-            <a:avLst/>
-          </a:prstGeom>
-          <a:solidFill>
-            <a:srgbClr val="BBE0E3"/>
-          </a:solidFill>
-          <a:ln w="9525" cap="flat" cmpd="sng" algn="ctr">
-            <a:solidFill>
-              <a:srgbClr val="000000"/>
-            </a:solidFill>
-            <a:prstDash val="solid"/>
-            <a:round/>
-            <a:headEnd type="none" w="med" len="med"/>
-            <a:tailEnd type="triangle"/>
-          </a:ln>
-          <a:effectLst/>
-          <a:extLst>
-            <a:ext uri="{AF507438-7753-43e0-B8FC-AC1667EBCBE1}">
-              <a14:hiddenEffects xmlns="" xmlns:a14="http://schemas.microsoft.com/office/drawing/2010/main">
-                <a:effectLst>
-                  <a:outerShdw blurRad="63500" dist="38099" dir="2700000" algn="ctr" rotWithShape="0">
-                    <a:schemeClr val="bg2">
-                      <a:alpha val="74998"/>
-                    </a:schemeClr>
-                  </a:outerShdw>
-                </a:effectLst>
-              </a14:hiddenEffects>
-            </a:ext>
-          </a:extLst>
-        </p:spPr>
-      </p:cxnSp>
-      <p:cxnSp>
-        <p:nvCxnSpPr>
-          <p:cNvPr id="23" name="Gerade Verbindung mit Pfeil 22">
-            <a:extLst>
-              <a:ext uri="{FF2B5EF4-FFF2-40B4-BE49-F238E27FC236}">
-                <a16:creationId xmlns:a16="http://schemas.microsoft.com/office/drawing/2014/main" id="{94D88891-4F9C-4FC3-9620-5D1920CBE889}"/>
-              </a:ext>
-            </a:extLst>
-          </p:cNvPr>
-          <p:cNvCxnSpPr/>
-          <p:nvPr/>
-        </p:nvCxnSpPr>
-        <p:spPr bwMode="auto">
-          <a:xfrm>
-            <a:off x="2261286" y="4485674"/>
-            <a:ext cx="866970" cy="0"/>
-          </a:xfrm>
-          <a:prstGeom prst="straightConnector1">
-            <a:avLst/>
-          </a:prstGeom>
-          <a:solidFill>
-            <a:srgbClr val="BBE0E3"/>
-          </a:solidFill>
-          <a:ln w="9525" cap="flat" cmpd="sng" algn="ctr">
-            <a:solidFill>
-              <a:srgbClr val="000000"/>
-            </a:solidFill>
-            <a:prstDash val="solid"/>
-            <a:round/>
-            <a:headEnd type="none" w="med" len="med"/>
-            <a:tailEnd type="triangle"/>
-          </a:ln>
-          <a:effectLst/>
-          <a:extLst>
-            <a:ext uri="{AF507438-7753-43e0-B8FC-AC1667EBCBE1}">
-              <a14:hiddenEffects xmlns="" xmlns:a14="http://schemas.microsoft.com/office/drawing/2010/main">
-                <a:effectLst>
-                  <a:outerShdw blurRad="63500" dist="38099" dir="2700000" algn="ctr" rotWithShape="0">
-                    <a:schemeClr val="bg2">
-                      <a:alpha val="74998"/>
-                    </a:schemeClr>
-                  </a:outerShdw>
-                </a:effectLst>
-              </a14:hiddenEffects>
-            </a:ext>
-          </a:extLst>
-        </p:spPr>
-      </p:cxnSp>
-      <p:cxnSp>
-        <p:nvCxnSpPr>
-          <p:cNvPr id="28" name="Gerade Verbindung mit Pfeil 27">
-            <a:extLst>
-              <a:ext uri="{FF2B5EF4-FFF2-40B4-BE49-F238E27FC236}">
-                <a16:creationId xmlns:a16="http://schemas.microsoft.com/office/drawing/2014/main" id="{462AC879-1391-4F75-A3A7-BF367CAC4C76}"/>
-              </a:ext>
-            </a:extLst>
-          </p:cNvPr>
-          <p:cNvCxnSpPr>
-            <a:stCxn id="14" idx="2"/>
-            <a:endCxn id="17" idx="0"/>
-          </p:cNvCxnSpPr>
-          <p:nvPr/>
-        </p:nvCxnSpPr>
-        <p:spPr bwMode="auto">
-          <a:xfrm>
-            <a:off x="4046358" y="4899720"/>
-            <a:ext cx="0" cy="386765"/>
-          </a:xfrm>
-          <a:prstGeom prst="straightConnector1">
-            <a:avLst/>
-          </a:prstGeom>
-          <a:solidFill>
-            <a:srgbClr val="BBE0E3"/>
-          </a:solidFill>
-          <a:ln w="9525" cap="flat" cmpd="sng" algn="ctr">
-            <a:solidFill>
-              <a:srgbClr val="000000"/>
-            </a:solidFill>
-            <a:prstDash val="solid"/>
-            <a:round/>
-            <a:headEnd type="none" w="med" len="med"/>
-            <a:tailEnd type="triangle"/>
-          </a:ln>
-          <a:effectLst/>
-          <a:extLst>
-            <a:ext uri="{AF507438-7753-43e0-B8FC-AC1667EBCBE1}">
-              <a14:hiddenEffects xmlns="" xmlns:a14="http://schemas.microsoft.com/office/drawing/2010/main">
-                <a:effectLst>
-                  <a:outerShdw blurRad="63500" dist="38099" dir="2700000" algn="ctr" rotWithShape="0">
-                    <a:schemeClr val="bg2">
-                      <a:alpha val="74998"/>
-                    </a:schemeClr>
-                  </a:outerShdw>
-                </a:effectLst>
-              </a14:hiddenEffects>
-            </a:ext>
-          </a:extLst>
-        </p:spPr>
-      </p:cxnSp>
-      <p:cxnSp>
-        <p:nvCxnSpPr>
-          <p:cNvPr id="31" name="Gerade Verbindung mit Pfeil 30">
-            <a:extLst>
-              <a:ext uri="{FF2B5EF4-FFF2-40B4-BE49-F238E27FC236}">
-                <a16:creationId xmlns:a16="http://schemas.microsoft.com/office/drawing/2014/main" id="{6336D857-52ED-48AA-9A24-5E0A47DF7C4D}"/>
-              </a:ext>
-            </a:extLst>
-          </p:cNvPr>
-          <p:cNvCxnSpPr>
-            <a:stCxn id="5" idx="2"/>
-          </p:cNvCxnSpPr>
-          <p:nvPr/>
-        </p:nvCxnSpPr>
-        <p:spPr bwMode="auto">
-          <a:xfrm>
-            <a:off x="4046358" y="2492896"/>
-            <a:ext cx="0" cy="293476"/>
-          </a:xfrm>
-          <a:prstGeom prst="straightConnector1">
-            <a:avLst/>
-          </a:prstGeom>
-          <a:solidFill>
-            <a:srgbClr val="BBE0E3"/>
-          </a:solidFill>
-          <a:ln w="9525" cap="flat" cmpd="sng" algn="ctr">
-            <a:solidFill>
-              <a:srgbClr val="000000"/>
-            </a:solidFill>
-            <a:prstDash val="solid"/>
-            <a:round/>
-            <a:headEnd type="none" w="med" len="med"/>
-            <a:tailEnd type="triangle"/>
-          </a:ln>
-          <a:effectLst/>
-          <a:extLst>
-            <a:ext uri="{AF507438-7753-43e0-B8FC-AC1667EBCBE1}">
-              <a14:hiddenEffects xmlns="" xmlns:a14="http://schemas.microsoft.com/office/drawing/2010/main">
-                <a:effectLst>
-                  <a:outerShdw blurRad="63500" dist="38099" dir="2700000" algn="ctr" rotWithShape="0">
-                    <a:schemeClr val="bg2">
-                      <a:alpha val="74998"/>
-                    </a:schemeClr>
-                  </a:outerShdw>
-                </a:effectLst>
-              </a14:hiddenEffects>
-            </a:ext>
-          </a:extLst>
-        </p:spPr>
-      </p:cxnSp>
-      <p:cxnSp>
-        <p:nvCxnSpPr>
           <p:cNvPr id="33" name="Gerade Verbindung mit Pfeil 32">
             <a:extLst>
               <a:ext uri="{FF2B5EF4-FFF2-40B4-BE49-F238E27FC236}">
@@ -29253,7 +28688,7 @@
         </p:nvCxnSpPr>
         <p:spPr bwMode="auto">
           <a:xfrm>
-            <a:off x="4046358" y="3806603"/>
+            <a:off x="4046358" y="4203030"/>
             <a:ext cx="0" cy="265025"/>
           </a:xfrm>
           <a:prstGeom prst="straightConnector1">
@@ -29304,8 +28739,8 @@
         </p:nvCxnSpPr>
         <p:spPr bwMode="auto">
           <a:xfrm>
-            <a:off x="4964460" y="5700531"/>
-            <a:ext cx="1680728" cy="1"/>
+            <a:off x="4964460" y="5987214"/>
+            <a:ext cx="1670396" cy="0"/>
           </a:xfrm>
           <a:prstGeom prst="straightConnector1">
             <a:avLst/>
@@ -29355,8 +28790,8 @@
         </p:nvCxnSpPr>
         <p:spPr bwMode="auto">
           <a:xfrm>
-            <a:off x="5820751" y="3288227"/>
-            <a:ext cx="545008" cy="0"/>
+            <a:off x="5565068" y="3686830"/>
+            <a:ext cx="800691" cy="11381"/>
           </a:xfrm>
           <a:prstGeom prst="straightConnector1">
             <a:avLst/>
@@ -29403,7 +28838,7 @@
         </p:nvSpPr>
         <p:spPr bwMode="auto">
           <a:xfrm>
-            <a:off x="3722322" y="3394963"/>
+            <a:off x="3731724" y="3754973"/>
             <a:ext cx="648072" cy="242237"/>
           </a:xfrm>
           <a:prstGeom prst="curvedUpArrow">
@@ -29490,7 +28925,7 @@
         </p:nvSpPr>
         <p:spPr bwMode="auto">
           <a:xfrm rot="10800000">
-            <a:off x="3708822" y="2928269"/>
+            <a:off x="3699764" y="3349274"/>
             <a:ext cx="648072" cy="242237"/>
           </a:xfrm>
           <a:prstGeom prst="curvedUpArrow">
@@ -29577,13 +29012,13 @@
         </p:nvSpPr>
         <p:spPr bwMode="auto">
           <a:xfrm>
-            <a:off x="7658485" y="2620620"/>
-            <a:ext cx="2155055" cy="1274196"/>
+            <a:off x="7643633" y="3031123"/>
+            <a:ext cx="2155055" cy="1288947"/>
           </a:xfrm>
           <a:prstGeom prst="wedgeRoundRectCallout">
             <a:avLst>
-              <a:gd name="adj1" fmla="val -64967"/>
-              <a:gd name="adj2" fmla="val 295"/>
+              <a:gd name="adj1" fmla="val -63719"/>
+              <a:gd name="adj2" fmla="val 2057"/>
               <a:gd name="adj3" fmla="val 16667"/>
             </a:avLst>
           </a:prstGeom>
@@ -29680,7 +29115,7 @@
               <a:rPr lang="de-CH" sz="1200" dirty="0" err="1">
                 <a:latin typeface="+mn-lt"/>
               </a:rPr>
-              <a:t>Each</a:t>
+              <a:t>We</a:t>
             </a:r>
             <a:r>
               <a:rPr lang="de-CH" sz="1200" dirty="0">
@@ -29692,19 +29127,7 @@
               <a:rPr lang="de-CH" sz="1200" dirty="0" err="1">
                 <a:latin typeface="+mn-lt"/>
               </a:rPr>
-              <a:t>classifier</a:t>
-            </a:r>
-            <a:r>
-              <a:rPr lang="de-CH" sz="1200" dirty="0">
-                <a:latin typeface="+mn-lt"/>
-              </a:rPr>
-              <a:t> was </a:t>
-            </a:r>
-            <a:r>
-              <a:rPr lang="de-CH" sz="1200" dirty="0" err="1">
-                <a:latin typeface="+mn-lt"/>
-              </a:rPr>
-              <a:t>trained</a:t>
+              <a:t>train</a:t>
             </a:r>
             <a:r>
               <a:rPr lang="de-CH" sz="1200" dirty="0">
@@ -29716,7 +29139,7 @@
               <a:rPr lang="de-CH" sz="1200" dirty="0" err="1">
                 <a:latin typeface="+mn-lt"/>
               </a:rPr>
-              <a:t>independently</a:t>
+              <a:t>for</a:t>
             </a:r>
             <a:r>
               <a:rPr lang="de-CH" sz="1200" dirty="0">
@@ -29728,7 +29151,7 @@
               <a:rPr lang="de-CH" sz="1200" dirty="0" err="1">
                 <a:latin typeface="+mn-lt"/>
               </a:rPr>
-              <a:t>with</a:t>
+              <a:t>each</a:t>
             </a:r>
             <a:r>
               <a:rPr lang="de-CH" sz="1200" dirty="0">
@@ -29740,7 +29163,19 @@
               <a:rPr lang="de-CH" sz="1200" dirty="0" err="1">
                 <a:latin typeface="+mn-lt"/>
               </a:rPr>
-              <a:t>the</a:t>
+              <a:t>attribute</a:t>
+            </a:r>
+            <a:r>
+              <a:rPr lang="de-CH" sz="1200" dirty="0">
+                <a:latin typeface="+mn-lt"/>
+              </a:rPr>
+              <a:t> a </a:t>
+            </a:r>
+            <a:r>
+              <a:rPr lang="de-CH" sz="1200" dirty="0" err="1">
+                <a:latin typeface="+mn-lt"/>
+              </a:rPr>
+              <a:t>classifier</a:t>
             </a:r>
             <a:r>
               <a:rPr lang="de-CH" sz="1200" dirty="0">
@@ -29752,6 +29187,42 @@
               <a:rPr lang="de-CH" sz="1200" dirty="0" err="1">
                 <a:latin typeface="+mn-lt"/>
               </a:rPr>
+              <a:t>independently</a:t>
+            </a:r>
+            <a:r>
+              <a:rPr lang="de-CH" sz="1200" dirty="0">
+                <a:latin typeface="+mn-lt"/>
+              </a:rPr>
+              <a:t> </a:t>
+            </a:r>
+            <a:r>
+              <a:rPr lang="de-CH" sz="1200" dirty="0" err="1">
+                <a:latin typeface="+mn-lt"/>
+              </a:rPr>
+              <a:t>with</a:t>
+            </a:r>
+            <a:r>
+              <a:rPr lang="de-CH" sz="1200" dirty="0">
+                <a:latin typeface="+mn-lt"/>
+              </a:rPr>
+              <a:t> </a:t>
+            </a:r>
+            <a:r>
+              <a:rPr lang="de-CH" sz="1200" dirty="0" err="1">
+                <a:latin typeface="+mn-lt"/>
+              </a:rPr>
+              <a:t>the</a:t>
+            </a:r>
+            <a:r>
+              <a:rPr lang="de-CH" sz="1200" dirty="0">
+                <a:latin typeface="+mn-lt"/>
+              </a:rPr>
+              <a:t> </a:t>
+            </a:r>
+            <a:r>
+              <a:rPr lang="de-CH" sz="1200" dirty="0" err="1">
+                <a:latin typeface="+mn-lt"/>
+              </a:rPr>
               <a:t>corresponding</a:t>
             </a:r>
             <a:r>
@@ -29778,19 +29249,12 @@
               </a:rPr>
               <a:t>dataset</a:t>
             </a:r>
-            <a:endParaRPr kumimoji="0" lang="de-CH" sz="1200" b="0" i="0" u="none" strike="noStrike" cap="none" normalizeH="0" baseline="0" dirty="0">
-              <a:ln>
-                <a:noFill/>
-              </a:ln>
-              <a:solidFill>
-                <a:srgbClr val="000000"/>
-              </a:solidFill>
-              <a:effectLst/>
-              <a:latin typeface="+mn-lt"/>
-              <a:ea typeface="ヒラギノ角ゴ ProN W3" charset="0"/>
-              <a:cs typeface="ヒラギノ角ゴ ProN W3" charset="0"/>
-              <a:sym typeface="Neutraface Text Book" charset="0"/>
-            </a:endParaRPr>
+            <a:r>
+              <a:rPr lang="de-CH" sz="1200" dirty="0">
+                <a:latin typeface="+mn-lt"/>
+              </a:rPr>
+              <a:t>.</a:t>
+            </a:r>
           </a:p>
         </p:txBody>
       </p:sp>
@@ -29808,13 +29272,13 @@
         </p:nvSpPr>
         <p:spPr bwMode="auto">
           <a:xfrm>
-            <a:off x="5259037" y="3990088"/>
-            <a:ext cx="2070227" cy="679071"/>
+            <a:off x="5349044" y="4543057"/>
+            <a:ext cx="2412268" cy="712674"/>
           </a:xfrm>
           <a:prstGeom prst="wedgeRoundRectCallout">
             <a:avLst>
-              <a:gd name="adj1" fmla="val -63439"/>
-              <a:gd name="adj2" fmla="val 39805"/>
+              <a:gd name="adj1" fmla="val -65669"/>
+              <a:gd name="adj2" fmla="val 810"/>
               <a:gd name="adj3" fmla="val 16667"/>
             </a:avLst>
           </a:prstGeom>
@@ -29851,102 +29315,98 @@
           </a:bodyPr>
           <a:lstStyle/>
           <a:p>
-            <a:pPr marL="171450" marR="0" indent="-171450" algn="l" defTabSz="914400" rtl="0" eaLnBrk="1" fontAlgn="base" latinLnBrk="0" hangingPunct="1">
-              <a:lnSpc>
-                <a:spcPct val="100000"/>
-              </a:lnSpc>
-              <a:spcBef>
-                <a:spcPct val="0"/>
-              </a:spcBef>
-              <a:spcAft>
-                <a:spcPct val="0"/>
-              </a:spcAft>
-              <a:buClrTx/>
-              <a:buSzTx/>
-              <a:buFont typeface="Arial" panose="020B0604020202020204" pitchFamily="34" charset="0"/>
-              <a:buChar char="•"/>
-              <a:tabLst/>
-            </a:pPr>
-            <a:r>
-              <a:rPr lang="de-CH" sz="1200" dirty="0" err="1">
-                <a:latin typeface="+mn-lt"/>
-              </a:rPr>
+            <a:pPr eaLnBrk="1" hangingPunct="1"/>
+            <a:r>
+              <a:rPr lang="de-CH" sz="1200" dirty="0" err="1"/>
               <a:t>Each</a:t>
             </a:r>
             <a:r>
-              <a:rPr lang="de-CH" sz="1200" dirty="0">
-                <a:latin typeface="+mn-lt"/>
-              </a:rPr>
+              <a:rPr lang="de-CH" sz="1200" dirty="0"/>
               <a:t> </a:t>
             </a:r>
             <a:r>
-              <a:rPr lang="de-CH" sz="1200" dirty="0" err="1">
-                <a:latin typeface="+mn-lt"/>
-              </a:rPr>
-              <a:t>classifier</a:t>
-            </a:r>
-            <a:r>
-              <a:rPr lang="de-CH" sz="1200" dirty="0">
-                <a:latin typeface="+mn-lt"/>
-              </a:rPr>
+              <a:rPr lang="de-CH" sz="1200" dirty="0" err="1"/>
+              <a:t>image</a:t>
+            </a:r>
+            <a:r>
+              <a:rPr lang="de-CH" sz="1200" dirty="0"/>
               <a:t> </a:t>
             </a:r>
             <a:r>
-              <a:rPr lang="de-CH" sz="1200" dirty="0" err="1">
-                <a:latin typeface="+mn-lt"/>
-              </a:rPr>
-              <a:t>belongs</a:t>
-            </a:r>
-            <a:r>
-              <a:rPr lang="de-CH" sz="1200" dirty="0">
-                <a:latin typeface="+mn-lt"/>
-              </a:rPr>
+              <a:rPr lang="de-CH" sz="1200" dirty="0" err="1"/>
+              <a:t>is</a:t>
+            </a:r>
+            <a:r>
+              <a:rPr lang="de-CH" sz="1200" dirty="0"/>
               <a:t> </a:t>
             </a:r>
             <a:r>
-              <a:rPr lang="de-CH" sz="1200" dirty="0" err="1">
-                <a:latin typeface="+mn-lt"/>
-              </a:rPr>
+              <a:rPr lang="de-CH" sz="1200" dirty="0" err="1"/>
+              <a:t>given</a:t>
+            </a:r>
+            <a:r>
+              <a:rPr lang="de-CH" sz="1200" dirty="0"/>
+              <a:t> </a:t>
+            </a:r>
+            <a:r>
+              <a:rPr lang="de-CH" sz="1200" dirty="0" err="1"/>
+              <a:t>probabilities</a:t>
+            </a:r>
+            <a:r>
+              <a:rPr lang="de-CH" sz="1200" dirty="0"/>
+              <a:t> </a:t>
+            </a:r>
+            <a:r>
+              <a:rPr lang="de-CH" sz="1200" dirty="0" err="1"/>
+              <a:t>according</a:t>
+            </a:r>
+            <a:r>
+              <a:rPr lang="de-CH" sz="1200" dirty="0"/>
+              <a:t> </a:t>
+            </a:r>
+            <a:r>
+              <a:rPr lang="de-CH" sz="1200" dirty="0" err="1"/>
               <a:t>to</a:t>
             </a:r>
             <a:r>
-              <a:rPr lang="de-CH" sz="1200" dirty="0">
-                <a:latin typeface="+mn-lt"/>
-              </a:rPr>
-              <a:t> an </a:t>
-            </a:r>
-            <a:r>
-              <a:rPr lang="de-CH" sz="1200" dirty="0" err="1">
-                <a:latin typeface="+mn-lt"/>
-              </a:rPr>
-              <a:t>attribute</a:t>
-            </a:r>
-            <a:endParaRPr lang="de-CH" sz="1200" dirty="0">
-              <a:latin typeface="+mn-lt"/>
-            </a:endParaRPr>
-          </a:p>
-          <a:p>
-            <a:pPr marL="171450" indent="-171450" eaLnBrk="1" hangingPunct="1">
-              <a:buFont typeface="Arial" panose="020B0604020202020204" pitchFamily="34" charset="0"/>
-              <a:buChar char="•"/>
-            </a:pPr>
-            <a:r>
-              <a:rPr lang="de-CH" sz="1200" dirty="0">
-                <a:latin typeface="+mn-lt"/>
-              </a:rPr>
-              <a:t>Model </a:t>
-            </a:r>
-            <a:r>
-              <a:rPr lang="de-CH" sz="1200" dirty="0" err="1">
-                <a:latin typeface="+mn-lt"/>
-              </a:rPr>
-              <a:t>accuracy</a:t>
-            </a:r>
-            <a:r>
-              <a:rPr lang="de-CH" sz="1200" dirty="0">
-                <a:latin typeface="+mn-lt"/>
-              </a:rPr>
-              <a:t>: 73%</a:t>
+              <a:rPr lang="de-CH" sz="1200" dirty="0"/>
+              <a:t> </a:t>
+            </a:r>
+            <a:r>
+              <a:rPr lang="de-CH" sz="1200" dirty="0" err="1"/>
+              <a:t>the</a:t>
+            </a:r>
+            <a:r>
+              <a:rPr lang="de-CH" sz="1200" dirty="0"/>
+              <a:t> </a:t>
+            </a:r>
+            <a:r>
+              <a:rPr lang="de-CH" sz="1200" dirty="0" err="1"/>
+              <a:t>prediction</a:t>
+            </a:r>
+            <a:r>
+              <a:rPr lang="de-CH" sz="1200" dirty="0"/>
+              <a:t> </a:t>
+            </a:r>
+            <a:r>
+              <a:rPr lang="de-CH" sz="1200" dirty="0" err="1"/>
+              <a:t>of</a:t>
+            </a:r>
+            <a:r>
+              <a:rPr lang="de-CH" sz="1200" dirty="0"/>
+              <a:t> </a:t>
+            </a:r>
+            <a:r>
+              <a:rPr lang="de-CH" sz="1200" dirty="0" err="1"/>
+              <a:t>the</a:t>
+            </a:r>
+            <a:r>
+              <a:rPr lang="de-CH" sz="1200"/>
+              <a:t> different classifiers</a:t>
+            </a:r>
+            <a:r>
+              <a:rPr lang="de-CH" sz="1200" dirty="0"/>
+              <a:t>.</a:t>
             </a:r>
           </a:p>
         </p:txBody>
@@ -29965,8 +29425,8 @@
         </p:nvSpPr>
         <p:spPr bwMode="auto">
           <a:xfrm>
-            <a:off x="5259036" y="1561133"/>
-            <a:ext cx="2070227" cy="679071"/>
+            <a:off x="5069389" y="2018971"/>
+            <a:ext cx="1707093" cy="571501"/>
           </a:xfrm>
           <a:prstGeom prst="wedgeRoundRectCallout">
             <a:avLst>
@@ -30026,8 +29486,1263 @@
               <a:rPr lang="de-CH" sz="1200" dirty="0">
                 <a:latin typeface="+mn-lt"/>
               </a:rPr>
-              <a:t>…</a:t>
-            </a:r>
+              <a:t>6500 </a:t>
+            </a:r>
+            <a:r>
+              <a:rPr lang="de-CH" sz="1200" dirty="0" err="1">
+                <a:latin typeface="+mn-lt"/>
+              </a:rPr>
+              <a:t>images</a:t>
+            </a:r>
+            <a:r>
+              <a:rPr lang="de-CH" sz="1200" dirty="0">
+                <a:latin typeface="+mn-lt"/>
+              </a:rPr>
+              <a:t> </a:t>
+            </a:r>
+            <a:r>
+              <a:rPr lang="de-CH" sz="1200" dirty="0" err="1">
+                <a:latin typeface="+mn-lt"/>
+              </a:rPr>
+              <a:t>are</a:t>
+            </a:r>
+            <a:r>
+              <a:rPr lang="de-CH" sz="1200" dirty="0">
+                <a:latin typeface="+mn-lt"/>
+              </a:rPr>
+              <a:t> </a:t>
+            </a:r>
+            <a:r>
+              <a:rPr lang="de-CH" sz="1200" dirty="0" err="1">
+                <a:latin typeface="+mn-lt"/>
+              </a:rPr>
+              <a:t>used</a:t>
+            </a:r>
+            <a:r>
+              <a:rPr lang="de-CH" sz="1200" dirty="0">
+                <a:latin typeface="+mn-lt"/>
+              </a:rPr>
+              <a:t> </a:t>
+            </a:r>
+            <a:r>
+              <a:rPr lang="de-CH" sz="1200" dirty="0" err="1">
+                <a:latin typeface="+mn-lt"/>
+              </a:rPr>
+              <a:t>to</a:t>
+            </a:r>
+            <a:r>
+              <a:rPr lang="de-CH" sz="1200" dirty="0">
+                <a:latin typeface="+mn-lt"/>
+              </a:rPr>
+              <a:t> </a:t>
+            </a:r>
+            <a:r>
+              <a:rPr lang="de-CH" sz="1200" dirty="0" err="1">
+                <a:latin typeface="+mn-lt"/>
+              </a:rPr>
+              <a:t>train</a:t>
+            </a:r>
+            <a:r>
+              <a:rPr lang="de-CH" sz="1200" dirty="0">
+                <a:latin typeface="+mn-lt"/>
+              </a:rPr>
+              <a:t> </a:t>
+            </a:r>
+            <a:r>
+              <a:rPr lang="de-CH" sz="1200" dirty="0" err="1">
+                <a:latin typeface="+mn-lt"/>
+              </a:rPr>
+              <a:t>the</a:t>
+            </a:r>
+            <a:r>
+              <a:rPr lang="de-CH" sz="1200" dirty="0">
+                <a:latin typeface="+mn-lt"/>
+              </a:rPr>
+              <a:t> </a:t>
+            </a:r>
+            <a:r>
+              <a:rPr lang="de-CH" sz="1200" dirty="0" err="1">
+                <a:latin typeface="+mn-lt"/>
+              </a:rPr>
+              <a:t>model</a:t>
+            </a:r>
+            <a:r>
+              <a:rPr lang="de-CH" sz="1200" dirty="0">
+                <a:latin typeface="+mn-lt"/>
+              </a:rPr>
+              <a:t>.</a:t>
+            </a:r>
+          </a:p>
+        </p:txBody>
+      </p:sp>
+      <p:sp>
+        <p:nvSpPr>
+          <p:cNvPr id="39" name="Ellipse 38">
+            <a:extLst>
+              <a:ext uri="{FF2B5EF4-FFF2-40B4-BE49-F238E27FC236}">
+                <a16:creationId xmlns:a16="http://schemas.microsoft.com/office/drawing/2014/main" id="{2DCBDA23-8805-4FEA-8F87-B4911859FD3A}"/>
+              </a:ext>
+            </a:extLst>
+          </p:cNvPr>
+          <p:cNvSpPr/>
+          <p:nvPr/>
+        </p:nvSpPr>
+        <p:spPr bwMode="auto">
+          <a:xfrm>
+            <a:off x="751175" y="1209708"/>
+            <a:ext cx="1561706" cy="679071"/>
+          </a:xfrm>
+          <a:prstGeom prst="ellipse">
+            <a:avLst/>
+          </a:prstGeom>
+          <a:solidFill>
+            <a:schemeClr val="accent2">
+              <a:lumMod val="20000"/>
+              <a:lumOff val="80000"/>
+            </a:schemeClr>
+          </a:solidFill>
+          <a:ln w="9525" cap="flat" cmpd="sng" algn="ctr">
+            <a:solidFill>
+              <a:srgbClr val="000000"/>
+            </a:solidFill>
+            <a:prstDash val="solid"/>
+            <a:round/>
+            <a:headEnd type="none" w="med" len="med"/>
+            <a:tailEnd type="none" w="med" len="med"/>
+          </a:ln>
+          <a:effectLst/>
+          <a:extLst>
+            <a:ext uri="{AF507438-7753-43e0-B8FC-AC1667EBCBE1}">
+              <a14:hiddenEffects xmlns="" xmlns:a14="http://schemas.microsoft.com/office/drawing/2010/main">
+                <a:effectLst>
+                  <a:outerShdw blurRad="63500" dist="38099" dir="2700000" algn="ctr" rotWithShape="0">
+                    <a:schemeClr val="bg2">
+                      <a:alpha val="74998"/>
+                    </a:schemeClr>
+                  </a:outerShdw>
+                </a:effectLst>
+              </a14:hiddenEffects>
+            </a:ext>
+          </a:extLst>
+        </p:spPr>
+        <p:txBody>
+          <a:bodyPr vert="horz" wrap="square" lIns="91440" tIns="45720" rIns="91440" bIns="45720" numCol="1" rtlCol="0" anchor="ctr" anchorCtr="0" compatLnSpc="1">
+            <a:prstTxWarp prst="textNoShape">
+              <a:avLst/>
+            </a:prstTxWarp>
+          </a:bodyPr>
+          <a:lstStyle/>
+          <a:p>
+            <a:pPr marL="0" marR="0" indent="0" algn="ctr" defTabSz="914400" rtl="0" eaLnBrk="1" fontAlgn="base" latinLnBrk="0" hangingPunct="1">
+              <a:lnSpc>
+                <a:spcPct val="100000"/>
+              </a:lnSpc>
+              <a:spcBef>
+                <a:spcPct val="0"/>
+              </a:spcBef>
+              <a:spcAft>
+                <a:spcPct val="0"/>
+              </a:spcAft>
+              <a:buClrTx/>
+              <a:buSzTx/>
+              <a:buFontTx/>
+              <a:buNone/>
+              <a:tabLst/>
+            </a:pPr>
+            <a:r>
+              <a:rPr lang="de-CH" sz="1400" b="1" dirty="0">
+                <a:latin typeface="+mn-lt"/>
+                <a:ea typeface="Source Sans Pro Light" panose="020B0403030403020204" pitchFamily="34" charset="0"/>
+              </a:rPr>
+              <a:t>Flickr </a:t>
+            </a:r>
+          </a:p>
+          <a:p>
+            <a:pPr marL="0" marR="0" indent="0" algn="ctr" defTabSz="914400" rtl="0" eaLnBrk="1" fontAlgn="base" latinLnBrk="0" hangingPunct="1">
+              <a:lnSpc>
+                <a:spcPct val="100000"/>
+              </a:lnSpc>
+              <a:spcBef>
+                <a:spcPct val="0"/>
+              </a:spcBef>
+              <a:spcAft>
+                <a:spcPct val="0"/>
+              </a:spcAft>
+              <a:buClrTx/>
+              <a:buSzTx/>
+              <a:buFontTx/>
+              <a:buNone/>
+              <a:tabLst/>
+            </a:pPr>
+            <a:r>
+              <a:rPr lang="de-CH" sz="1400" b="1" dirty="0">
+                <a:latin typeface="+mn-lt"/>
+                <a:ea typeface="Source Sans Pro Light" panose="020B0403030403020204" pitchFamily="34" charset="0"/>
+              </a:rPr>
+              <a:t>Images</a:t>
+            </a:r>
+            <a:endParaRPr kumimoji="0" lang="de-CH" sz="1400" b="1" i="0" u="none" strike="noStrike" cap="none" normalizeH="0" baseline="0" dirty="0">
+              <a:ln>
+                <a:noFill/>
+              </a:ln>
+              <a:solidFill>
+                <a:srgbClr val="000000"/>
+              </a:solidFill>
+              <a:effectLst/>
+              <a:latin typeface="+mn-lt"/>
+              <a:ea typeface="Source Sans Pro Light" panose="020B0403030403020204" pitchFamily="34" charset="0"/>
+              <a:sym typeface="Neutraface Text Book" charset="0"/>
+            </a:endParaRPr>
+          </a:p>
+        </p:txBody>
+      </p:sp>
+      <p:sp>
+        <p:nvSpPr>
+          <p:cNvPr id="50" name="Ellipse 49">
+            <a:extLst>
+              <a:ext uri="{FF2B5EF4-FFF2-40B4-BE49-F238E27FC236}">
+                <a16:creationId xmlns:a16="http://schemas.microsoft.com/office/drawing/2014/main" id="{BE6897FB-FF33-42AD-905D-F95A33B6BC6B}"/>
+              </a:ext>
+            </a:extLst>
+          </p:cNvPr>
+          <p:cNvSpPr/>
+          <p:nvPr/>
+        </p:nvSpPr>
+        <p:spPr bwMode="auto">
+          <a:xfrm>
+            <a:off x="3274907" y="2180009"/>
+            <a:ext cx="1561706" cy="679071"/>
+          </a:xfrm>
+          <a:prstGeom prst="ellipse">
+            <a:avLst/>
+          </a:prstGeom>
+          <a:solidFill>
+            <a:schemeClr val="accent2">
+              <a:lumMod val="20000"/>
+              <a:lumOff val="80000"/>
+            </a:schemeClr>
+          </a:solidFill>
+          <a:ln w="9525" cap="flat" cmpd="sng" algn="ctr">
+            <a:solidFill>
+              <a:srgbClr val="000000"/>
+            </a:solidFill>
+            <a:prstDash val="solid"/>
+            <a:round/>
+            <a:headEnd type="none" w="med" len="med"/>
+            <a:tailEnd type="none" w="med" len="med"/>
+          </a:ln>
+          <a:effectLst/>
+          <a:extLst>
+            <a:ext uri="{AF507438-7753-43e0-B8FC-AC1667EBCBE1}">
+              <a14:hiddenEffects xmlns="" xmlns:a14="http://schemas.microsoft.com/office/drawing/2010/main">
+                <a:effectLst>
+                  <a:outerShdw blurRad="63500" dist="38099" dir="2700000" algn="ctr" rotWithShape="0">
+                    <a:schemeClr val="bg2">
+                      <a:alpha val="74998"/>
+                    </a:schemeClr>
+                  </a:outerShdw>
+                </a:effectLst>
+              </a14:hiddenEffects>
+            </a:ext>
+          </a:extLst>
+        </p:spPr>
+        <p:txBody>
+          <a:bodyPr vert="horz" wrap="square" lIns="91440" tIns="45720" rIns="91440" bIns="45720" numCol="1" rtlCol="0" anchor="ctr" anchorCtr="0" compatLnSpc="1">
+            <a:prstTxWarp prst="textNoShape">
+              <a:avLst/>
+            </a:prstTxWarp>
+          </a:bodyPr>
+          <a:lstStyle/>
+          <a:p>
+            <a:pPr marL="0" marR="0" indent="0" algn="ctr" defTabSz="914400" rtl="0" eaLnBrk="1" fontAlgn="base" latinLnBrk="0" hangingPunct="1">
+              <a:lnSpc>
+                <a:spcPct val="100000"/>
+              </a:lnSpc>
+              <a:spcBef>
+                <a:spcPct val="0"/>
+              </a:spcBef>
+              <a:spcAft>
+                <a:spcPct val="0"/>
+              </a:spcAft>
+              <a:buClrTx/>
+              <a:buSzTx/>
+              <a:buFontTx/>
+              <a:buNone/>
+              <a:tabLst/>
+            </a:pPr>
+            <a:r>
+              <a:rPr lang="de-CH" sz="1400" b="1" dirty="0" err="1">
+                <a:latin typeface="+mn-lt"/>
+                <a:ea typeface="Source Sans Pro Light" panose="020B0403030403020204" pitchFamily="34" charset="0"/>
+              </a:rPr>
+              <a:t>Labeled</a:t>
+            </a:r>
+            <a:endParaRPr lang="de-CH" sz="1400" b="1" dirty="0">
+              <a:latin typeface="+mn-lt"/>
+              <a:ea typeface="Source Sans Pro Light" panose="020B0403030403020204" pitchFamily="34" charset="0"/>
+            </a:endParaRPr>
+          </a:p>
+          <a:p>
+            <a:pPr marL="0" marR="0" indent="0" algn="ctr" defTabSz="914400" rtl="0" eaLnBrk="1" fontAlgn="base" latinLnBrk="0" hangingPunct="1">
+              <a:lnSpc>
+                <a:spcPct val="100000"/>
+              </a:lnSpc>
+              <a:spcBef>
+                <a:spcPct val="0"/>
+              </a:spcBef>
+              <a:spcAft>
+                <a:spcPct val="0"/>
+              </a:spcAft>
+              <a:buClrTx/>
+              <a:buSzTx/>
+              <a:buFontTx/>
+              <a:buNone/>
+              <a:tabLst/>
+            </a:pPr>
+            <a:r>
+              <a:rPr lang="de-CH" sz="1400" b="1" dirty="0">
+                <a:latin typeface="+mn-lt"/>
+                <a:ea typeface="Source Sans Pro Light" panose="020B0403030403020204" pitchFamily="34" charset="0"/>
+              </a:rPr>
+              <a:t>Flickr </a:t>
+            </a:r>
+          </a:p>
+          <a:p>
+            <a:pPr marL="0" marR="0" indent="0" algn="ctr" defTabSz="914400" rtl="0" eaLnBrk="1" fontAlgn="base" latinLnBrk="0" hangingPunct="1">
+              <a:lnSpc>
+                <a:spcPct val="100000"/>
+              </a:lnSpc>
+              <a:spcBef>
+                <a:spcPct val="0"/>
+              </a:spcBef>
+              <a:spcAft>
+                <a:spcPct val="0"/>
+              </a:spcAft>
+              <a:buClrTx/>
+              <a:buSzTx/>
+              <a:buFontTx/>
+              <a:buNone/>
+              <a:tabLst/>
+            </a:pPr>
+            <a:r>
+              <a:rPr lang="de-CH" sz="1400" b="1" dirty="0">
+                <a:latin typeface="+mn-lt"/>
+                <a:ea typeface="Source Sans Pro Light" panose="020B0403030403020204" pitchFamily="34" charset="0"/>
+              </a:rPr>
+              <a:t>Images</a:t>
+            </a:r>
+            <a:endParaRPr kumimoji="0" lang="de-CH" sz="1400" b="1" i="0" u="none" strike="noStrike" cap="none" normalizeH="0" baseline="0" dirty="0">
+              <a:ln>
+                <a:noFill/>
+              </a:ln>
+              <a:solidFill>
+                <a:srgbClr val="000000"/>
+              </a:solidFill>
+              <a:effectLst/>
+              <a:latin typeface="+mn-lt"/>
+              <a:ea typeface="Source Sans Pro Light" panose="020B0403030403020204" pitchFamily="34" charset="0"/>
+              <a:sym typeface="Neutraface Text Book" charset="0"/>
+            </a:endParaRPr>
+          </a:p>
+        </p:txBody>
+      </p:sp>
+      <p:cxnSp>
+        <p:nvCxnSpPr>
+          <p:cNvPr id="52" name="Gerade Verbindung mit Pfeil 51">
+            <a:extLst>
+              <a:ext uri="{FF2B5EF4-FFF2-40B4-BE49-F238E27FC236}">
+                <a16:creationId xmlns:a16="http://schemas.microsoft.com/office/drawing/2014/main" id="{D00F8317-B41D-470A-92CE-2D31E308AFF1}"/>
+              </a:ext>
+            </a:extLst>
+          </p:cNvPr>
+          <p:cNvCxnSpPr>
+            <a:stCxn id="39" idx="4"/>
+            <a:endCxn id="5" idx="0"/>
+          </p:cNvCxnSpPr>
+          <p:nvPr/>
+        </p:nvCxnSpPr>
+        <p:spPr bwMode="auto">
+          <a:xfrm>
+            <a:off x="1532028" y="1888779"/>
+            <a:ext cx="4343" cy="214402"/>
+          </a:xfrm>
+          <a:prstGeom prst="straightConnector1">
+            <a:avLst/>
+          </a:prstGeom>
+          <a:solidFill>
+            <a:srgbClr val="BBE0E3"/>
+          </a:solidFill>
+          <a:ln w="9525" cap="flat" cmpd="sng" algn="ctr">
+            <a:solidFill>
+              <a:srgbClr val="000000"/>
+            </a:solidFill>
+            <a:prstDash val="solid"/>
+            <a:round/>
+            <a:headEnd type="none" w="med" len="med"/>
+            <a:tailEnd type="triangle"/>
+          </a:ln>
+          <a:effectLst/>
+          <a:extLst>
+            <a:ext uri="{AF507438-7753-43e0-B8FC-AC1667EBCBE1}">
+              <a14:hiddenEffects xmlns="" xmlns:a14="http://schemas.microsoft.com/office/drawing/2010/main">
+                <a:effectLst>
+                  <a:outerShdw blurRad="63500" dist="38099" dir="2700000" algn="ctr" rotWithShape="0">
+                    <a:schemeClr val="bg2">
+                      <a:alpha val="74998"/>
+                    </a:schemeClr>
+                  </a:outerShdw>
+                </a:effectLst>
+              </a14:hiddenEffects>
+            </a:ext>
+          </a:extLst>
+        </p:spPr>
+      </p:cxnSp>
+      <p:cxnSp>
+        <p:nvCxnSpPr>
+          <p:cNvPr id="55" name="Gerade Verbindung mit Pfeil 54">
+            <a:extLst>
+              <a:ext uri="{FF2B5EF4-FFF2-40B4-BE49-F238E27FC236}">
+                <a16:creationId xmlns:a16="http://schemas.microsoft.com/office/drawing/2014/main" id="{FF1BDE2C-596E-4E36-AFA4-2ECBFC0B2FCA}"/>
+              </a:ext>
+            </a:extLst>
+          </p:cNvPr>
+          <p:cNvCxnSpPr>
+            <a:cxnSpLocks/>
+            <a:stCxn id="50" idx="4"/>
+          </p:cNvCxnSpPr>
+          <p:nvPr/>
+        </p:nvCxnSpPr>
+        <p:spPr bwMode="auto">
+          <a:xfrm>
+            <a:off x="4055760" y="2859080"/>
+            <a:ext cx="0" cy="306585"/>
+          </a:xfrm>
+          <a:prstGeom prst="straightConnector1">
+            <a:avLst/>
+          </a:prstGeom>
+          <a:solidFill>
+            <a:srgbClr val="BBE0E3"/>
+          </a:solidFill>
+          <a:ln w="9525" cap="flat" cmpd="sng" algn="ctr">
+            <a:solidFill>
+              <a:srgbClr val="000000"/>
+            </a:solidFill>
+            <a:prstDash val="solid"/>
+            <a:round/>
+            <a:headEnd type="none" w="med" len="med"/>
+            <a:tailEnd type="triangle"/>
+          </a:ln>
+          <a:effectLst/>
+          <a:extLst>
+            <a:ext uri="{AF507438-7753-43e0-B8FC-AC1667EBCBE1}">
+              <a14:hiddenEffects xmlns="" xmlns:a14="http://schemas.microsoft.com/office/drawing/2010/main">
+                <a:effectLst>
+                  <a:outerShdw blurRad="63500" dist="38099" dir="2700000" algn="ctr" rotWithShape="0">
+                    <a:schemeClr val="bg2">
+                      <a:alpha val="74998"/>
+                    </a:schemeClr>
+                  </a:outerShdw>
+                </a:effectLst>
+              </a14:hiddenEffects>
+            </a:ext>
+          </a:extLst>
+        </p:spPr>
+      </p:cxnSp>
+      <p:cxnSp>
+        <p:nvCxnSpPr>
+          <p:cNvPr id="60" name="Gerade Verbindung mit Pfeil 59">
+            <a:extLst>
+              <a:ext uri="{FF2B5EF4-FFF2-40B4-BE49-F238E27FC236}">
+                <a16:creationId xmlns:a16="http://schemas.microsoft.com/office/drawing/2014/main" id="{46BFABAB-2D67-45CF-8B22-230048D23755}"/>
+              </a:ext>
+            </a:extLst>
+          </p:cNvPr>
+          <p:cNvCxnSpPr>
+            <a:stCxn id="14" idx="2"/>
+            <a:endCxn id="17" idx="0"/>
+          </p:cNvCxnSpPr>
+          <p:nvPr/>
+        </p:nvCxnSpPr>
+        <p:spPr bwMode="auto">
+          <a:xfrm>
+            <a:off x="4046358" y="5296147"/>
+            <a:ext cx="0" cy="277021"/>
+          </a:xfrm>
+          <a:prstGeom prst="straightConnector1">
+            <a:avLst/>
+          </a:prstGeom>
+          <a:solidFill>
+            <a:srgbClr val="BBE0E3"/>
+          </a:solidFill>
+          <a:ln w="9525" cap="flat" cmpd="sng" algn="ctr">
+            <a:solidFill>
+              <a:srgbClr val="000000"/>
+            </a:solidFill>
+            <a:prstDash val="solid"/>
+            <a:round/>
+            <a:headEnd type="none" w="med" len="med"/>
+            <a:tailEnd type="triangle"/>
+          </a:ln>
+          <a:effectLst/>
+          <a:extLst>
+            <a:ext uri="{AF507438-7753-43e0-B8FC-AC1667EBCBE1}">
+              <a14:hiddenEffects xmlns="" xmlns:a14="http://schemas.microsoft.com/office/drawing/2010/main">
+                <a:effectLst>
+                  <a:outerShdw blurRad="63500" dist="38099" dir="2700000" algn="ctr" rotWithShape="0">
+                    <a:schemeClr val="bg2">
+                      <a:alpha val="74998"/>
+                    </a:schemeClr>
+                  </a:outerShdw>
+                </a:effectLst>
+              </a14:hiddenEffects>
+            </a:ext>
+          </a:extLst>
+        </p:spPr>
+      </p:cxnSp>
+      <p:cxnSp>
+        <p:nvCxnSpPr>
+          <p:cNvPr id="62" name="Gerade Verbindung mit Pfeil 61">
+            <a:extLst>
+              <a:ext uri="{FF2B5EF4-FFF2-40B4-BE49-F238E27FC236}">
+                <a16:creationId xmlns:a16="http://schemas.microsoft.com/office/drawing/2014/main" id="{40FD1795-A52E-4867-B438-BF7C4B9943C1}"/>
+              </a:ext>
+            </a:extLst>
+          </p:cNvPr>
+          <p:cNvCxnSpPr>
+            <a:stCxn id="5" idx="3"/>
+            <a:endCxn id="50" idx="2"/>
+          </p:cNvCxnSpPr>
+          <p:nvPr/>
+        </p:nvCxnSpPr>
+        <p:spPr bwMode="auto">
+          <a:xfrm>
+            <a:off x="2454473" y="2517227"/>
+            <a:ext cx="820434" cy="2318"/>
+          </a:xfrm>
+          <a:prstGeom prst="straightConnector1">
+            <a:avLst/>
+          </a:prstGeom>
+          <a:solidFill>
+            <a:srgbClr val="BBE0E3"/>
+          </a:solidFill>
+          <a:ln w="9525" cap="flat" cmpd="sng" algn="ctr">
+            <a:solidFill>
+              <a:srgbClr val="000000"/>
+            </a:solidFill>
+            <a:prstDash val="solid"/>
+            <a:round/>
+            <a:headEnd type="none" w="med" len="med"/>
+            <a:tailEnd type="triangle"/>
+          </a:ln>
+          <a:effectLst/>
+          <a:extLst>
+            <a:ext uri="{AF507438-7753-43e0-B8FC-AC1667EBCBE1}">
+              <a14:hiddenEffects xmlns="" xmlns:a14="http://schemas.microsoft.com/office/drawing/2010/main">
+                <a:effectLst>
+                  <a:outerShdw blurRad="63500" dist="38099" dir="2700000" algn="ctr" rotWithShape="0">
+                    <a:schemeClr val="bg2">
+                      <a:alpha val="74998"/>
+                    </a:schemeClr>
+                  </a:outerShdw>
+                </a:effectLst>
+              </a14:hiddenEffects>
+            </a:ext>
+          </a:extLst>
+        </p:spPr>
+      </p:cxnSp>
+      <p:cxnSp>
+        <p:nvCxnSpPr>
+          <p:cNvPr id="11264" name="Gerade Verbindung mit Pfeil 11263">
+            <a:extLst>
+              <a:ext uri="{FF2B5EF4-FFF2-40B4-BE49-F238E27FC236}">
+                <a16:creationId xmlns:a16="http://schemas.microsoft.com/office/drawing/2014/main" id="{8B7F743C-5373-41D3-8FA4-A0770C4D4CC7}"/>
+              </a:ext>
+            </a:extLst>
+          </p:cNvPr>
+          <p:cNvCxnSpPr>
+            <a:stCxn id="15" idx="6"/>
+            <a:endCxn id="14" idx="1"/>
+          </p:cNvCxnSpPr>
+          <p:nvPr/>
+        </p:nvCxnSpPr>
+        <p:spPr bwMode="auto">
+          <a:xfrm>
+            <a:off x="2378122" y="4882101"/>
+            <a:ext cx="750134" cy="0"/>
+          </a:xfrm>
+          <a:prstGeom prst="straightConnector1">
+            <a:avLst/>
+          </a:prstGeom>
+          <a:solidFill>
+            <a:srgbClr val="BBE0E3"/>
+          </a:solidFill>
+          <a:ln w="9525" cap="flat" cmpd="sng" algn="ctr">
+            <a:solidFill>
+              <a:srgbClr val="000000"/>
+            </a:solidFill>
+            <a:prstDash val="solid"/>
+            <a:round/>
+            <a:headEnd type="none" w="med" len="med"/>
+            <a:tailEnd type="triangle"/>
+          </a:ln>
+          <a:effectLst/>
+          <a:extLst>
+            <a:ext uri="{AF507438-7753-43e0-B8FC-AC1667EBCBE1}">
+              <a14:hiddenEffects xmlns="" xmlns:a14="http://schemas.microsoft.com/office/drawing/2010/main">
+                <a:effectLst>
+                  <a:outerShdw blurRad="63500" dist="38099" dir="2700000" algn="ctr" rotWithShape="0">
+                    <a:schemeClr val="bg2">
+                      <a:alpha val="74998"/>
+                    </a:schemeClr>
+                  </a:outerShdw>
+                </a:effectLst>
+              </a14:hiddenEffects>
+            </a:ext>
+          </a:extLst>
+        </p:spPr>
+      </p:cxnSp>
+      <p:sp>
+        <p:nvSpPr>
+          <p:cNvPr id="70" name="Sprechblase: rechteckig mit abgerundeten Ecken 69">
+            <a:extLst>
+              <a:ext uri="{FF2B5EF4-FFF2-40B4-BE49-F238E27FC236}">
+                <a16:creationId xmlns:a16="http://schemas.microsoft.com/office/drawing/2014/main" id="{79492655-ACC6-49C4-AB8A-9A888818C9A0}"/>
+              </a:ext>
+            </a:extLst>
+          </p:cNvPr>
+          <p:cNvSpPr/>
+          <p:nvPr/>
+        </p:nvSpPr>
+        <p:spPr bwMode="auto">
+          <a:xfrm>
+            <a:off x="416496" y="5647654"/>
+            <a:ext cx="2335857" cy="840336"/>
+          </a:xfrm>
+          <a:prstGeom prst="wedgeRoundRectCallout">
+            <a:avLst>
+              <a:gd name="adj1" fmla="val 66675"/>
+              <a:gd name="adj2" fmla="val 1337"/>
+              <a:gd name="adj3" fmla="val 16667"/>
+            </a:avLst>
+          </a:prstGeom>
+          <a:solidFill>
+            <a:srgbClr val="FFD13F"/>
+          </a:solidFill>
+          <a:ln w="9525" cap="flat" cmpd="sng" algn="ctr">
+            <a:noFill/>
+            <a:prstDash val="solid"/>
+            <a:round/>
+            <a:headEnd type="none" w="med" len="med"/>
+            <a:tailEnd type="none" w="med" len="med"/>
+          </a:ln>
+          <a:effectLst/>
+          <a:extLst>
+            <a:ext uri="{AF507438-7753-43e0-B8FC-AC1667EBCBE1}">
+              <a14:hiddenEffects xmlns="" xmlns:a14="http://schemas.microsoft.com/office/drawing/2010/main">
+                <a:effectLst>
+                  <a:outerShdw blurRad="63500" dist="38099" dir="2700000" algn="ctr" rotWithShape="0">
+                    <a:schemeClr val="bg2">
+                      <a:alpha val="74998"/>
+                    </a:schemeClr>
+                  </a:outerShdw>
+                </a:effectLst>
+              </a14:hiddenEffects>
+            </a:ext>
+          </a:extLst>
+        </p:spPr>
+        <p:txBody>
+          <a:bodyPr vert="horz" wrap="square" lIns="91440" tIns="45720" rIns="91440" bIns="45720" numCol="1" rtlCol="0" anchor="t" anchorCtr="0" compatLnSpc="1">
+            <a:prstTxWarp prst="textNoShape">
+              <a:avLst/>
+            </a:prstTxWarp>
+          </a:bodyPr>
+          <a:lstStyle/>
+          <a:p>
+            <a:pPr marL="171450" marR="0" indent="-171450" algn="l" defTabSz="914400" rtl="0" eaLnBrk="1" fontAlgn="base" latinLnBrk="0" hangingPunct="1">
+              <a:lnSpc>
+                <a:spcPct val="100000"/>
+              </a:lnSpc>
+              <a:spcBef>
+                <a:spcPct val="0"/>
+              </a:spcBef>
+              <a:spcAft>
+                <a:spcPct val="0"/>
+              </a:spcAft>
+              <a:buClrTx/>
+              <a:buSzTx/>
+              <a:buFont typeface="Arial" panose="020B0604020202020204" pitchFamily="34" charset="0"/>
+              <a:buChar char="•"/>
+              <a:tabLst/>
+            </a:pPr>
+            <a:r>
+              <a:rPr lang="de-CH" sz="1200" dirty="0" err="1">
+                <a:latin typeface="+mn-lt"/>
+              </a:rPr>
+              <a:t>Each</a:t>
+            </a:r>
+            <a:r>
+              <a:rPr lang="de-CH" sz="1200" dirty="0">
+                <a:latin typeface="+mn-lt"/>
+              </a:rPr>
+              <a:t> </a:t>
+            </a:r>
+            <a:r>
+              <a:rPr lang="de-CH" sz="1200" dirty="0" err="1">
+                <a:latin typeface="+mn-lt"/>
+              </a:rPr>
+              <a:t>image</a:t>
+            </a:r>
+            <a:r>
+              <a:rPr lang="de-CH" sz="1200" dirty="0">
+                <a:latin typeface="+mn-lt"/>
+              </a:rPr>
+              <a:t> </a:t>
+            </a:r>
+            <a:r>
+              <a:rPr lang="de-CH" sz="1200" dirty="0" err="1">
+                <a:latin typeface="+mn-lt"/>
+              </a:rPr>
+              <a:t>get</a:t>
+            </a:r>
+            <a:r>
+              <a:rPr lang="de-CH" sz="1200" dirty="0">
+                <a:latin typeface="+mn-lt"/>
+              </a:rPr>
+              <a:t> a </a:t>
+            </a:r>
+            <a:r>
+              <a:rPr lang="de-CH" sz="1200" dirty="0" err="1">
+                <a:latin typeface="+mn-lt"/>
+              </a:rPr>
+              <a:t>label</a:t>
+            </a:r>
+            <a:r>
+              <a:rPr lang="de-CH" sz="1200" dirty="0">
+                <a:latin typeface="+mn-lt"/>
+              </a:rPr>
+              <a:t> </a:t>
+            </a:r>
+            <a:r>
+              <a:rPr lang="de-CH" sz="1200" dirty="0" err="1">
+                <a:latin typeface="+mn-lt"/>
+              </a:rPr>
+              <a:t>based</a:t>
+            </a:r>
+            <a:r>
+              <a:rPr lang="de-CH" sz="1200" dirty="0">
+                <a:latin typeface="+mn-lt"/>
+              </a:rPr>
+              <a:t> on </a:t>
+            </a:r>
+            <a:r>
+              <a:rPr lang="de-CH" sz="1200" dirty="0" err="1">
+                <a:latin typeface="+mn-lt"/>
+              </a:rPr>
+              <a:t>the</a:t>
+            </a:r>
+            <a:r>
+              <a:rPr lang="de-CH" sz="1200" dirty="0">
+                <a:latin typeface="+mn-lt"/>
+              </a:rPr>
+              <a:t> </a:t>
+            </a:r>
+            <a:r>
+              <a:rPr lang="de-CH" sz="1200" dirty="0" err="1">
+                <a:latin typeface="+mn-lt"/>
+              </a:rPr>
+              <a:t>highest</a:t>
+            </a:r>
+            <a:r>
+              <a:rPr lang="de-CH" sz="1200" dirty="0">
+                <a:latin typeface="+mn-lt"/>
+              </a:rPr>
+              <a:t> </a:t>
+            </a:r>
+            <a:r>
+              <a:rPr lang="de-CH" sz="1200" dirty="0" err="1">
+                <a:latin typeface="+mn-lt"/>
+              </a:rPr>
+              <a:t>probability</a:t>
+            </a:r>
+            <a:r>
+              <a:rPr lang="de-CH" sz="1200" dirty="0">
+                <a:latin typeface="+mn-lt"/>
+              </a:rPr>
+              <a:t> </a:t>
+            </a:r>
+            <a:r>
+              <a:rPr lang="de-CH" sz="1200" dirty="0" err="1">
+                <a:latin typeface="+mn-lt"/>
+              </a:rPr>
+              <a:t>within</a:t>
+            </a:r>
+            <a:r>
+              <a:rPr lang="de-CH" sz="1200" dirty="0">
+                <a:latin typeface="+mn-lt"/>
+              </a:rPr>
+              <a:t> </a:t>
+            </a:r>
+            <a:r>
+              <a:rPr lang="de-CH" sz="1200" dirty="0" err="1">
+                <a:latin typeface="+mn-lt"/>
+              </a:rPr>
+              <a:t>the</a:t>
+            </a:r>
+            <a:r>
+              <a:rPr lang="de-CH" sz="1200" dirty="0">
+                <a:latin typeface="+mn-lt"/>
+              </a:rPr>
+              <a:t> </a:t>
+            </a:r>
+            <a:r>
+              <a:rPr lang="de-CH" sz="1200" dirty="0" err="1">
+                <a:latin typeface="+mn-lt"/>
+              </a:rPr>
+              <a:t>classifiers</a:t>
+            </a:r>
+            <a:endParaRPr lang="de-CH" sz="1200" dirty="0">
+              <a:latin typeface="+mn-lt"/>
+            </a:endParaRPr>
+          </a:p>
+          <a:p>
+            <a:pPr marL="171450" marR="0" indent="-171450" algn="l" defTabSz="914400" rtl="0" eaLnBrk="1" fontAlgn="base" latinLnBrk="0" hangingPunct="1">
+              <a:lnSpc>
+                <a:spcPct val="100000"/>
+              </a:lnSpc>
+              <a:spcBef>
+                <a:spcPct val="0"/>
+              </a:spcBef>
+              <a:spcAft>
+                <a:spcPct val="0"/>
+              </a:spcAft>
+              <a:buClrTx/>
+              <a:buSzTx/>
+              <a:buFont typeface="Arial" panose="020B0604020202020204" pitchFamily="34" charset="0"/>
+              <a:buChar char="•"/>
+              <a:tabLst/>
+            </a:pPr>
+            <a:r>
+              <a:rPr lang="de-CH" sz="1200" dirty="0">
+                <a:latin typeface="+mn-lt"/>
+              </a:rPr>
+              <a:t>Model </a:t>
+            </a:r>
+            <a:r>
+              <a:rPr lang="de-CH" sz="1200" dirty="0" err="1">
+                <a:latin typeface="+mn-lt"/>
+              </a:rPr>
+              <a:t>Accuracy</a:t>
+            </a:r>
+            <a:r>
+              <a:rPr lang="de-CH" sz="1200" dirty="0">
+                <a:latin typeface="+mn-lt"/>
+              </a:rPr>
+              <a:t>: 73%</a:t>
+            </a:r>
+          </a:p>
+        </p:txBody>
+      </p:sp>
+      <p:sp>
+        <p:nvSpPr>
+          <p:cNvPr id="72" name="Sprechblase: rechteckig mit abgerundeten Ecken 71">
+            <a:extLst>
+              <a:ext uri="{FF2B5EF4-FFF2-40B4-BE49-F238E27FC236}">
+                <a16:creationId xmlns:a16="http://schemas.microsoft.com/office/drawing/2014/main" id="{690C56A5-7DA8-412B-B47E-6D4A59037381}"/>
+              </a:ext>
+            </a:extLst>
+          </p:cNvPr>
+          <p:cNvSpPr/>
+          <p:nvPr/>
+        </p:nvSpPr>
+        <p:spPr bwMode="auto">
+          <a:xfrm>
+            <a:off x="2600346" y="962614"/>
+            <a:ext cx="4612302" cy="862913"/>
+          </a:xfrm>
+          <a:prstGeom prst="wedgeRoundRectCallout">
+            <a:avLst>
+              <a:gd name="adj1" fmla="val -65364"/>
+              <a:gd name="adj2" fmla="val 81249"/>
+              <a:gd name="adj3" fmla="val 16667"/>
+            </a:avLst>
+          </a:prstGeom>
+          <a:solidFill>
+            <a:srgbClr val="FFD13F"/>
+          </a:solidFill>
+          <a:ln w="9525" cap="flat" cmpd="sng" algn="ctr">
+            <a:noFill/>
+            <a:prstDash val="solid"/>
+            <a:round/>
+            <a:headEnd type="none" w="med" len="med"/>
+            <a:tailEnd type="none" w="med" len="med"/>
+          </a:ln>
+          <a:effectLst/>
+          <a:extLst>
+            <a:ext uri="{AF507438-7753-43e0-B8FC-AC1667EBCBE1}">
+              <a14:hiddenEffects xmlns="" xmlns:a14="http://schemas.microsoft.com/office/drawing/2010/main">
+                <a:effectLst>
+                  <a:outerShdw blurRad="63500" dist="38099" dir="2700000" algn="ctr" rotWithShape="0">
+                    <a:schemeClr val="bg2">
+                      <a:alpha val="74998"/>
+                    </a:schemeClr>
+                  </a:outerShdw>
+                </a:effectLst>
+              </a14:hiddenEffects>
+            </a:ext>
+          </a:extLst>
+        </p:spPr>
+        <p:txBody>
+          <a:bodyPr vert="horz" wrap="square" lIns="91440" tIns="45720" rIns="91440" bIns="45720" numCol="1" rtlCol="0" anchor="t" anchorCtr="0" compatLnSpc="1">
+            <a:prstTxWarp prst="textNoShape">
+              <a:avLst/>
+            </a:prstTxWarp>
+          </a:bodyPr>
+          <a:lstStyle/>
+          <a:p>
+            <a:pPr marL="171450" marR="0" indent="-171450" algn="l" defTabSz="914400" rtl="0" eaLnBrk="1" fontAlgn="base" latinLnBrk="0" hangingPunct="1">
+              <a:lnSpc>
+                <a:spcPct val="100000"/>
+              </a:lnSpc>
+              <a:spcBef>
+                <a:spcPct val="0"/>
+              </a:spcBef>
+              <a:spcAft>
+                <a:spcPct val="0"/>
+              </a:spcAft>
+              <a:buClrTx/>
+              <a:buSzTx/>
+              <a:buFont typeface="Arial" panose="020B0604020202020204" pitchFamily="34" charset="0"/>
+              <a:buChar char="•"/>
+              <a:tabLst/>
+            </a:pPr>
+            <a:r>
+              <a:rPr lang="de-CH" sz="1200" dirty="0">
+                <a:latin typeface="+mn-lt"/>
+              </a:rPr>
+              <a:t>Image </a:t>
+            </a:r>
+            <a:r>
+              <a:rPr lang="de-CH" sz="1200" dirty="0" err="1">
+                <a:latin typeface="+mn-lt"/>
+              </a:rPr>
+              <a:t>names</a:t>
+            </a:r>
+            <a:r>
+              <a:rPr lang="de-CH" sz="1200" dirty="0">
+                <a:latin typeface="+mn-lt"/>
+              </a:rPr>
+              <a:t> </a:t>
+            </a:r>
+            <a:r>
+              <a:rPr lang="de-CH" sz="1200" dirty="0" err="1">
+                <a:latin typeface="+mn-lt"/>
+              </a:rPr>
+              <a:t>instead</a:t>
+            </a:r>
+            <a:r>
+              <a:rPr lang="de-CH" sz="1200" dirty="0">
+                <a:latin typeface="+mn-lt"/>
+              </a:rPr>
+              <a:t> </a:t>
+            </a:r>
+            <a:r>
+              <a:rPr lang="de-CH" sz="1200" dirty="0" err="1">
+                <a:latin typeface="+mn-lt"/>
+              </a:rPr>
+              <a:t>of</a:t>
+            </a:r>
+            <a:r>
+              <a:rPr lang="de-CH" sz="1200" dirty="0">
+                <a:latin typeface="+mn-lt"/>
+              </a:rPr>
+              <a:t> </a:t>
+            </a:r>
+            <a:r>
+              <a:rPr lang="de-CH" sz="1200" dirty="0" err="1">
+                <a:latin typeface="+mn-lt"/>
+              </a:rPr>
+              <a:t>image</a:t>
+            </a:r>
+            <a:r>
+              <a:rPr lang="de-CH" sz="1200" dirty="0">
+                <a:latin typeface="+mn-lt"/>
+              </a:rPr>
+              <a:t> </a:t>
+            </a:r>
+            <a:r>
+              <a:rPr lang="de-CH" sz="1200" dirty="0" err="1">
+                <a:latin typeface="+mn-lt"/>
+              </a:rPr>
+              <a:t>data</a:t>
+            </a:r>
+            <a:r>
+              <a:rPr lang="de-CH" sz="1200" dirty="0">
+                <a:latin typeface="+mn-lt"/>
+              </a:rPr>
+              <a:t> </a:t>
+            </a:r>
+            <a:r>
+              <a:rPr lang="de-CH" sz="1200" dirty="0" err="1">
+                <a:latin typeface="+mn-lt"/>
+              </a:rPr>
+              <a:t>to</a:t>
+            </a:r>
+            <a:r>
+              <a:rPr lang="de-CH" sz="1200" dirty="0">
+                <a:latin typeface="+mn-lt"/>
+              </a:rPr>
+              <a:t> </a:t>
+            </a:r>
+            <a:r>
+              <a:rPr lang="de-CH" sz="1200" dirty="0" err="1">
+                <a:latin typeface="+mn-lt"/>
+              </a:rPr>
+              <a:t>speed</a:t>
+            </a:r>
+            <a:r>
+              <a:rPr lang="de-CH" sz="1200" dirty="0">
+                <a:latin typeface="+mn-lt"/>
+              </a:rPr>
+              <a:t> </a:t>
+            </a:r>
+            <a:r>
+              <a:rPr lang="de-CH" sz="1200" dirty="0" err="1">
+                <a:latin typeface="+mn-lt"/>
+              </a:rPr>
+              <a:t>up</a:t>
+            </a:r>
+            <a:r>
+              <a:rPr lang="de-CH" sz="1200" dirty="0">
+                <a:latin typeface="+mn-lt"/>
+              </a:rPr>
+              <a:t> </a:t>
+            </a:r>
+            <a:r>
+              <a:rPr lang="de-CH" sz="1200" dirty="0" err="1">
+                <a:latin typeface="+mn-lt"/>
+              </a:rPr>
+              <a:t>data</a:t>
+            </a:r>
+            <a:r>
+              <a:rPr lang="de-CH" sz="1200" dirty="0">
+                <a:latin typeface="+mn-lt"/>
+              </a:rPr>
+              <a:t> </a:t>
+            </a:r>
+            <a:r>
+              <a:rPr lang="de-CH" sz="1200" dirty="0" err="1">
+                <a:latin typeface="+mn-lt"/>
+              </a:rPr>
+              <a:t>preprocessing</a:t>
+            </a:r>
+            <a:endParaRPr lang="de-CH" sz="1200" dirty="0">
+              <a:latin typeface="+mn-lt"/>
+            </a:endParaRPr>
+          </a:p>
+          <a:p>
+            <a:pPr marL="171450" marR="0" indent="-171450" algn="l" defTabSz="914400" rtl="0" eaLnBrk="1" fontAlgn="base" latinLnBrk="0" hangingPunct="1">
+              <a:lnSpc>
+                <a:spcPct val="100000"/>
+              </a:lnSpc>
+              <a:spcBef>
+                <a:spcPct val="0"/>
+              </a:spcBef>
+              <a:spcAft>
+                <a:spcPct val="0"/>
+              </a:spcAft>
+              <a:buClrTx/>
+              <a:buSzTx/>
+              <a:buFont typeface="Arial" panose="020B0604020202020204" pitchFamily="34" charset="0"/>
+              <a:buChar char="•"/>
+              <a:tabLst/>
+            </a:pPr>
+            <a:r>
+              <a:rPr lang="de-CH" sz="1200" dirty="0" err="1">
+                <a:latin typeface="+mn-lt"/>
+              </a:rPr>
+              <a:t>We</a:t>
+            </a:r>
+            <a:r>
+              <a:rPr lang="de-CH" sz="1200" dirty="0">
+                <a:latin typeface="+mn-lt"/>
+              </a:rPr>
+              <a:t> </a:t>
+            </a:r>
+            <a:r>
+              <a:rPr lang="de-CH" sz="1200" dirty="0" err="1">
+                <a:latin typeface="+mn-lt"/>
+              </a:rPr>
+              <a:t>create</a:t>
+            </a:r>
+            <a:r>
+              <a:rPr lang="de-CH" sz="1200" dirty="0">
+                <a:latin typeface="+mn-lt"/>
+              </a:rPr>
+              <a:t> </a:t>
+            </a:r>
+            <a:r>
+              <a:rPr lang="de-CH" sz="1200" dirty="0" err="1">
+                <a:latin typeface="+mn-lt"/>
+              </a:rPr>
+              <a:t>attribute-specific</a:t>
+            </a:r>
+            <a:r>
+              <a:rPr lang="de-CH" sz="1200" dirty="0">
+                <a:latin typeface="+mn-lt"/>
+              </a:rPr>
+              <a:t>  </a:t>
+            </a:r>
+            <a:r>
+              <a:rPr lang="de-CH" sz="1200" dirty="0" err="1">
+                <a:latin typeface="+mn-lt"/>
+              </a:rPr>
+              <a:t>datasets</a:t>
+            </a:r>
+            <a:r>
+              <a:rPr lang="de-CH" sz="1200" dirty="0">
+                <a:latin typeface="+mn-lt"/>
+              </a:rPr>
+              <a:t>.</a:t>
+            </a:r>
+          </a:p>
+          <a:p>
+            <a:pPr marL="171450" marR="0" indent="-171450" algn="l" defTabSz="914400" rtl="0" eaLnBrk="1" fontAlgn="base" latinLnBrk="0" hangingPunct="1">
+              <a:lnSpc>
+                <a:spcPct val="100000"/>
+              </a:lnSpc>
+              <a:spcBef>
+                <a:spcPct val="0"/>
+              </a:spcBef>
+              <a:spcAft>
+                <a:spcPct val="0"/>
+              </a:spcAft>
+              <a:buClrTx/>
+              <a:buSzTx/>
+              <a:buFont typeface="Arial" panose="020B0604020202020204" pitchFamily="34" charset="0"/>
+              <a:buChar char="•"/>
+              <a:tabLst/>
+            </a:pPr>
+            <a:r>
+              <a:rPr lang="de-CH" sz="1200" dirty="0" err="1">
+                <a:latin typeface="+mn-lt"/>
+              </a:rPr>
+              <a:t>Each</a:t>
+            </a:r>
+            <a:r>
+              <a:rPr lang="de-CH" sz="1200" dirty="0">
+                <a:latin typeface="+mn-lt"/>
+              </a:rPr>
+              <a:t> </a:t>
+            </a:r>
+            <a:r>
+              <a:rPr lang="de-CH" sz="1200" dirty="0" err="1">
+                <a:latin typeface="+mn-lt"/>
+              </a:rPr>
+              <a:t>dataset</a:t>
+            </a:r>
+            <a:r>
+              <a:rPr lang="de-CH" sz="1200" dirty="0">
+                <a:latin typeface="+mn-lt"/>
+              </a:rPr>
+              <a:t> </a:t>
+            </a:r>
+            <a:r>
+              <a:rPr lang="de-CH" sz="1200" dirty="0" err="1">
+                <a:latin typeface="+mn-lt"/>
+              </a:rPr>
+              <a:t>contains</a:t>
+            </a:r>
+            <a:r>
+              <a:rPr lang="de-CH" sz="1200" dirty="0">
+                <a:latin typeface="+mn-lt"/>
+              </a:rPr>
+              <a:t> </a:t>
+            </a:r>
+            <a:r>
+              <a:rPr lang="de-CH" sz="1200" dirty="0" err="1">
+                <a:latin typeface="+mn-lt"/>
+              </a:rPr>
+              <a:t>attribute</a:t>
+            </a:r>
+            <a:r>
+              <a:rPr lang="de-CH" sz="1200" dirty="0">
+                <a:latin typeface="+mn-lt"/>
+              </a:rPr>
+              <a:t> </a:t>
+            </a:r>
+            <a:r>
+              <a:rPr lang="de-CH" sz="1200" dirty="0" err="1">
+                <a:latin typeface="+mn-lt"/>
+              </a:rPr>
+              <a:t>matching</a:t>
+            </a:r>
+            <a:r>
+              <a:rPr lang="de-CH" sz="1200" dirty="0">
+                <a:latin typeface="+mn-lt"/>
+              </a:rPr>
+              <a:t> resp. non-</a:t>
+            </a:r>
+            <a:r>
+              <a:rPr lang="de-CH" sz="1200" dirty="0" err="1">
+                <a:latin typeface="+mn-lt"/>
+              </a:rPr>
+              <a:t>matching</a:t>
+            </a:r>
+            <a:r>
+              <a:rPr lang="de-CH" sz="1200" dirty="0">
+                <a:latin typeface="+mn-lt"/>
+              </a:rPr>
+              <a:t> </a:t>
+            </a:r>
+            <a:r>
+              <a:rPr lang="de-CH" sz="1200" dirty="0" err="1">
+                <a:latin typeface="+mn-lt"/>
+              </a:rPr>
+              <a:t>images</a:t>
+            </a:r>
+            <a:r>
+              <a:rPr lang="de-CH" sz="1200" dirty="0">
+                <a:latin typeface="+mn-lt"/>
+              </a:rPr>
+              <a:t> </a:t>
+            </a:r>
+            <a:r>
+              <a:rPr lang="de-CH" sz="1200" dirty="0" err="1">
+                <a:latin typeface="+mn-lt"/>
+              </a:rPr>
+              <a:t>labeled</a:t>
+            </a:r>
+            <a:r>
+              <a:rPr lang="de-CH" sz="1200" dirty="0">
+                <a:latin typeface="+mn-lt"/>
+              </a:rPr>
+              <a:t> </a:t>
+            </a:r>
+            <a:r>
+              <a:rPr lang="de-CH" sz="1200" dirty="0" err="1">
+                <a:latin typeface="+mn-lt"/>
+              </a:rPr>
+              <a:t>as</a:t>
+            </a:r>
+            <a:r>
+              <a:rPr lang="de-CH" sz="1200" dirty="0">
+                <a:latin typeface="+mn-lt"/>
+              </a:rPr>
+              <a:t> positive resp. negative. </a:t>
+            </a:r>
+            <a:endParaRPr kumimoji="0" lang="de-CH" sz="1200" b="0" i="0" u="none" strike="noStrike" cap="none" normalizeH="0" baseline="0" dirty="0">
+              <a:ln>
+                <a:noFill/>
+              </a:ln>
+              <a:solidFill>
+                <a:srgbClr val="000000"/>
+              </a:solidFill>
+              <a:effectLst/>
+              <a:latin typeface="+mn-lt"/>
+              <a:ea typeface="ヒラギノ角ゴ ProN W3" charset="0"/>
+              <a:cs typeface="ヒラギノ角ゴ ProN W3" charset="0"/>
+              <a:sym typeface="Neutraface Text Book" charset="0"/>
+            </a:endParaRPr>
           </a:p>
         </p:txBody>
       </p:sp>

</xml_diff>